<commit_message>
SRS and general TeX updates
</commit_message>
<xml_diff>
--- a/docs/Presentations/ImplementationPresentation/ImplementationPresentation.pptx
+++ b/docs/Presentations/ImplementationPresentation/ImplementationPresentation.pptx
@@ -832,6 +832,1408 @@
     </pc:docChg>
   </pc:docChgLst>
   <pc:docChgLst>
+    <pc:chgData name="Hunter Ceranic" userId="55b8025d37c61089" providerId="LiveId" clId="{ACCD79ED-BFAE-4857-8FB5-603E641725DE}"/>
+    <pc:docChg chg="undo redo custSel addSld delSld modSld sldOrd addMainMaster delMainMaster">
+      <pc:chgData name="Hunter Ceranic" userId="55b8025d37c61089" providerId="LiveId" clId="{ACCD79ED-BFAE-4857-8FB5-603E641725DE}" dt="2024-01-26T19:32:54.795" v="3897" actId="20577"/>
+      <pc:docMkLst>
+        <pc:docMk/>
+      </pc:docMkLst>
+      <pc:sldChg chg="addSp delSp modSp new mod setBg modClrScheme chgLayout">
+        <pc:chgData name="Hunter Ceranic" userId="55b8025d37c61089" providerId="LiveId" clId="{ACCD79ED-BFAE-4857-8FB5-603E641725DE}" dt="2024-01-23T20:11:06.058" v="150" actId="2085"/>
+        <pc:sldMkLst>
+          <pc:docMk/>
+          <pc:sldMk cId="3079278799" sldId="256"/>
+        </pc:sldMkLst>
+        <pc:spChg chg="mod">
+          <ac:chgData name="Hunter Ceranic" userId="55b8025d37c61089" providerId="LiveId" clId="{ACCD79ED-BFAE-4857-8FB5-603E641725DE}" dt="2024-01-23T20:11:06.058" v="150" actId="2085"/>
+          <ac:spMkLst>
+            <pc:docMk/>
+            <pc:sldMk cId="3079278799" sldId="256"/>
+            <ac:spMk id="2" creationId="{757F2756-77AC-6ECF-6B19-F194FDB5096B}"/>
+          </ac:spMkLst>
+        </pc:spChg>
+        <pc:spChg chg="mod">
+          <ac:chgData name="Hunter Ceranic" userId="55b8025d37c61089" providerId="LiveId" clId="{ACCD79ED-BFAE-4857-8FB5-603E641725DE}" dt="2024-01-23T20:05:22.836" v="115" actId="1076"/>
+          <ac:spMkLst>
+            <pc:docMk/>
+            <pc:sldMk cId="3079278799" sldId="256"/>
+            <ac:spMk id="3" creationId="{DF771E06-46C7-88C5-B4FC-0AB8360AD021}"/>
+          </ac:spMkLst>
+        </pc:spChg>
+        <pc:spChg chg="add mod">
+          <ac:chgData name="Hunter Ceranic" userId="55b8025d37c61089" providerId="LiveId" clId="{ACCD79ED-BFAE-4857-8FB5-603E641725DE}" dt="2024-01-23T20:10:21.670" v="143" actId="208"/>
+          <ac:spMkLst>
+            <pc:docMk/>
+            <pc:sldMk cId="3079278799" sldId="256"/>
+            <ac:spMk id="6" creationId="{A598BD13-5C63-68F7-ED2D-22E7C4ECEB99}"/>
+          </ac:spMkLst>
+        </pc:spChg>
+        <pc:spChg chg="add del">
+          <ac:chgData name="Hunter Ceranic" userId="55b8025d37c61089" providerId="LiveId" clId="{ACCD79ED-BFAE-4857-8FB5-603E641725DE}" dt="2024-01-23T20:03:41.234" v="35" actId="26606"/>
+          <ac:spMkLst>
+            <pc:docMk/>
+            <pc:sldMk cId="3079278799" sldId="256"/>
+            <ac:spMk id="9" creationId="{ECD84B89-83B1-AA44-B9BE-C68A3A346981}"/>
+          </ac:spMkLst>
+        </pc:spChg>
+        <pc:spChg chg="add del">
+          <ac:chgData name="Hunter Ceranic" userId="55b8025d37c61089" providerId="LiveId" clId="{ACCD79ED-BFAE-4857-8FB5-603E641725DE}" dt="2024-01-23T20:03:02.868" v="2" actId="26606"/>
+          <ac:spMkLst>
+            <pc:docMk/>
+            <pc:sldMk cId="3079278799" sldId="256"/>
+            <ac:spMk id="10" creationId="{8C37C960-91F5-4F61-B2CD-8A037920720B}"/>
+          </ac:spMkLst>
+        </pc:spChg>
+        <pc:spChg chg="add del">
+          <ac:chgData name="Hunter Ceranic" userId="55b8025d37c61089" providerId="LiveId" clId="{ACCD79ED-BFAE-4857-8FB5-603E641725DE}" dt="2024-01-23T20:03:41.234" v="35" actId="26606"/>
+          <ac:spMkLst>
+            <pc:docMk/>
+            <pc:sldMk cId="3079278799" sldId="256"/>
+            <ac:spMk id="11" creationId="{DF3B9D9F-2555-4B2E-AD17-056B66596D5A}"/>
+          </ac:spMkLst>
+        </pc:spChg>
+        <pc:spChg chg="add del">
+          <ac:chgData name="Hunter Ceranic" userId="55b8025d37c61089" providerId="LiveId" clId="{ACCD79ED-BFAE-4857-8FB5-603E641725DE}" dt="2024-01-23T20:03:41.234" v="35" actId="26606"/>
+          <ac:spMkLst>
+            <pc:docMk/>
+            <pc:sldMk cId="3079278799" sldId="256"/>
+            <ac:spMk id="13" creationId="{98F816C8-664D-4D46-87AC-DD7054006763}"/>
+          </ac:spMkLst>
+        </pc:spChg>
+        <pc:spChg chg="add">
+          <ac:chgData name="Hunter Ceranic" userId="55b8025d37c61089" providerId="LiveId" clId="{ACCD79ED-BFAE-4857-8FB5-603E641725DE}" dt="2024-01-23T20:03:41.234" v="35" actId="26606"/>
+          <ac:spMkLst>
+            <pc:docMk/>
+            <pc:sldMk cId="3079278799" sldId="256"/>
+            <ac:spMk id="18" creationId="{A1D7EC86-7CB9-431D-8AC3-8AAF0440B162}"/>
+          </ac:spMkLst>
+        </pc:spChg>
+        <pc:spChg chg="add">
+          <ac:chgData name="Hunter Ceranic" userId="55b8025d37c61089" providerId="LiveId" clId="{ACCD79ED-BFAE-4857-8FB5-603E641725DE}" dt="2024-01-23T20:03:41.234" v="35" actId="26606"/>
+          <ac:spMkLst>
+            <pc:docMk/>
+            <pc:sldMk cId="3079278799" sldId="256"/>
+            <ac:spMk id="20" creationId="{D4B9777F-B610-419B-9193-80306388F3E2}"/>
+          </ac:spMkLst>
+        </pc:spChg>
+        <pc:spChg chg="add">
+          <ac:chgData name="Hunter Ceranic" userId="55b8025d37c61089" providerId="LiveId" clId="{ACCD79ED-BFAE-4857-8FB5-603E641725DE}" dt="2024-01-23T20:03:41.234" v="35" actId="26606"/>
+          <ac:spMkLst>
+            <pc:docMk/>
+            <pc:sldMk cId="3079278799" sldId="256"/>
+            <ac:spMk id="22" creationId="{311F016A-A753-449B-9EA6-322199B7119E}"/>
+          </ac:spMkLst>
+        </pc:spChg>
+        <pc:spChg chg="add">
+          <ac:chgData name="Hunter Ceranic" userId="55b8025d37c61089" providerId="LiveId" clId="{ACCD79ED-BFAE-4857-8FB5-603E641725DE}" dt="2024-01-23T20:03:41.234" v="35" actId="26606"/>
+          <ac:spMkLst>
+            <pc:docMk/>
+            <pc:sldMk cId="3079278799" sldId="256"/>
+            <ac:spMk id="24" creationId="{95106A28-883A-4993-BF9E-C403B81A8D66}"/>
+          </ac:spMkLst>
+        </pc:spChg>
+        <pc:spChg chg="add">
+          <ac:chgData name="Hunter Ceranic" userId="55b8025d37c61089" providerId="LiveId" clId="{ACCD79ED-BFAE-4857-8FB5-603E641725DE}" dt="2024-01-23T20:03:41.234" v="35" actId="26606"/>
+          <ac:spMkLst>
+            <pc:docMk/>
+            <pc:sldMk cId="3079278799" sldId="256"/>
+            <ac:spMk id="26" creationId="{F5AE4E4F-9F4C-43ED-8299-9BD63B74E8F0}"/>
+          </ac:spMkLst>
+        </pc:spChg>
+        <pc:picChg chg="add del">
+          <ac:chgData name="Hunter Ceranic" userId="55b8025d37c61089" providerId="LiveId" clId="{ACCD79ED-BFAE-4857-8FB5-603E641725DE}" dt="2024-01-23T20:03:02.868" v="2" actId="26606"/>
+          <ac:picMkLst>
+            <pc:docMk/>
+            <pc:sldMk cId="3079278799" sldId="256"/>
+            <ac:picMk id="4" creationId="{BFC42171-CD21-0205-8DA1-6384FC5DE1B8}"/>
+          </ac:picMkLst>
+        </pc:picChg>
+        <pc:picChg chg="add del">
+          <ac:chgData name="Hunter Ceranic" userId="55b8025d37c61089" providerId="LiveId" clId="{ACCD79ED-BFAE-4857-8FB5-603E641725DE}" dt="2024-01-23T20:03:02.868" v="2" actId="26606"/>
+          <ac:picMkLst>
+            <pc:docMk/>
+            <pc:sldMk cId="3079278799" sldId="256"/>
+            <ac:picMk id="5" creationId="{4B7CE3BD-1D42-943D-2C8C-0F16CCF8C897}"/>
+          </ac:picMkLst>
+        </pc:picChg>
+        <pc:picChg chg="add mod ord">
+          <ac:chgData name="Hunter Ceranic" userId="55b8025d37c61089" providerId="LiveId" clId="{ACCD79ED-BFAE-4857-8FB5-603E641725DE}" dt="2024-01-23T20:10:54.634" v="147" actId="1076"/>
+          <ac:picMkLst>
+            <pc:docMk/>
+            <pc:sldMk cId="3079278799" sldId="256"/>
+            <ac:picMk id="12" creationId="{2C9D627D-6E69-94C6-4924-B84A51E3A1F5}"/>
+          </ac:picMkLst>
+        </pc:picChg>
+      </pc:sldChg>
+      <pc:sldChg chg="addSp modSp new mod setBg">
+        <pc:chgData name="Hunter Ceranic" userId="55b8025d37c61089" providerId="LiveId" clId="{ACCD79ED-BFAE-4857-8FB5-603E641725DE}" dt="2024-01-23T23:28:31.483" v="2161" actId="20577"/>
+        <pc:sldMkLst>
+          <pc:docMk/>
+          <pc:sldMk cId="427290740" sldId="257"/>
+        </pc:sldMkLst>
+        <pc:spChg chg="mod">
+          <ac:chgData name="Hunter Ceranic" userId="55b8025d37c61089" providerId="LiveId" clId="{ACCD79ED-BFAE-4857-8FB5-603E641725DE}" dt="2024-01-23T22:22:47.238" v="1695" actId="26606"/>
+          <ac:spMkLst>
+            <pc:docMk/>
+            <pc:sldMk cId="427290740" sldId="257"/>
+            <ac:spMk id="2" creationId="{7D2F6F69-BD97-22EF-CF32-EB1A205B215C}"/>
+          </ac:spMkLst>
+        </pc:spChg>
+        <pc:spChg chg="mod">
+          <ac:chgData name="Hunter Ceranic" userId="55b8025d37c61089" providerId="LiveId" clId="{ACCD79ED-BFAE-4857-8FB5-603E641725DE}" dt="2024-01-23T22:53:23.317" v="1943" actId="20577"/>
+          <ac:spMkLst>
+            <pc:docMk/>
+            <pc:sldMk cId="427290740" sldId="257"/>
+            <ac:spMk id="3" creationId="{1AEB8B50-8C85-0729-64B2-671AE19C2815}"/>
+          </ac:spMkLst>
+        </pc:spChg>
+        <pc:spChg chg="mod">
+          <ac:chgData name="Hunter Ceranic" userId="55b8025d37c61089" providerId="LiveId" clId="{ACCD79ED-BFAE-4857-8FB5-603E641725DE}" dt="2024-01-23T23:28:31.483" v="2161" actId="20577"/>
+          <ac:spMkLst>
+            <pc:docMk/>
+            <pc:sldMk cId="427290740" sldId="257"/>
+            <ac:spMk id="4" creationId="{3F70354C-224E-1AAB-3BB6-4F2536217202}"/>
+          </ac:spMkLst>
+        </pc:spChg>
+        <pc:spChg chg="add">
+          <ac:chgData name="Hunter Ceranic" userId="55b8025d37c61089" providerId="LiveId" clId="{ACCD79ED-BFAE-4857-8FB5-603E641725DE}" dt="2024-01-23T22:22:47.238" v="1695" actId="26606"/>
+          <ac:spMkLst>
+            <pc:docMk/>
+            <pc:sldMk cId="427290740" sldId="257"/>
+            <ac:spMk id="10" creationId="{1CD81A2A-6ED4-4EF4-A14C-912D31E14800}"/>
+          </ac:spMkLst>
+        </pc:spChg>
+        <pc:spChg chg="add">
+          <ac:chgData name="Hunter Ceranic" userId="55b8025d37c61089" providerId="LiveId" clId="{ACCD79ED-BFAE-4857-8FB5-603E641725DE}" dt="2024-01-23T22:22:47.238" v="1695" actId="26606"/>
+          <ac:spMkLst>
+            <pc:docMk/>
+            <pc:sldMk cId="427290740" sldId="257"/>
+            <ac:spMk id="12" creationId="{1661932C-CA15-4E17-B115-FAE7CBEE4789}"/>
+          </ac:spMkLst>
+        </pc:spChg>
+        <pc:spChg chg="add">
+          <ac:chgData name="Hunter Ceranic" userId="55b8025d37c61089" providerId="LiveId" clId="{ACCD79ED-BFAE-4857-8FB5-603E641725DE}" dt="2024-01-23T22:22:47.238" v="1695" actId="26606"/>
+          <ac:spMkLst>
+            <pc:docMk/>
+            <pc:sldMk cId="427290740" sldId="257"/>
+            <ac:spMk id="14" creationId="{8590ADD5-9383-4D3D-9047-3DA2593CCB5D}"/>
+          </ac:spMkLst>
+        </pc:spChg>
+        <pc:spChg chg="add">
+          <ac:chgData name="Hunter Ceranic" userId="55b8025d37c61089" providerId="LiveId" clId="{ACCD79ED-BFAE-4857-8FB5-603E641725DE}" dt="2024-01-23T22:22:47.238" v="1695" actId="26606"/>
+          <ac:spMkLst>
+            <pc:docMk/>
+            <pc:sldMk cId="427290740" sldId="257"/>
+            <ac:spMk id="16" creationId="{DABE3E45-88CF-45D8-8D40-C773324D93F6}"/>
+          </ac:spMkLst>
+        </pc:spChg>
+        <pc:spChg chg="add">
+          <ac:chgData name="Hunter Ceranic" userId="55b8025d37c61089" providerId="LiveId" clId="{ACCD79ED-BFAE-4857-8FB5-603E641725DE}" dt="2024-01-23T22:22:47.238" v="1695" actId="26606"/>
+          <ac:spMkLst>
+            <pc:docMk/>
+            <pc:sldMk cId="427290740" sldId="257"/>
+            <ac:spMk id="20" creationId="{B91ECDA9-56DC-4270-8F33-01C5637B8CEB}"/>
+          </ac:spMkLst>
+        </pc:spChg>
+        <pc:spChg chg="add">
+          <ac:chgData name="Hunter Ceranic" userId="55b8025d37c61089" providerId="LiveId" clId="{ACCD79ED-BFAE-4857-8FB5-603E641725DE}" dt="2024-01-23T22:22:47.238" v="1695" actId="26606"/>
+          <ac:spMkLst>
+            <pc:docMk/>
+            <pc:sldMk cId="427290740" sldId="257"/>
+            <ac:spMk id="22" creationId="{75F47824-961D-465D-84F9-EAE11BC6173B}"/>
+          </ac:spMkLst>
+        </pc:spChg>
+        <pc:spChg chg="add">
+          <ac:chgData name="Hunter Ceranic" userId="55b8025d37c61089" providerId="LiveId" clId="{ACCD79ED-BFAE-4857-8FB5-603E641725DE}" dt="2024-01-23T22:22:47.238" v="1695" actId="26606"/>
+          <ac:spMkLst>
+            <pc:docMk/>
+            <pc:sldMk cId="427290740" sldId="257"/>
+            <ac:spMk id="24" creationId="{FEC9DA3E-C1D7-472D-B7C0-F71AE41FBA23}"/>
+          </ac:spMkLst>
+        </pc:spChg>
+        <pc:picChg chg="add">
+          <ac:chgData name="Hunter Ceranic" userId="55b8025d37c61089" providerId="LiveId" clId="{ACCD79ED-BFAE-4857-8FB5-603E641725DE}" dt="2024-01-23T22:22:47.238" v="1695" actId="26606"/>
+          <ac:picMkLst>
+            <pc:docMk/>
+            <pc:sldMk cId="427290740" sldId="257"/>
+            <ac:picMk id="7" creationId="{947BE24C-2029-BD0A-C300-37A124369839}"/>
+          </ac:picMkLst>
+        </pc:picChg>
+        <pc:cxnChg chg="add">
+          <ac:chgData name="Hunter Ceranic" userId="55b8025d37c61089" providerId="LiveId" clId="{ACCD79ED-BFAE-4857-8FB5-603E641725DE}" dt="2024-01-23T22:22:47.238" v="1695" actId="26606"/>
+          <ac:cxnSpMkLst>
+            <pc:docMk/>
+            <pc:sldMk cId="427290740" sldId="257"/>
+            <ac:cxnSpMk id="18" creationId="{49CD1692-827B-4C8D-B4A1-134FD04CF45C}"/>
+          </ac:cxnSpMkLst>
+        </pc:cxnChg>
+      </pc:sldChg>
+      <pc:sldChg chg="addSp delSp modSp new mod setBg">
+        <pc:chgData name="Hunter Ceranic" userId="55b8025d37c61089" providerId="LiveId" clId="{ACCD79ED-BFAE-4857-8FB5-603E641725DE}" dt="2024-01-23T23:28:41.656" v="2165" actId="20577"/>
+        <pc:sldMkLst>
+          <pc:docMk/>
+          <pc:sldMk cId="356722889" sldId="258"/>
+        </pc:sldMkLst>
+        <pc:spChg chg="mod">
+          <ac:chgData name="Hunter Ceranic" userId="55b8025d37c61089" providerId="LiveId" clId="{ACCD79ED-BFAE-4857-8FB5-603E641725DE}" dt="2024-01-23T22:43:53.487" v="1902" actId="26606"/>
+          <ac:spMkLst>
+            <pc:docMk/>
+            <pc:sldMk cId="356722889" sldId="258"/>
+            <ac:spMk id="2" creationId="{99A0820E-216D-F7CC-0905-014594A9C1A4}"/>
+          </ac:spMkLst>
+        </pc:spChg>
+        <pc:spChg chg="del">
+          <ac:chgData name="Hunter Ceranic" userId="55b8025d37c61089" providerId="LiveId" clId="{ACCD79ED-BFAE-4857-8FB5-603E641725DE}" dt="2024-01-23T22:29:58.817" v="1698" actId="478"/>
+          <ac:spMkLst>
+            <pc:docMk/>
+            <pc:sldMk cId="356722889" sldId="258"/>
+            <ac:spMk id="3" creationId="{31EE65BB-7C1C-EBF3-F280-88F1218E736F}"/>
+          </ac:spMkLst>
+        </pc:spChg>
+        <pc:spChg chg="add mod ord">
+          <ac:chgData name="Hunter Ceranic" userId="55b8025d37c61089" providerId="LiveId" clId="{ACCD79ED-BFAE-4857-8FB5-603E641725DE}" dt="2024-01-23T22:57:37.871" v="1990" actId="20577"/>
+          <ac:spMkLst>
+            <pc:docMk/>
+            <pc:sldMk cId="356722889" sldId="258"/>
+            <ac:spMk id="6" creationId="{CC7BCCCB-9907-FF0C-EEAB-CDCE4653FE88}"/>
+          </ac:spMkLst>
+        </pc:spChg>
+        <pc:spChg chg="del">
+          <ac:chgData name="Hunter Ceranic" userId="55b8025d37c61089" providerId="LiveId" clId="{ACCD79ED-BFAE-4857-8FB5-603E641725DE}" dt="2024-01-23T23:02:20.668" v="2052" actId="478"/>
+          <ac:spMkLst>
+            <pc:docMk/>
+            <pc:sldMk cId="356722889" sldId="258"/>
+            <ac:spMk id="12" creationId="{AA925B2B-F9CC-0BD8-52DC-A938C32C6863}"/>
+          </ac:spMkLst>
+        </pc:spChg>
+        <pc:spChg chg="add mod">
+          <ac:chgData name="Hunter Ceranic" userId="55b8025d37c61089" providerId="LiveId" clId="{ACCD79ED-BFAE-4857-8FB5-603E641725DE}" dt="2024-01-23T23:28:41.656" v="2165" actId="20577"/>
+          <ac:spMkLst>
+            <pc:docMk/>
+            <pc:sldMk cId="356722889" sldId="258"/>
+            <ac:spMk id="13" creationId="{B0F0E84C-F4C8-FB93-DEDB-FBAC071B797F}"/>
+          </ac:spMkLst>
+        </pc:spChg>
+        <pc:spChg chg="add">
+          <ac:chgData name="Hunter Ceranic" userId="55b8025d37c61089" providerId="LiveId" clId="{ACCD79ED-BFAE-4857-8FB5-603E641725DE}" dt="2024-01-23T22:43:53.487" v="1902" actId="26606"/>
+          <ac:spMkLst>
+            <pc:docMk/>
+            <pc:sldMk cId="356722889" sldId="258"/>
+            <ac:spMk id="16" creationId="{72D05657-94EE-4B2D-BC1B-A1D065063658}"/>
+          </ac:spMkLst>
+        </pc:spChg>
+        <pc:spChg chg="add">
+          <ac:chgData name="Hunter Ceranic" userId="55b8025d37c61089" providerId="LiveId" clId="{ACCD79ED-BFAE-4857-8FB5-603E641725DE}" dt="2024-01-23T22:43:53.487" v="1902" actId="26606"/>
+          <ac:spMkLst>
+            <pc:docMk/>
+            <pc:sldMk cId="356722889" sldId="258"/>
+            <ac:spMk id="18" creationId="{7586665A-47B3-4AEE-BC94-15D89FF706B3}"/>
+          </ac:spMkLst>
+        </pc:spChg>
+        <pc:picChg chg="add mod">
+          <ac:chgData name="Hunter Ceranic" userId="55b8025d37c61089" providerId="LiveId" clId="{ACCD79ED-BFAE-4857-8FB5-603E641725DE}" dt="2024-01-23T22:43:53.487" v="1902" actId="26606"/>
+          <ac:picMkLst>
+            <pc:docMk/>
+            <pc:sldMk cId="356722889" sldId="258"/>
+            <ac:picMk id="5" creationId="{CFFC0296-F13E-167E-0F33-27320DF18354}"/>
+          </ac:picMkLst>
+        </pc:picChg>
+        <pc:picChg chg="add mod">
+          <ac:chgData name="Hunter Ceranic" userId="55b8025d37c61089" providerId="LiveId" clId="{ACCD79ED-BFAE-4857-8FB5-603E641725DE}" dt="2024-01-23T22:43:53.487" v="1902" actId="26606"/>
+          <ac:picMkLst>
+            <pc:docMk/>
+            <pc:sldMk cId="356722889" sldId="258"/>
+            <ac:picMk id="11" creationId="{A82ADC44-FE62-0E4F-B61B-636F51C8ACE8}"/>
+          </ac:picMkLst>
+        </pc:picChg>
+        <pc:picChg chg="add del">
+          <ac:chgData name="Hunter Ceranic" userId="55b8025d37c61089" providerId="LiveId" clId="{ACCD79ED-BFAE-4857-8FB5-603E641725DE}" dt="2024-01-23T23:16:40.377" v="2092" actId="22"/>
+          <ac:picMkLst>
+            <pc:docMk/>
+            <pc:sldMk cId="356722889" sldId="258"/>
+            <ac:picMk id="15" creationId="{3C704A7D-35B0-ECA8-5701-D86001ABB30B}"/>
+          </ac:picMkLst>
+        </pc:picChg>
+        <pc:cxnChg chg="add del mod">
+          <ac:chgData name="Hunter Ceranic" userId="55b8025d37c61089" providerId="LiveId" clId="{ACCD79ED-BFAE-4857-8FB5-603E641725DE}" dt="2024-01-23T22:40:28.749" v="1839" actId="478"/>
+          <ac:cxnSpMkLst>
+            <pc:docMk/>
+            <pc:sldMk cId="356722889" sldId="258"/>
+            <ac:cxnSpMk id="8" creationId="{909E5A23-8745-0CF1-739D-B13D8849A089}"/>
+          </ac:cxnSpMkLst>
+        </pc:cxnChg>
+      </pc:sldChg>
+      <pc:sldChg chg="addSp delSp modSp new del mod">
+        <pc:chgData name="Hunter Ceranic" userId="55b8025d37c61089" providerId="LiveId" clId="{ACCD79ED-BFAE-4857-8FB5-603E641725DE}" dt="2024-01-25T17:57:10.263" v="2183" actId="47"/>
+        <pc:sldMkLst>
+          <pc:docMk/>
+          <pc:sldMk cId="1952224994" sldId="259"/>
+        </pc:sldMkLst>
+        <pc:spChg chg="del">
+          <ac:chgData name="Hunter Ceranic" userId="55b8025d37c61089" providerId="LiveId" clId="{ACCD79ED-BFAE-4857-8FB5-603E641725DE}" dt="2024-01-23T23:02:42.323" v="2058" actId="478"/>
+          <ac:spMkLst>
+            <pc:docMk/>
+            <pc:sldMk cId="1952224994" sldId="259"/>
+            <ac:spMk id="4" creationId="{96256866-0A8D-DA42-89E0-22339441C794}"/>
+          </ac:spMkLst>
+        </pc:spChg>
+        <pc:spChg chg="add mod">
+          <ac:chgData name="Hunter Ceranic" userId="55b8025d37c61089" providerId="LiveId" clId="{ACCD79ED-BFAE-4857-8FB5-603E641725DE}" dt="2024-01-23T23:29:04.464" v="2173" actId="20577"/>
+          <ac:spMkLst>
+            <pc:docMk/>
+            <pc:sldMk cId="1952224994" sldId="259"/>
+            <ac:spMk id="5" creationId="{23624874-B696-09C2-F784-44BA41FC2861}"/>
+          </ac:spMkLst>
+        </pc:spChg>
+      </pc:sldChg>
+      <pc:sldChg chg="addSp delSp modSp new mod ord">
+        <pc:chgData name="Hunter Ceranic" userId="55b8025d37c61089" providerId="LiveId" clId="{ACCD79ED-BFAE-4857-8FB5-603E641725DE}" dt="2024-01-26T19:32:54.795" v="3897" actId="20577"/>
+        <pc:sldMkLst>
+          <pc:docMk/>
+          <pc:sldMk cId="3488984038" sldId="260"/>
+        </pc:sldMkLst>
+        <pc:spChg chg="mod">
+          <ac:chgData name="Hunter Ceranic" userId="55b8025d37c61089" providerId="LiveId" clId="{ACCD79ED-BFAE-4857-8FB5-603E641725DE}" dt="2024-01-23T20:13:13.509" v="202" actId="20577"/>
+          <ac:spMkLst>
+            <pc:docMk/>
+            <pc:sldMk cId="3488984038" sldId="260"/>
+            <ac:spMk id="2" creationId="{3C732381-BFC2-6F3F-058A-7EAD61E5590C}"/>
+          </ac:spMkLst>
+        </pc:spChg>
+        <pc:spChg chg="del mod">
+          <ac:chgData name="Hunter Ceranic" userId="55b8025d37c61089" providerId="LiveId" clId="{ACCD79ED-BFAE-4857-8FB5-603E641725DE}" dt="2024-01-25T18:38:21.864" v="3721" actId="26606"/>
+          <ac:spMkLst>
+            <pc:docMk/>
+            <pc:sldMk cId="3488984038" sldId="260"/>
+            <ac:spMk id="3" creationId="{4F91F226-354F-27D2-1914-C5773798C0F9}"/>
+          </ac:spMkLst>
+        </pc:spChg>
+        <pc:spChg chg="del">
+          <ac:chgData name="Hunter Ceranic" userId="55b8025d37c61089" providerId="LiveId" clId="{ACCD79ED-BFAE-4857-8FB5-603E641725DE}" dt="2024-01-23T23:02:34.360" v="2056" actId="478"/>
+          <ac:spMkLst>
+            <pc:docMk/>
+            <pc:sldMk cId="3488984038" sldId="260"/>
+            <ac:spMk id="4" creationId="{2D85AB7E-DCC5-3DE3-15C2-FA318DBE4726}"/>
+          </ac:spMkLst>
+        </pc:spChg>
+        <pc:spChg chg="add mod">
+          <ac:chgData name="Hunter Ceranic" userId="55b8025d37c61089" providerId="LiveId" clId="{ACCD79ED-BFAE-4857-8FB5-603E641725DE}" dt="2024-01-23T23:28:59.502" v="2171" actId="20577"/>
+          <ac:spMkLst>
+            <pc:docMk/>
+            <pc:sldMk cId="3488984038" sldId="260"/>
+            <ac:spMk id="5" creationId="{1EF2BD1D-C346-969D-0000-25EBA3216018}"/>
+          </ac:spMkLst>
+        </pc:spChg>
+        <pc:graphicFrameChg chg="add mod">
+          <ac:chgData name="Hunter Ceranic" userId="55b8025d37c61089" providerId="LiveId" clId="{ACCD79ED-BFAE-4857-8FB5-603E641725DE}" dt="2024-01-26T19:32:54.795" v="3897" actId="20577"/>
+          <ac:graphicFrameMkLst>
+            <pc:docMk/>
+            <pc:sldMk cId="3488984038" sldId="260"/>
+            <ac:graphicFrameMk id="7" creationId="{F2613A3F-76FA-8E25-8998-F841CA6DA03F}"/>
+          </ac:graphicFrameMkLst>
+        </pc:graphicFrameChg>
+      </pc:sldChg>
+      <pc:sldChg chg="addSp delSp modSp new mod setBg">
+        <pc:chgData name="Hunter Ceranic" userId="55b8025d37c61089" providerId="LiveId" clId="{ACCD79ED-BFAE-4857-8FB5-603E641725DE}" dt="2024-01-23T23:28:36.785" v="2163" actId="20577"/>
+        <pc:sldMkLst>
+          <pc:docMk/>
+          <pc:sldMk cId="464311981" sldId="261"/>
+        </pc:sldMkLst>
+        <pc:spChg chg="mod">
+          <ac:chgData name="Hunter Ceranic" userId="55b8025d37c61089" providerId="LiveId" clId="{ACCD79ED-BFAE-4857-8FB5-603E641725DE}" dt="2024-01-23T21:46:29.427" v="694" actId="26606"/>
+          <ac:spMkLst>
+            <pc:docMk/>
+            <pc:sldMk cId="464311981" sldId="261"/>
+            <ac:spMk id="2" creationId="{5759A1AE-C6A2-3A06-2293-B3DF84DACCF5}"/>
+          </ac:spMkLst>
+        </pc:spChg>
+        <pc:spChg chg="mod">
+          <ac:chgData name="Hunter Ceranic" userId="55b8025d37c61089" providerId="LiveId" clId="{ACCD79ED-BFAE-4857-8FB5-603E641725DE}" dt="2024-01-23T21:46:29.427" v="694" actId="26606"/>
+          <ac:spMkLst>
+            <pc:docMk/>
+            <pc:sldMk cId="464311981" sldId="261"/>
+            <ac:spMk id="3" creationId="{695A74DB-2858-C407-697B-48AD50FE8872}"/>
+          </ac:spMkLst>
+        </pc:spChg>
+        <pc:spChg chg="del mod">
+          <ac:chgData name="Hunter Ceranic" userId="55b8025d37c61089" providerId="LiveId" clId="{ACCD79ED-BFAE-4857-8FB5-603E641725DE}" dt="2024-01-23T23:01:52.491" v="2049" actId="478"/>
+          <ac:spMkLst>
+            <pc:docMk/>
+            <pc:sldMk cId="464311981" sldId="261"/>
+            <ac:spMk id="4" creationId="{D30DDECE-581C-CDF6-B274-8DC06F6492D4}"/>
+          </ac:spMkLst>
+        </pc:spChg>
+        <pc:spChg chg="add del mod">
+          <ac:chgData name="Hunter Ceranic" userId="55b8025d37c61089" providerId="LiveId" clId="{ACCD79ED-BFAE-4857-8FB5-603E641725DE}" dt="2024-01-23T23:28:36.785" v="2163" actId="20577"/>
+          <ac:spMkLst>
+            <pc:docMk/>
+            <pc:sldMk cId="464311981" sldId="261"/>
+            <ac:spMk id="5" creationId="{2CDDB1A3-6053-6F50-7B03-6D5A338CD42D}"/>
+          </ac:spMkLst>
+        </pc:spChg>
+        <pc:spChg chg="add">
+          <ac:chgData name="Hunter Ceranic" userId="55b8025d37c61089" providerId="LiveId" clId="{ACCD79ED-BFAE-4857-8FB5-603E641725DE}" dt="2024-01-23T21:46:29.427" v="694" actId="26606"/>
+          <ac:spMkLst>
+            <pc:docMk/>
+            <pc:sldMk cId="464311981" sldId="261"/>
+            <ac:spMk id="1028" creationId="{4AC6B390-BC59-4F1D-A0EE-D71A92F0A0B2}"/>
+          </ac:spMkLst>
+        </pc:spChg>
+        <pc:spChg chg="add">
+          <ac:chgData name="Hunter Ceranic" userId="55b8025d37c61089" providerId="LiveId" clId="{ACCD79ED-BFAE-4857-8FB5-603E641725DE}" dt="2024-01-23T21:46:29.427" v="694" actId="26606"/>
+          <ac:spMkLst>
+            <pc:docMk/>
+            <pc:sldMk cId="464311981" sldId="261"/>
+            <ac:spMk id="1029" creationId="{B6C60D79-16F1-4C4B-B7E3-7634E7069CDE}"/>
+          </ac:spMkLst>
+        </pc:spChg>
+        <pc:spChg chg="add">
+          <ac:chgData name="Hunter Ceranic" userId="55b8025d37c61089" providerId="LiveId" clId="{ACCD79ED-BFAE-4857-8FB5-603E641725DE}" dt="2024-01-23T21:46:29.427" v="694" actId="26606"/>
+          <ac:spMkLst>
+            <pc:docMk/>
+            <pc:sldMk cId="464311981" sldId="261"/>
+            <ac:spMk id="1030" creationId="{426B127E-6498-4C77-9C9D-4553A5113B80}"/>
+          </ac:spMkLst>
+        </pc:spChg>
+        <pc:spChg chg="add del">
+          <ac:chgData name="Hunter Ceranic" userId="55b8025d37c61089" providerId="LiveId" clId="{ACCD79ED-BFAE-4857-8FB5-603E641725DE}" dt="2024-01-23T21:45:55.687" v="687" actId="26606"/>
+          <ac:spMkLst>
+            <pc:docMk/>
+            <pc:sldMk cId="464311981" sldId="261"/>
+            <ac:spMk id="1031" creationId="{DB304A14-32D0-4873-B914-423ED7B8DAFD}"/>
+          </ac:spMkLst>
+        </pc:spChg>
+        <pc:spChg chg="add del">
+          <ac:chgData name="Hunter Ceranic" userId="55b8025d37c61089" providerId="LiveId" clId="{ACCD79ED-BFAE-4857-8FB5-603E641725DE}" dt="2024-01-23T21:45:55.687" v="687" actId="26606"/>
+          <ac:spMkLst>
+            <pc:docMk/>
+            <pc:sldMk cId="464311981" sldId="261"/>
+            <ac:spMk id="1033" creationId="{1D460C86-854F-4FB3-ABC2-E823D8FEB9DB}"/>
+          </ac:spMkLst>
+        </pc:spChg>
+        <pc:spChg chg="add del">
+          <ac:chgData name="Hunter Ceranic" userId="55b8025d37c61089" providerId="LiveId" clId="{ACCD79ED-BFAE-4857-8FB5-603E641725DE}" dt="2024-01-23T21:45:55.687" v="687" actId="26606"/>
+          <ac:spMkLst>
+            <pc:docMk/>
+            <pc:sldMk cId="464311981" sldId="261"/>
+            <ac:spMk id="1035" creationId="{BB48116A-278A-4CC5-89D3-9DE8E8FF1245}"/>
+          </ac:spMkLst>
+        </pc:spChg>
+        <pc:spChg chg="add del">
+          <ac:chgData name="Hunter Ceranic" userId="55b8025d37c61089" providerId="LiveId" clId="{ACCD79ED-BFAE-4857-8FB5-603E641725DE}" dt="2024-01-23T21:45:46.681" v="684" actId="26606"/>
+          <ac:spMkLst>
+            <pc:docMk/>
+            <pc:sldMk cId="464311981" sldId="261"/>
+            <ac:spMk id="1040" creationId="{9F8A656C-0806-4677-A38B-DA5DF0F3C406}"/>
+          </ac:spMkLst>
+        </pc:spChg>
+        <pc:spChg chg="add del">
+          <ac:chgData name="Hunter Ceranic" userId="55b8025d37c61089" providerId="LiveId" clId="{ACCD79ED-BFAE-4857-8FB5-603E641725DE}" dt="2024-01-23T21:45:46.681" v="684" actId="26606"/>
+          <ac:spMkLst>
+            <pc:docMk/>
+            <pc:sldMk cId="464311981" sldId="261"/>
+            <ac:spMk id="1042" creationId="{9BEF8C6D-8BB3-473A-9607-D7381CC5C0A5}"/>
+          </ac:spMkLst>
+        </pc:spChg>
+        <pc:spChg chg="add del">
+          <ac:chgData name="Hunter Ceranic" userId="55b8025d37c61089" providerId="LiveId" clId="{ACCD79ED-BFAE-4857-8FB5-603E641725DE}" dt="2024-01-23T21:45:46.681" v="684" actId="26606"/>
+          <ac:spMkLst>
+            <pc:docMk/>
+            <pc:sldMk cId="464311981" sldId="261"/>
+            <ac:spMk id="1044" creationId="{DCFDFFB9-D302-4A05-A770-D33232254722}"/>
+          </ac:spMkLst>
+        </pc:spChg>
+        <pc:spChg chg="add del">
+          <ac:chgData name="Hunter Ceranic" userId="55b8025d37c61089" providerId="LiveId" clId="{ACCD79ED-BFAE-4857-8FB5-603E641725DE}" dt="2024-01-23T21:45:54.705" v="686" actId="26606"/>
+          <ac:spMkLst>
+            <pc:docMk/>
+            <pc:sldMk cId="464311981" sldId="261"/>
+            <ac:spMk id="1046" creationId="{5B7778FC-632E-4DCA-A7CB-0D7731CCF970}"/>
+          </ac:spMkLst>
+        </pc:spChg>
+        <pc:spChg chg="add del">
+          <ac:chgData name="Hunter Ceranic" userId="55b8025d37c61089" providerId="LiveId" clId="{ACCD79ED-BFAE-4857-8FB5-603E641725DE}" dt="2024-01-23T21:45:54.705" v="686" actId="26606"/>
+          <ac:spMkLst>
+            <pc:docMk/>
+            <pc:sldMk cId="464311981" sldId="261"/>
+            <ac:spMk id="1047" creationId="{66A3F9DB-B144-47A4-9DB2-706C3908B28B}"/>
+          </ac:spMkLst>
+        </pc:spChg>
+        <pc:spChg chg="add del">
+          <ac:chgData name="Hunter Ceranic" userId="55b8025d37c61089" providerId="LiveId" clId="{ACCD79ED-BFAE-4857-8FB5-603E641725DE}" dt="2024-01-23T21:45:54.705" v="686" actId="26606"/>
+          <ac:spMkLst>
+            <pc:docMk/>
+            <pc:sldMk cId="464311981" sldId="261"/>
+            <ac:spMk id="1048" creationId="{FA23A907-97FB-4A8F-880A-DD77401C4296}"/>
+          </ac:spMkLst>
+        </pc:spChg>
+        <pc:spChg chg="add del">
+          <ac:chgData name="Hunter Ceranic" userId="55b8025d37c61089" providerId="LiveId" clId="{ACCD79ED-BFAE-4857-8FB5-603E641725DE}" dt="2024-01-23T21:45:54.705" v="686" actId="26606"/>
+          <ac:spMkLst>
+            <pc:docMk/>
+            <pc:sldMk cId="464311981" sldId="261"/>
+            <ac:spMk id="1049" creationId="{3D9A74CD-249A-437B-A289-413676038C54}"/>
+          </ac:spMkLst>
+        </pc:spChg>
+        <pc:spChg chg="add del">
+          <ac:chgData name="Hunter Ceranic" userId="55b8025d37c61089" providerId="LiveId" clId="{ACCD79ED-BFAE-4857-8FB5-603E641725DE}" dt="2024-01-23T21:45:54.705" v="686" actId="26606"/>
+          <ac:spMkLst>
+            <pc:docMk/>
+            <pc:sldMk cId="464311981" sldId="261"/>
+            <ac:spMk id="1050" creationId="{B10BB131-AC8E-4A8E-A5D1-36260F720C3B}"/>
+          </ac:spMkLst>
+        </pc:spChg>
+        <pc:picChg chg="add mod ord">
+          <ac:chgData name="Hunter Ceranic" userId="55b8025d37c61089" providerId="LiveId" clId="{ACCD79ED-BFAE-4857-8FB5-603E641725DE}" dt="2024-01-23T21:47:14.701" v="707" actId="1076"/>
+          <ac:picMkLst>
+            <pc:docMk/>
+            <pc:sldMk cId="464311981" sldId="261"/>
+            <ac:picMk id="1026" creationId="{70ADD003-1E8C-44BA-531E-AC9C8AB34361}"/>
+          </ac:picMkLst>
+        </pc:picChg>
+      </pc:sldChg>
+      <pc:sldChg chg="modSp new del mod">
+        <pc:chgData name="Hunter Ceranic" userId="55b8025d37c61089" providerId="LiveId" clId="{ACCD79ED-BFAE-4857-8FB5-603E641725DE}" dt="2024-01-23T20:13:23.600" v="214" actId="47"/>
+        <pc:sldMkLst>
+          <pc:docMk/>
+          <pc:sldMk cId="3707100649" sldId="261"/>
+        </pc:sldMkLst>
+        <pc:spChg chg="mod">
+          <ac:chgData name="Hunter Ceranic" userId="55b8025d37c61089" providerId="LiveId" clId="{ACCD79ED-BFAE-4857-8FB5-603E641725DE}" dt="2024-01-23T20:13:20.100" v="213" actId="20577"/>
+          <ac:spMkLst>
+            <pc:docMk/>
+            <pc:sldMk cId="3707100649" sldId="261"/>
+            <ac:spMk id="2" creationId="{9D3A01FA-204E-455B-9EFB-5F0C2BD527F6}"/>
+          </ac:spMkLst>
+        </pc:spChg>
+      </pc:sldChg>
+      <pc:sldChg chg="addSp delSp modSp new mod">
+        <pc:chgData name="Hunter Ceranic" userId="55b8025d37c61089" providerId="LiveId" clId="{ACCD79ED-BFAE-4857-8FB5-603E641725DE}" dt="2024-01-25T18:40:01.439" v="3766" actId="20577"/>
+        <pc:sldMkLst>
+          <pc:docMk/>
+          <pc:sldMk cId="1282139663" sldId="262"/>
+        </pc:sldMkLst>
+        <pc:spChg chg="mod">
+          <ac:chgData name="Hunter Ceranic" userId="55b8025d37c61089" providerId="LiveId" clId="{ACCD79ED-BFAE-4857-8FB5-603E641725DE}" dt="2024-01-23T22:58:15.844" v="2034" actId="20577"/>
+          <ac:spMkLst>
+            <pc:docMk/>
+            <pc:sldMk cId="1282139663" sldId="262"/>
+            <ac:spMk id="2" creationId="{C7DF1014-ECEC-7D05-6120-59AD338C5A43}"/>
+          </ac:spMkLst>
+        </pc:spChg>
+        <pc:spChg chg="del">
+          <ac:chgData name="Hunter Ceranic" userId="55b8025d37c61089" providerId="LiveId" clId="{ACCD79ED-BFAE-4857-8FB5-603E641725DE}" dt="2024-01-23T23:05:33.657" v="2066" actId="22"/>
+          <ac:spMkLst>
+            <pc:docMk/>
+            <pc:sldMk cId="1282139663" sldId="262"/>
+            <ac:spMk id="3" creationId="{59C5325B-F8B9-2637-BA82-958759232544}"/>
+          </ac:spMkLst>
+        </pc:spChg>
+        <pc:spChg chg="add del mod">
+          <ac:chgData name="Hunter Ceranic" userId="55b8025d37c61089" providerId="LiveId" clId="{ACCD79ED-BFAE-4857-8FB5-603E641725DE}" dt="2024-01-25T18:20:46.932" v="2967"/>
+          <ac:spMkLst>
+            <pc:docMk/>
+            <pc:sldMk cId="1282139663" sldId="262"/>
+            <ac:spMk id="3" creationId="{ECC3CD7B-F688-43CC-85A5-F53C9476B355}"/>
+          </ac:spMkLst>
+        </pc:spChg>
+        <pc:spChg chg="del">
+          <ac:chgData name="Hunter Ceranic" userId="55b8025d37c61089" providerId="LiveId" clId="{ACCD79ED-BFAE-4857-8FB5-603E641725DE}" dt="2024-01-23T23:02:29.485" v="2054" actId="478"/>
+          <ac:spMkLst>
+            <pc:docMk/>
+            <pc:sldMk cId="1282139663" sldId="262"/>
+            <ac:spMk id="4" creationId="{75F6C9A0-FC62-99D8-A1BC-30B9E3E9DEC5}"/>
+          </ac:spMkLst>
+        </pc:spChg>
+        <pc:spChg chg="add mod">
+          <ac:chgData name="Hunter Ceranic" userId="55b8025d37c61089" providerId="LiveId" clId="{ACCD79ED-BFAE-4857-8FB5-603E641725DE}" dt="2024-01-25T18:40:01.439" v="3766" actId="20577"/>
+          <ac:spMkLst>
+            <pc:docMk/>
+            <pc:sldMk cId="1282139663" sldId="262"/>
+            <ac:spMk id="4" creationId="{879D1B30-BABA-4E25-8DC7-414D66E57876}"/>
+          </ac:spMkLst>
+        </pc:spChg>
+        <pc:spChg chg="add mod">
+          <ac:chgData name="Hunter Ceranic" userId="55b8025d37c61089" providerId="LiveId" clId="{ACCD79ED-BFAE-4857-8FB5-603E641725DE}" dt="2024-01-23T23:28:45.721" v="2167" actId="20577"/>
+          <ac:spMkLst>
+            <pc:docMk/>
+            <pc:sldMk cId="1282139663" sldId="262"/>
+            <ac:spMk id="5" creationId="{1C012839-D1DE-7D8C-C13D-1405FD0457A8}"/>
+          </ac:spMkLst>
+        </pc:spChg>
+        <pc:spChg chg="add del mod">
+          <ac:chgData name="Hunter Ceranic" userId="55b8025d37c61089" providerId="LiveId" clId="{ACCD79ED-BFAE-4857-8FB5-603E641725DE}" dt="2024-01-25T18:23:37.451" v="3115" actId="478"/>
+          <ac:spMkLst>
+            <pc:docMk/>
+            <pc:sldMk cId="1282139663" sldId="262"/>
+            <ac:spMk id="8" creationId="{4B460578-77A7-3F34-E220-6441A40FB3FE}"/>
+          </ac:spMkLst>
+        </pc:spChg>
+        <pc:spChg chg="add mod">
+          <ac:chgData name="Hunter Ceranic" userId="55b8025d37c61089" providerId="LiveId" clId="{ACCD79ED-BFAE-4857-8FB5-603E641725DE}" dt="2024-01-25T18:28:58.057" v="3279" actId="20577"/>
+          <ac:spMkLst>
+            <pc:docMk/>
+            <pc:sldMk cId="1282139663" sldId="262"/>
+            <ac:spMk id="10" creationId="{F2FFC939-605E-CFC2-B711-0B24C4C1DF3D}"/>
+          </ac:spMkLst>
+        </pc:spChg>
+        <pc:grpChg chg="add mod">
+          <ac:chgData name="Hunter Ceranic" userId="55b8025d37c61089" providerId="LiveId" clId="{ACCD79ED-BFAE-4857-8FB5-603E641725DE}" dt="2024-01-25T18:23:30.185" v="3112" actId="1076"/>
+          <ac:grpSpMkLst>
+            <pc:docMk/>
+            <pc:sldMk cId="1282139663" sldId="262"/>
+            <ac:grpSpMk id="15" creationId="{8BF43C64-2CCA-9F17-AB62-3165ADE233AB}"/>
+          </ac:grpSpMkLst>
+        </pc:grpChg>
+        <pc:picChg chg="add mod">
+          <ac:chgData name="Hunter Ceranic" userId="55b8025d37c61089" providerId="LiveId" clId="{ACCD79ED-BFAE-4857-8FB5-603E641725DE}" dt="2024-01-25T18:23:10.562" v="3108" actId="1076"/>
+          <ac:picMkLst>
+            <pc:docMk/>
+            <pc:sldMk cId="1282139663" sldId="262"/>
+            <ac:picMk id="7" creationId="{CAE9B0C0-7090-D085-8979-B49AF6DAF264}"/>
+          </ac:picMkLst>
+        </pc:picChg>
+        <pc:picChg chg="add mod">
+          <ac:chgData name="Hunter Ceranic" userId="55b8025d37c61089" providerId="LiveId" clId="{ACCD79ED-BFAE-4857-8FB5-603E641725DE}" dt="2024-01-25T18:23:10.562" v="3108" actId="1076"/>
+          <ac:picMkLst>
+            <pc:docMk/>
+            <pc:sldMk cId="1282139663" sldId="262"/>
+            <ac:picMk id="9" creationId="{4C1A88EA-8389-DD90-1A57-B3C56972839A}"/>
+          </ac:picMkLst>
+        </pc:picChg>
+        <pc:picChg chg="add mod ord">
+          <ac:chgData name="Hunter Ceranic" userId="55b8025d37c61089" providerId="LiveId" clId="{ACCD79ED-BFAE-4857-8FB5-603E641725DE}" dt="2024-01-25T18:23:30.185" v="3112" actId="1076"/>
+          <ac:picMkLst>
+            <pc:docMk/>
+            <pc:sldMk cId="1282139663" sldId="262"/>
+            <ac:picMk id="11" creationId="{3069CF3F-2488-0D3C-36B1-96C29EF328C3}"/>
+          </ac:picMkLst>
+        </pc:picChg>
+        <pc:picChg chg="add mod">
+          <ac:chgData name="Hunter Ceranic" userId="55b8025d37c61089" providerId="LiveId" clId="{ACCD79ED-BFAE-4857-8FB5-603E641725DE}" dt="2024-01-23T23:07:10.901" v="2086" actId="164"/>
+          <ac:picMkLst>
+            <pc:docMk/>
+            <pc:sldMk cId="1282139663" sldId="262"/>
+            <ac:picMk id="12" creationId="{1D66D614-DB0E-70BC-5CE5-E90ACF60A7ED}"/>
+          </ac:picMkLst>
+        </pc:picChg>
+        <pc:picChg chg="add mod">
+          <ac:chgData name="Hunter Ceranic" userId="55b8025d37c61089" providerId="LiveId" clId="{ACCD79ED-BFAE-4857-8FB5-603E641725DE}" dt="2024-01-23T23:07:10.901" v="2086" actId="164"/>
+          <ac:picMkLst>
+            <pc:docMk/>
+            <pc:sldMk cId="1282139663" sldId="262"/>
+            <ac:picMk id="14" creationId="{FC818FE4-B411-1A79-4D4F-931900CDC4FD}"/>
+          </ac:picMkLst>
+        </pc:picChg>
+        <pc:picChg chg="add mod">
+          <ac:chgData name="Hunter Ceranic" userId="55b8025d37c61089" providerId="LiveId" clId="{ACCD79ED-BFAE-4857-8FB5-603E641725DE}" dt="2024-01-25T18:23:30.185" v="3112" actId="1076"/>
+          <ac:picMkLst>
+            <pc:docMk/>
+            <pc:sldMk cId="1282139663" sldId="262"/>
+            <ac:picMk id="17" creationId="{8924486C-65A4-1784-1B5D-76149A672E25}"/>
+          </ac:picMkLst>
+        </pc:picChg>
+        <pc:picChg chg="add mod">
+          <ac:chgData name="Hunter Ceranic" userId="55b8025d37c61089" providerId="LiveId" clId="{ACCD79ED-BFAE-4857-8FB5-603E641725DE}" dt="2024-01-25T18:23:30.185" v="3112" actId="1076"/>
+          <ac:picMkLst>
+            <pc:docMk/>
+            <pc:sldMk cId="1282139663" sldId="262"/>
+            <ac:picMk id="19" creationId="{05A4DA08-7B97-9D43-0DBC-42C46123E6FC}"/>
+          </ac:picMkLst>
+        </pc:picChg>
+      </pc:sldChg>
+      <pc:sldChg chg="addSp delSp modSp add mod">
+        <pc:chgData name="Hunter Ceranic" userId="55b8025d37c61089" providerId="LiveId" clId="{ACCD79ED-BFAE-4857-8FB5-603E641725DE}" dt="2024-01-25T18:35:54.266" v="3602" actId="20577"/>
+        <pc:sldMkLst>
+          <pc:docMk/>
+          <pc:sldMk cId="3991598736" sldId="263"/>
+        </pc:sldMkLst>
+        <pc:spChg chg="mod">
+          <ac:chgData name="Hunter Ceranic" userId="55b8025d37c61089" providerId="LiveId" clId="{ACCD79ED-BFAE-4857-8FB5-603E641725DE}" dt="2024-01-23T23:23:23.894" v="2157" actId="1076"/>
+          <ac:spMkLst>
+            <pc:docMk/>
+            <pc:sldMk cId="3991598736" sldId="263"/>
+            <ac:spMk id="2" creationId="{C7DF1014-ECEC-7D05-6120-59AD338C5A43}"/>
+          </ac:spMkLst>
+        </pc:spChg>
+        <pc:spChg chg="mod">
+          <ac:chgData name="Hunter Ceranic" userId="55b8025d37c61089" providerId="LiveId" clId="{ACCD79ED-BFAE-4857-8FB5-603E641725DE}" dt="2024-01-23T23:28:50.673" v="2169" actId="20577"/>
+          <ac:spMkLst>
+            <pc:docMk/>
+            <pc:sldMk cId="3991598736" sldId="263"/>
+            <ac:spMk id="5" creationId="{1C012839-D1DE-7D8C-C13D-1405FD0457A8}"/>
+          </ac:spMkLst>
+        </pc:spChg>
+        <pc:spChg chg="add mod">
+          <ac:chgData name="Hunter Ceranic" userId="55b8025d37c61089" providerId="LiveId" clId="{ACCD79ED-BFAE-4857-8FB5-603E641725DE}" dt="2024-01-25T18:30:27.245" v="3389" actId="1076"/>
+          <ac:spMkLst>
+            <pc:docMk/>
+            <pc:sldMk cId="3991598736" sldId="263"/>
+            <ac:spMk id="7" creationId="{22456EFC-985E-970A-C327-2EB845063E37}"/>
+          </ac:spMkLst>
+        </pc:spChg>
+        <pc:spChg chg="add del mod">
+          <ac:chgData name="Hunter Ceranic" userId="55b8025d37c61089" providerId="LiveId" clId="{ACCD79ED-BFAE-4857-8FB5-603E641725DE}" dt="2024-01-25T18:31:39.591" v="3443" actId="478"/>
+          <ac:spMkLst>
+            <pc:docMk/>
+            <pc:sldMk cId="3991598736" sldId="263"/>
+            <ac:spMk id="9" creationId="{3F2C67EA-5276-6446-ED9E-06A767E64FA6}"/>
+          </ac:spMkLst>
+        </pc:spChg>
+        <pc:spChg chg="add del mod">
+          <ac:chgData name="Hunter Ceranic" userId="55b8025d37c61089" providerId="LiveId" clId="{ACCD79ED-BFAE-4857-8FB5-603E641725DE}" dt="2024-01-25T18:31:38.302" v="3442" actId="478"/>
+          <ac:spMkLst>
+            <pc:docMk/>
+            <pc:sldMk cId="3991598736" sldId="263"/>
+            <ac:spMk id="11" creationId="{4FFC0959-86ED-0779-02C5-C3A8D5996D11}"/>
+          </ac:spMkLst>
+        </pc:spChg>
+        <pc:spChg chg="add del mod">
+          <ac:chgData name="Hunter Ceranic" userId="55b8025d37c61089" providerId="LiveId" clId="{ACCD79ED-BFAE-4857-8FB5-603E641725DE}" dt="2024-01-23T23:17:50.713" v="2105" actId="478"/>
+          <ac:spMkLst>
+            <pc:docMk/>
+            <pc:sldMk cId="3991598736" sldId="263"/>
+            <ac:spMk id="13" creationId="{63C58497-E746-C9F9-0306-6697E82AD78F}"/>
+          </ac:spMkLst>
+        </pc:spChg>
+        <pc:spChg chg="add mod">
+          <ac:chgData name="Hunter Ceranic" userId="55b8025d37c61089" providerId="LiveId" clId="{ACCD79ED-BFAE-4857-8FB5-603E641725DE}" dt="2024-01-25T18:31:32.793" v="3437" actId="1076"/>
+          <ac:spMkLst>
+            <pc:docMk/>
+            <pc:sldMk cId="3991598736" sldId="263"/>
+            <ac:spMk id="13" creationId="{E43FED9A-2A92-4571-1C1C-6656F34985C2}"/>
+          </ac:spMkLst>
+        </pc:spChg>
+        <pc:spChg chg="add mod">
+          <ac:chgData name="Hunter Ceranic" userId="55b8025d37c61089" providerId="LiveId" clId="{ACCD79ED-BFAE-4857-8FB5-603E641725DE}" dt="2024-01-25T18:34:40.932" v="3481" actId="20577"/>
+          <ac:spMkLst>
+            <pc:docMk/>
+            <pc:sldMk cId="3991598736" sldId="263"/>
+            <ac:spMk id="16" creationId="{EED00A11-2962-E5ED-5BC0-9866E16ACA9D}"/>
+          </ac:spMkLst>
+        </pc:spChg>
+        <pc:spChg chg="add mod">
+          <ac:chgData name="Hunter Ceranic" userId="55b8025d37c61089" providerId="LiveId" clId="{ACCD79ED-BFAE-4857-8FB5-603E641725DE}" dt="2024-01-25T18:35:54.266" v="3602" actId="20577"/>
+          <ac:spMkLst>
+            <pc:docMk/>
+            <pc:sldMk cId="3991598736" sldId="263"/>
+            <ac:spMk id="20" creationId="{83EB794A-CC3C-62A8-A283-6C146460011C}"/>
+          </ac:spMkLst>
+        </pc:spChg>
+        <pc:spChg chg="add mod">
+          <ac:chgData name="Hunter Ceranic" userId="55b8025d37c61089" providerId="LiveId" clId="{ACCD79ED-BFAE-4857-8FB5-603E641725DE}" dt="2024-01-23T23:23:13.581" v="2155" actId="164"/>
+          <ac:spMkLst>
+            <pc:docMk/>
+            <pc:sldMk cId="3991598736" sldId="263"/>
+            <ac:spMk id="24" creationId="{EB34267C-288C-639B-66A1-4905FC7EC930}"/>
+          </ac:spMkLst>
+        </pc:spChg>
+        <pc:grpChg chg="add mod">
+          <ac:chgData name="Hunter Ceranic" userId="55b8025d37c61089" providerId="LiveId" clId="{ACCD79ED-BFAE-4857-8FB5-603E641725DE}" dt="2024-01-25T18:29:45.977" v="3281" actId="1076"/>
+          <ac:grpSpMkLst>
+            <pc:docMk/>
+            <pc:sldMk cId="3991598736" sldId="263"/>
+            <ac:grpSpMk id="4" creationId="{C8DB01BA-7B2F-4507-076E-3088CE34B57D}"/>
+          </ac:grpSpMkLst>
+        </pc:grpChg>
+        <pc:grpChg chg="del mod">
+          <ac:chgData name="Hunter Ceranic" userId="55b8025d37c61089" providerId="LiveId" clId="{ACCD79ED-BFAE-4857-8FB5-603E641725DE}" dt="2024-01-23T23:17:48.564" v="2103" actId="478"/>
+          <ac:grpSpMkLst>
+            <pc:docMk/>
+            <pc:sldMk cId="3991598736" sldId="263"/>
+            <ac:grpSpMk id="15" creationId="{8BF43C64-2CCA-9F17-AB62-3165ADE233AB}"/>
+          </ac:grpSpMkLst>
+        </pc:grpChg>
+        <pc:grpChg chg="add mod">
+          <ac:chgData name="Hunter Ceranic" userId="55b8025d37c61089" providerId="LiveId" clId="{ACCD79ED-BFAE-4857-8FB5-603E641725DE}" dt="2024-01-25T18:31:32.793" v="3437" actId="1076"/>
+          <ac:grpSpMkLst>
+            <pc:docMk/>
+            <pc:sldMk cId="3991598736" sldId="263"/>
+            <ac:grpSpMk id="25" creationId="{60D647CB-16C3-AAA2-9107-5D1150C5A87B}"/>
+          </ac:grpSpMkLst>
+        </pc:grpChg>
+        <pc:picChg chg="add mod">
+          <ac:chgData name="Hunter Ceranic" userId="55b8025d37c61089" providerId="LiveId" clId="{ACCD79ED-BFAE-4857-8FB5-603E641725DE}" dt="2024-01-25T18:29:45.977" v="3281" actId="1076"/>
+          <ac:picMkLst>
+            <pc:docMk/>
+            <pc:sldMk cId="3991598736" sldId="263"/>
+            <ac:picMk id="3" creationId="{188D2A99-F2E5-CD1E-1A92-A24E47DCB195}"/>
+          </ac:picMkLst>
+        </pc:picChg>
+        <pc:picChg chg="mod">
+          <ac:chgData name="Hunter Ceranic" userId="55b8025d37c61089" providerId="LiveId" clId="{ACCD79ED-BFAE-4857-8FB5-603E641725DE}" dt="2024-01-23T23:17:38.209" v="2098" actId="571"/>
+          <ac:picMkLst>
+            <pc:docMk/>
+            <pc:sldMk cId="3991598736" sldId="263"/>
+            <ac:picMk id="6" creationId="{FDE3D38A-9C66-6F73-2041-023FA88F7996}"/>
+          </ac:picMkLst>
+        </pc:picChg>
+        <pc:picChg chg="del">
+          <ac:chgData name="Hunter Ceranic" userId="55b8025d37c61089" providerId="LiveId" clId="{ACCD79ED-BFAE-4857-8FB5-603E641725DE}" dt="2024-01-23T23:16:55.113" v="2094" actId="478"/>
+          <ac:picMkLst>
+            <pc:docMk/>
+            <pc:sldMk cId="3991598736" sldId="263"/>
+            <ac:picMk id="7" creationId="{CAE9B0C0-7090-D085-8979-B49AF6DAF264}"/>
+          </ac:picMkLst>
+        </pc:picChg>
+        <pc:picChg chg="mod">
+          <ac:chgData name="Hunter Ceranic" userId="55b8025d37c61089" providerId="LiveId" clId="{ACCD79ED-BFAE-4857-8FB5-603E641725DE}" dt="2024-01-23T23:17:38.209" v="2098" actId="571"/>
+          <ac:picMkLst>
+            <pc:docMk/>
+            <pc:sldMk cId="3991598736" sldId="263"/>
+            <ac:picMk id="8" creationId="{F9DC0517-381E-8C68-0772-9D311F56BD9D}"/>
+          </ac:picMkLst>
+        </pc:picChg>
+        <pc:picChg chg="del">
+          <ac:chgData name="Hunter Ceranic" userId="55b8025d37c61089" providerId="LiveId" clId="{ACCD79ED-BFAE-4857-8FB5-603E641725DE}" dt="2024-01-23T23:16:56.611" v="2095" actId="478"/>
+          <ac:picMkLst>
+            <pc:docMk/>
+            <pc:sldMk cId="3991598736" sldId="263"/>
+            <ac:picMk id="9" creationId="{4C1A88EA-8389-DD90-1A57-B3C56972839A}"/>
+          </ac:picMkLst>
+        </pc:picChg>
+        <pc:picChg chg="add del mod">
+          <ac:chgData name="Hunter Ceranic" userId="55b8025d37c61089" providerId="LiveId" clId="{ACCD79ED-BFAE-4857-8FB5-603E641725DE}" dt="2024-01-25T18:31:35.133" v="3438" actId="478"/>
+          <ac:picMkLst>
+            <pc:docMk/>
+            <pc:sldMk cId="3991598736" sldId="263"/>
+            <ac:picMk id="10" creationId="{FE6021C7-3858-9194-3F46-1860A92FDA46}"/>
+          </ac:picMkLst>
+        </pc:picChg>
+        <pc:picChg chg="del mod">
+          <ac:chgData name="Hunter Ceranic" userId="55b8025d37c61089" providerId="LiveId" clId="{ACCD79ED-BFAE-4857-8FB5-603E641725DE}" dt="2024-01-23T23:17:46.143" v="2101" actId="478"/>
+          <ac:picMkLst>
+            <pc:docMk/>
+            <pc:sldMk cId="3991598736" sldId="263"/>
+            <ac:picMk id="11" creationId="{3069CF3F-2488-0D3C-36B1-96C29EF328C3}"/>
+          </ac:picMkLst>
+        </pc:picChg>
+        <pc:picChg chg="add mod">
+          <ac:chgData name="Hunter Ceranic" userId="55b8025d37c61089" providerId="LiveId" clId="{ACCD79ED-BFAE-4857-8FB5-603E641725DE}" dt="2024-01-25T18:31:32.793" v="3437" actId="1076"/>
+          <ac:picMkLst>
+            <pc:docMk/>
+            <pc:sldMk cId="3991598736" sldId="263"/>
+            <ac:picMk id="12" creationId="{DF53D8E0-B665-2D4A-348D-B47AFE9708C9}"/>
+          </ac:picMkLst>
+        </pc:picChg>
+        <pc:picChg chg="add mod">
+          <ac:chgData name="Hunter Ceranic" userId="55b8025d37c61089" providerId="LiveId" clId="{ACCD79ED-BFAE-4857-8FB5-603E641725DE}" dt="2024-01-25T18:34:55.793" v="3488" actId="1076"/>
+          <ac:picMkLst>
+            <pc:docMk/>
+            <pc:sldMk cId="3991598736" sldId="263"/>
+            <ac:picMk id="15" creationId="{852CFD5C-D134-1217-A844-D8C319D5B4D9}"/>
+          </ac:picMkLst>
+        </pc:picChg>
+        <pc:picChg chg="mod">
+          <ac:chgData name="Hunter Ceranic" userId="55b8025d37c61089" providerId="LiveId" clId="{ACCD79ED-BFAE-4857-8FB5-603E641725DE}" dt="2024-01-25T18:29:45.977" v="3281" actId="1076"/>
+          <ac:picMkLst>
+            <pc:docMk/>
+            <pc:sldMk cId="3991598736" sldId="263"/>
+            <ac:picMk id="17" creationId="{8924486C-65A4-1784-1B5D-76149A672E25}"/>
+          </ac:picMkLst>
+        </pc:picChg>
+        <pc:picChg chg="add mod">
+          <ac:chgData name="Hunter Ceranic" userId="55b8025d37c61089" providerId="LiveId" clId="{ACCD79ED-BFAE-4857-8FB5-603E641725DE}" dt="2024-01-23T23:18:19.273" v="2112" actId="1076"/>
+          <ac:picMkLst>
+            <pc:docMk/>
+            <pc:sldMk cId="3991598736" sldId="263"/>
+            <ac:picMk id="18" creationId="{008207FC-5882-DC9A-0373-D4D4E6A2A2C9}"/>
+          </ac:picMkLst>
+        </pc:picChg>
+        <pc:picChg chg="add mod">
+          <ac:chgData name="Hunter Ceranic" userId="55b8025d37c61089" providerId="LiveId" clId="{ACCD79ED-BFAE-4857-8FB5-603E641725DE}" dt="2024-01-25T18:29:45.977" v="3281" actId="1076"/>
+          <ac:picMkLst>
+            <pc:docMk/>
+            <pc:sldMk cId="3991598736" sldId="263"/>
+            <ac:picMk id="19" creationId="{C472703C-E5CB-485B-1C4B-6C06C353025B}"/>
+          </ac:picMkLst>
+        </pc:picChg>
+        <pc:picChg chg="add del mod">
+          <ac:chgData name="Hunter Ceranic" userId="55b8025d37c61089" providerId="LiveId" clId="{ACCD79ED-BFAE-4857-8FB5-603E641725DE}" dt="2024-01-25T18:31:35.859" v="3440" actId="478"/>
+          <ac:picMkLst>
+            <pc:docMk/>
+            <pc:sldMk cId="3991598736" sldId="263"/>
+            <ac:picMk id="21" creationId="{22BCAE72-C73D-9A1B-AD54-EF4BE002B961}"/>
+          </ac:picMkLst>
+        </pc:picChg>
+        <pc:picChg chg="add mod">
+          <ac:chgData name="Hunter Ceranic" userId="55b8025d37c61089" providerId="LiveId" clId="{ACCD79ED-BFAE-4857-8FB5-603E641725DE}" dt="2024-01-23T23:23:13.581" v="2155" actId="164"/>
+          <ac:picMkLst>
+            <pc:docMk/>
+            <pc:sldMk cId="3991598736" sldId="263"/>
+            <ac:picMk id="23" creationId="{D5A7F495-D13B-6671-931E-84CDD5F86A04}"/>
+          </ac:picMkLst>
+        </pc:picChg>
+        <pc:cxnChg chg="add del">
+          <ac:chgData name="Hunter Ceranic" userId="55b8025d37c61089" providerId="LiveId" clId="{ACCD79ED-BFAE-4857-8FB5-603E641725DE}" dt="2024-01-23T23:23:40.994" v="2159" actId="11529"/>
+          <ac:cxnSpMkLst>
+            <pc:docMk/>
+            <pc:sldMk cId="3991598736" sldId="263"/>
+            <ac:cxnSpMk id="27" creationId="{9968B0D0-7ADE-3600-D321-29F36A077B89}"/>
+          </ac:cxnSpMkLst>
+        </pc:cxnChg>
+      </pc:sldChg>
+      <pc:sldChg chg="addSp delSp modSp new mod setBg modClrScheme addAnim setClrOvrMap chgLayout">
+        <pc:chgData name="Hunter Ceranic" userId="55b8025d37c61089" providerId="LiveId" clId="{ACCD79ED-BFAE-4857-8FB5-603E641725DE}" dt="2024-01-25T18:38:04.545" v="3720" actId="20577"/>
+        <pc:sldMkLst>
+          <pc:docMk/>
+          <pc:sldMk cId="998881358" sldId="264"/>
+        </pc:sldMkLst>
+        <pc:spChg chg="del mod ord">
+          <ac:chgData name="Hunter Ceranic" userId="55b8025d37c61089" providerId="LiveId" clId="{ACCD79ED-BFAE-4857-8FB5-603E641725DE}" dt="2024-01-25T18:37:29.838" v="3664" actId="700"/>
+          <ac:spMkLst>
+            <pc:docMk/>
+            <pc:sldMk cId="998881358" sldId="264"/>
+            <ac:spMk id="2" creationId="{0EC9A651-EBA2-BCC3-50E8-143A868D23F0}"/>
+          </ac:spMkLst>
+        </pc:spChg>
+        <pc:spChg chg="del mod ord">
+          <ac:chgData name="Hunter Ceranic" userId="55b8025d37c61089" providerId="LiveId" clId="{ACCD79ED-BFAE-4857-8FB5-603E641725DE}" dt="2024-01-25T18:37:29.838" v="3664" actId="700"/>
+          <ac:spMkLst>
+            <pc:docMk/>
+            <pc:sldMk cId="998881358" sldId="264"/>
+            <ac:spMk id="3" creationId="{B3A338AE-D5B8-D9CA-36E4-B21C2987CA31}"/>
+          </ac:spMkLst>
+        </pc:spChg>
+        <pc:spChg chg="mod ord">
+          <ac:chgData name="Hunter Ceranic" userId="55b8025d37c61089" providerId="LiveId" clId="{ACCD79ED-BFAE-4857-8FB5-603E641725DE}" dt="2024-01-25T18:37:57.008" v="3715" actId="26606"/>
+          <ac:spMkLst>
+            <pc:docMk/>
+            <pc:sldMk cId="998881358" sldId="264"/>
+            <ac:spMk id="4" creationId="{C453327A-C23C-C9D1-22BB-AE6780AE9D55}"/>
+          </ac:spMkLst>
+        </pc:spChg>
+        <pc:spChg chg="add mod ord">
+          <ac:chgData name="Hunter Ceranic" userId="55b8025d37c61089" providerId="LiveId" clId="{ACCD79ED-BFAE-4857-8FB5-603E641725DE}" dt="2024-01-25T18:37:57.008" v="3715" actId="26606"/>
+          <ac:spMkLst>
+            <pc:docMk/>
+            <pc:sldMk cId="998881358" sldId="264"/>
+            <ac:spMk id="5" creationId="{49CB1C78-12AF-9A3C-FA38-1ECA637CC7AB}"/>
+          </ac:spMkLst>
+        </pc:spChg>
+        <pc:spChg chg="add mod ord">
+          <ac:chgData name="Hunter Ceranic" userId="55b8025d37c61089" providerId="LiveId" clId="{ACCD79ED-BFAE-4857-8FB5-603E641725DE}" dt="2024-01-25T18:38:04.545" v="3720" actId="20577"/>
+          <ac:spMkLst>
+            <pc:docMk/>
+            <pc:sldMk cId="998881358" sldId="264"/>
+            <ac:spMk id="6" creationId="{666762D2-772A-C48E-C9CF-8B510F2FA513}"/>
+          </ac:spMkLst>
+        </pc:spChg>
+        <pc:spChg chg="add">
+          <ac:chgData name="Hunter Ceranic" userId="55b8025d37c61089" providerId="LiveId" clId="{ACCD79ED-BFAE-4857-8FB5-603E641725DE}" dt="2024-01-25T18:37:57.008" v="3715" actId="26606"/>
+          <ac:spMkLst>
+            <pc:docMk/>
+            <pc:sldMk cId="998881358" sldId="264"/>
+            <ac:spMk id="12" creationId="{0671A8AE-40A1-4631-A6B8-581AFF065482}"/>
+          </ac:spMkLst>
+        </pc:spChg>
+        <pc:spChg chg="add">
+          <ac:chgData name="Hunter Ceranic" userId="55b8025d37c61089" providerId="LiveId" clId="{ACCD79ED-BFAE-4857-8FB5-603E641725DE}" dt="2024-01-25T18:37:57.008" v="3715" actId="26606"/>
+          <ac:spMkLst>
+            <pc:docMk/>
+            <pc:sldMk cId="998881358" sldId="264"/>
+            <ac:spMk id="14" creationId="{A44CD100-6267-4E62-AA64-2182A3A6A1C0}"/>
+          </ac:spMkLst>
+        </pc:spChg>
+        <pc:picChg chg="add">
+          <ac:chgData name="Hunter Ceranic" userId="55b8025d37c61089" providerId="LiveId" clId="{ACCD79ED-BFAE-4857-8FB5-603E641725DE}" dt="2024-01-25T18:37:57.008" v="3715" actId="26606"/>
+          <ac:picMkLst>
+            <pc:docMk/>
+            <pc:sldMk cId="998881358" sldId="264"/>
+            <ac:picMk id="8" creationId="{6F197B8F-C90C-17EF-FBF7-04F6F2F6EF94}"/>
+          </ac:picMkLst>
+        </pc:picChg>
+      </pc:sldChg>
+      <pc:sldChg chg="new del">
+        <pc:chgData name="Hunter Ceranic" userId="55b8025d37c61089" providerId="LiveId" clId="{ACCD79ED-BFAE-4857-8FB5-603E641725DE}" dt="2024-01-26T18:32:03.346" v="3768" actId="680"/>
+        <pc:sldMkLst>
+          <pc:docMk/>
+          <pc:sldMk cId="1351124811" sldId="265"/>
+        </pc:sldMkLst>
+      </pc:sldChg>
+      <pc:sldMasterChg chg="add del addSldLayout delSldLayout">
+        <pc:chgData name="Hunter Ceranic" userId="55b8025d37c61089" providerId="LiveId" clId="{ACCD79ED-BFAE-4857-8FB5-603E641725DE}" dt="2024-01-23T20:03:02.922" v="3" actId="26606"/>
+        <pc:sldMasterMkLst>
+          <pc:docMk/>
+          <pc:sldMasterMk cId="3109401901" sldId="2147483648"/>
+        </pc:sldMasterMkLst>
+        <pc:sldLayoutChg chg="add del">
+          <pc:chgData name="Hunter Ceranic" userId="55b8025d37c61089" providerId="LiveId" clId="{ACCD79ED-BFAE-4857-8FB5-603E641725DE}" dt="2024-01-23T20:03:02.922" v="3" actId="26606"/>
+          <pc:sldLayoutMkLst>
+            <pc:docMk/>
+            <pc:sldMasterMk cId="3109401901" sldId="2147483648"/>
+            <pc:sldLayoutMk cId="513548861" sldId="2147483649"/>
+          </pc:sldLayoutMkLst>
+        </pc:sldLayoutChg>
+        <pc:sldLayoutChg chg="add del">
+          <pc:chgData name="Hunter Ceranic" userId="55b8025d37c61089" providerId="LiveId" clId="{ACCD79ED-BFAE-4857-8FB5-603E641725DE}" dt="2024-01-23T20:03:02.922" v="3" actId="26606"/>
+          <pc:sldLayoutMkLst>
+            <pc:docMk/>
+            <pc:sldMasterMk cId="3109401901" sldId="2147483648"/>
+            <pc:sldLayoutMk cId="4183330876" sldId="2147483650"/>
+          </pc:sldLayoutMkLst>
+        </pc:sldLayoutChg>
+        <pc:sldLayoutChg chg="add del">
+          <pc:chgData name="Hunter Ceranic" userId="55b8025d37c61089" providerId="LiveId" clId="{ACCD79ED-BFAE-4857-8FB5-603E641725DE}" dt="2024-01-23T20:03:02.922" v="3" actId="26606"/>
+          <pc:sldLayoutMkLst>
+            <pc:docMk/>
+            <pc:sldMasterMk cId="3109401901" sldId="2147483648"/>
+            <pc:sldLayoutMk cId="2763240192" sldId="2147483651"/>
+          </pc:sldLayoutMkLst>
+        </pc:sldLayoutChg>
+        <pc:sldLayoutChg chg="add del">
+          <pc:chgData name="Hunter Ceranic" userId="55b8025d37c61089" providerId="LiveId" clId="{ACCD79ED-BFAE-4857-8FB5-603E641725DE}" dt="2024-01-23T20:03:02.922" v="3" actId="26606"/>
+          <pc:sldLayoutMkLst>
+            <pc:docMk/>
+            <pc:sldMasterMk cId="3109401901" sldId="2147483648"/>
+            <pc:sldLayoutMk cId="3508845573" sldId="2147483652"/>
+          </pc:sldLayoutMkLst>
+        </pc:sldLayoutChg>
+        <pc:sldLayoutChg chg="add del">
+          <pc:chgData name="Hunter Ceranic" userId="55b8025d37c61089" providerId="LiveId" clId="{ACCD79ED-BFAE-4857-8FB5-603E641725DE}" dt="2024-01-23T20:03:02.922" v="3" actId="26606"/>
+          <pc:sldLayoutMkLst>
+            <pc:docMk/>
+            <pc:sldMasterMk cId="3109401901" sldId="2147483648"/>
+            <pc:sldLayoutMk cId="2110172368" sldId="2147483653"/>
+          </pc:sldLayoutMkLst>
+        </pc:sldLayoutChg>
+        <pc:sldLayoutChg chg="add del">
+          <pc:chgData name="Hunter Ceranic" userId="55b8025d37c61089" providerId="LiveId" clId="{ACCD79ED-BFAE-4857-8FB5-603E641725DE}" dt="2024-01-23T20:03:02.922" v="3" actId="26606"/>
+          <pc:sldLayoutMkLst>
+            <pc:docMk/>
+            <pc:sldMasterMk cId="3109401901" sldId="2147483648"/>
+            <pc:sldLayoutMk cId="2210393177" sldId="2147483654"/>
+          </pc:sldLayoutMkLst>
+        </pc:sldLayoutChg>
+        <pc:sldLayoutChg chg="add del">
+          <pc:chgData name="Hunter Ceranic" userId="55b8025d37c61089" providerId="LiveId" clId="{ACCD79ED-BFAE-4857-8FB5-603E641725DE}" dt="2024-01-23T20:03:02.922" v="3" actId="26606"/>
+          <pc:sldLayoutMkLst>
+            <pc:docMk/>
+            <pc:sldMasterMk cId="3109401901" sldId="2147483648"/>
+            <pc:sldLayoutMk cId="2886718544" sldId="2147483655"/>
+          </pc:sldLayoutMkLst>
+        </pc:sldLayoutChg>
+        <pc:sldLayoutChg chg="add del">
+          <pc:chgData name="Hunter Ceranic" userId="55b8025d37c61089" providerId="LiveId" clId="{ACCD79ED-BFAE-4857-8FB5-603E641725DE}" dt="2024-01-23T20:03:02.922" v="3" actId="26606"/>
+          <pc:sldLayoutMkLst>
+            <pc:docMk/>
+            <pc:sldMasterMk cId="3109401901" sldId="2147483648"/>
+            <pc:sldLayoutMk cId="3850669462" sldId="2147483656"/>
+          </pc:sldLayoutMkLst>
+        </pc:sldLayoutChg>
+        <pc:sldLayoutChg chg="add del">
+          <pc:chgData name="Hunter Ceranic" userId="55b8025d37c61089" providerId="LiveId" clId="{ACCD79ED-BFAE-4857-8FB5-603E641725DE}" dt="2024-01-23T20:03:02.922" v="3" actId="26606"/>
+          <pc:sldLayoutMkLst>
+            <pc:docMk/>
+            <pc:sldMasterMk cId="3109401901" sldId="2147483648"/>
+            <pc:sldLayoutMk cId="2647324278" sldId="2147483657"/>
+          </pc:sldLayoutMkLst>
+        </pc:sldLayoutChg>
+        <pc:sldLayoutChg chg="add del">
+          <pc:chgData name="Hunter Ceranic" userId="55b8025d37c61089" providerId="LiveId" clId="{ACCD79ED-BFAE-4857-8FB5-603E641725DE}" dt="2024-01-23T20:03:02.922" v="3" actId="26606"/>
+          <pc:sldLayoutMkLst>
+            <pc:docMk/>
+            <pc:sldMasterMk cId="3109401901" sldId="2147483648"/>
+            <pc:sldLayoutMk cId="1491557029" sldId="2147483658"/>
+          </pc:sldLayoutMkLst>
+        </pc:sldLayoutChg>
+        <pc:sldLayoutChg chg="add del">
+          <pc:chgData name="Hunter Ceranic" userId="55b8025d37c61089" providerId="LiveId" clId="{ACCD79ED-BFAE-4857-8FB5-603E641725DE}" dt="2024-01-23T20:03:02.922" v="3" actId="26606"/>
+          <pc:sldLayoutMkLst>
+            <pc:docMk/>
+            <pc:sldMasterMk cId="3109401901" sldId="2147483648"/>
+            <pc:sldLayoutMk cId="1150607811" sldId="2147483659"/>
+          </pc:sldLayoutMkLst>
+        </pc:sldLayoutChg>
+      </pc:sldMasterChg>
+      <pc:sldMasterChg chg="add del addSldLayout delSldLayout">
+        <pc:chgData name="Hunter Ceranic" userId="55b8025d37c61089" providerId="LiveId" clId="{ACCD79ED-BFAE-4857-8FB5-603E641725DE}" dt="2024-01-23T20:03:41.234" v="35" actId="26606"/>
+        <pc:sldMasterMkLst>
+          <pc:docMk/>
+          <pc:sldMasterMk cId="3625141046" sldId="2147483699"/>
+        </pc:sldMasterMkLst>
+        <pc:sldLayoutChg chg="add del">
+          <pc:chgData name="Hunter Ceranic" userId="55b8025d37c61089" providerId="LiveId" clId="{ACCD79ED-BFAE-4857-8FB5-603E641725DE}" dt="2024-01-23T20:03:41.234" v="35" actId="26606"/>
+          <pc:sldLayoutMkLst>
+            <pc:docMk/>
+            <pc:sldMasterMk cId="3625141046" sldId="2147483699"/>
+            <pc:sldLayoutMk cId="1127557602" sldId="2147483688"/>
+          </pc:sldLayoutMkLst>
+        </pc:sldLayoutChg>
+        <pc:sldLayoutChg chg="add del">
+          <pc:chgData name="Hunter Ceranic" userId="55b8025d37c61089" providerId="LiveId" clId="{ACCD79ED-BFAE-4857-8FB5-603E641725DE}" dt="2024-01-23T20:03:41.234" v="35" actId="26606"/>
+          <pc:sldLayoutMkLst>
+            <pc:docMk/>
+            <pc:sldMasterMk cId="3625141046" sldId="2147483699"/>
+            <pc:sldLayoutMk cId="2200874226" sldId="2147483689"/>
+          </pc:sldLayoutMkLst>
+        </pc:sldLayoutChg>
+        <pc:sldLayoutChg chg="add del">
+          <pc:chgData name="Hunter Ceranic" userId="55b8025d37c61089" providerId="LiveId" clId="{ACCD79ED-BFAE-4857-8FB5-603E641725DE}" dt="2024-01-23T20:03:41.234" v="35" actId="26606"/>
+          <pc:sldLayoutMkLst>
+            <pc:docMk/>
+            <pc:sldMasterMk cId="3625141046" sldId="2147483699"/>
+            <pc:sldLayoutMk cId="3914437980" sldId="2147483690"/>
+          </pc:sldLayoutMkLst>
+        </pc:sldLayoutChg>
+        <pc:sldLayoutChg chg="add del">
+          <pc:chgData name="Hunter Ceranic" userId="55b8025d37c61089" providerId="LiveId" clId="{ACCD79ED-BFAE-4857-8FB5-603E641725DE}" dt="2024-01-23T20:03:41.234" v="35" actId="26606"/>
+          <pc:sldLayoutMkLst>
+            <pc:docMk/>
+            <pc:sldMasterMk cId="3625141046" sldId="2147483699"/>
+            <pc:sldLayoutMk cId="946984127" sldId="2147483691"/>
+          </pc:sldLayoutMkLst>
+        </pc:sldLayoutChg>
+        <pc:sldLayoutChg chg="add del">
+          <pc:chgData name="Hunter Ceranic" userId="55b8025d37c61089" providerId="LiveId" clId="{ACCD79ED-BFAE-4857-8FB5-603E641725DE}" dt="2024-01-23T20:03:41.234" v="35" actId="26606"/>
+          <pc:sldLayoutMkLst>
+            <pc:docMk/>
+            <pc:sldMasterMk cId="3625141046" sldId="2147483699"/>
+            <pc:sldLayoutMk cId="4284967081" sldId="2147483692"/>
+          </pc:sldLayoutMkLst>
+        </pc:sldLayoutChg>
+        <pc:sldLayoutChg chg="add del">
+          <pc:chgData name="Hunter Ceranic" userId="55b8025d37c61089" providerId="LiveId" clId="{ACCD79ED-BFAE-4857-8FB5-603E641725DE}" dt="2024-01-23T20:03:41.234" v="35" actId="26606"/>
+          <pc:sldLayoutMkLst>
+            <pc:docMk/>
+            <pc:sldMasterMk cId="3625141046" sldId="2147483699"/>
+            <pc:sldLayoutMk cId="1216617267" sldId="2147483693"/>
+          </pc:sldLayoutMkLst>
+        </pc:sldLayoutChg>
+        <pc:sldLayoutChg chg="add del">
+          <pc:chgData name="Hunter Ceranic" userId="55b8025d37c61089" providerId="LiveId" clId="{ACCD79ED-BFAE-4857-8FB5-603E641725DE}" dt="2024-01-23T20:03:41.234" v="35" actId="26606"/>
+          <pc:sldLayoutMkLst>
+            <pc:docMk/>
+            <pc:sldMasterMk cId="3625141046" sldId="2147483699"/>
+            <pc:sldLayoutMk cId="2830778015" sldId="2147483694"/>
+          </pc:sldLayoutMkLst>
+        </pc:sldLayoutChg>
+        <pc:sldLayoutChg chg="add del">
+          <pc:chgData name="Hunter Ceranic" userId="55b8025d37c61089" providerId="LiveId" clId="{ACCD79ED-BFAE-4857-8FB5-603E641725DE}" dt="2024-01-23T20:03:41.234" v="35" actId="26606"/>
+          <pc:sldLayoutMkLst>
+            <pc:docMk/>
+            <pc:sldMasterMk cId="3625141046" sldId="2147483699"/>
+            <pc:sldLayoutMk cId="1653061690" sldId="2147483695"/>
+          </pc:sldLayoutMkLst>
+        </pc:sldLayoutChg>
+        <pc:sldLayoutChg chg="add del">
+          <pc:chgData name="Hunter Ceranic" userId="55b8025d37c61089" providerId="LiveId" clId="{ACCD79ED-BFAE-4857-8FB5-603E641725DE}" dt="2024-01-23T20:03:41.234" v="35" actId="26606"/>
+          <pc:sldLayoutMkLst>
+            <pc:docMk/>
+            <pc:sldMasterMk cId="3625141046" sldId="2147483699"/>
+            <pc:sldLayoutMk cId="1884769510" sldId="2147483696"/>
+          </pc:sldLayoutMkLst>
+        </pc:sldLayoutChg>
+        <pc:sldLayoutChg chg="add del">
+          <pc:chgData name="Hunter Ceranic" userId="55b8025d37c61089" providerId="LiveId" clId="{ACCD79ED-BFAE-4857-8FB5-603E641725DE}" dt="2024-01-23T20:03:41.234" v="35" actId="26606"/>
+          <pc:sldLayoutMkLst>
+            <pc:docMk/>
+            <pc:sldMasterMk cId="3625141046" sldId="2147483699"/>
+            <pc:sldLayoutMk cId="520030635" sldId="2147483697"/>
+          </pc:sldLayoutMkLst>
+        </pc:sldLayoutChg>
+        <pc:sldLayoutChg chg="add del">
+          <pc:chgData name="Hunter Ceranic" userId="55b8025d37c61089" providerId="LiveId" clId="{ACCD79ED-BFAE-4857-8FB5-603E641725DE}" dt="2024-01-23T20:03:41.234" v="35" actId="26606"/>
+          <pc:sldLayoutMkLst>
+            <pc:docMk/>
+            <pc:sldMasterMk cId="3625141046" sldId="2147483699"/>
+            <pc:sldLayoutMk cId="3334971624" sldId="2147483698"/>
+          </pc:sldLayoutMkLst>
+        </pc:sldLayoutChg>
+      </pc:sldMasterChg>
+      <pc:sldMasterChg chg="add del addSldLayout delSldLayout">
+        <pc:chgData name="Hunter Ceranic" userId="55b8025d37c61089" providerId="LiveId" clId="{ACCD79ED-BFAE-4857-8FB5-603E641725DE}" dt="2024-01-23T20:03:02.868" v="2" actId="26606"/>
+        <pc:sldMasterMkLst>
+          <pc:docMk/>
+          <pc:sldMasterMk cId="2202494251" sldId="2147483712"/>
+        </pc:sldMasterMkLst>
+        <pc:sldLayoutChg chg="add del">
+          <pc:chgData name="Hunter Ceranic" userId="55b8025d37c61089" providerId="LiveId" clId="{ACCD79ED-BFAE-4857-8FB5-603E641725DE}" dt="2024-01-23T20:03:02.868" v="2" actId="26606"/>
+          <pc:sldLayoutMkLst>
+            <pc:docMk/>
+            <pc:sldMasterMk cId="2202494251" sldId="2147483712"/>
+            <pc:sldLayoutMk cId="591244846" sldId="2147483701"/>
+          </pc:sldLayoutMkLst>
+        </pc:sldLayoutChg>
+        <pc:sldLayoutChg chg="add del">
+          <pc:chgData name="Hunter Ceranic" userId="55b8025d37c61089" providerId="LiveId" clId="{ACCD79ED-BFAE-4857-8FB5-603E641725DE}" dt="2024-01-23T20:03:02.868" v="2" actId="26606"/>
+          <pc:sldLayoutMkLst>
+            <pc:docMk/>
+            <pc:sldMasterMk cId="2202494251" sldId="2147483712"/>
+            <pc:sldLayoutMk cId="2331399181" sldId="2147483702"/>
+          </pc:sldLayoutMkLst>
+        </pc:sldLayoutChg>
+        <pc:sldLayoutChg chg="add del">
+          <pc:chgData name="Hunter Ceranic" userId="55b8025d37c61089" providerId="LiveId" clId="{ACCD79ED-BFAE-4857-8FB5-603E641725DE}" dt="2024-01-23T20:03:02.868" v="2" actId="26606"/>
+          <pc:sldLayoutMkLst>
+            <pc:docMk/>
+            <pc:sldMasterMk cId="2202494251" sldId="2147483712"/>
+            <pc:sldLayoutMk cId="3388230769" sldId="2147483703"/>
+          </pc:sldLayoutMkLst>
+        </pc:sldLayoutChg>
+        <pc:sldLayoutChg chg="add del">
+          <pc:chgData name="Hunter Ceranic" userId="55b8025d37c61089" providerId="LiveId" clId="{ACCD79ED-BFAE-4857-8FB5-603E641725DE}" dt="2024-01-23T20:03:02.868" v="2" actId="26606"/>
+          <pc:sldLayoutMkLst>
+            <pc:docMk/>
+            <pc:sldMasterMk cId="2202494251" sldId="2147483712"/>
+            <pc:sldLayoutMk cId="3869490735" sldId="2147483704"/>
+          </pc:sldLayoutMkLst>
+        </pc:sldLayoutChg>
+        <pc:sldLayoutChg chg="add del">
+          <pc:chgData name="Hunter Ceranic" userId="55b8025d37c61089" providerId="LiveId" clId="{ACCD79ED-BFAE-4857-8FB5-603E641725DE}" dt="2024-01-23T20:03:02.868" v="2" actId="26606"/>
+          <pc:sldLayoutMkLst>
+            <pc:docMk/>
+            <pc:sldMasterMk cId="2202494251" sldId="2147483712"/>
+            <pc:sldLayoutMk cId="886192896" sldId="2147483705"/>
+          </pc:sldLayoutMkLst>
+        </pc:sldLayoutChg>
+        <pc:sldLayoutChg chg="add del">
+          <pc:chgData name="Hunter Ceranic" userId="55b8025d37c61089" providerId="LiveId" clId="{ACCD79ED-BFAE-4857-8FB5-603E641725DE}" dt="2024-01-23T20:03:02.868" v="2" actId="26606"/>
+          <pc:sldLayoutMkLst>
+            <pc:docMk/>
+            <pc:sldMasterMk cId="2202494251" sldId="2147483712"/>
+            <pc:sldLayoutMk cId="4111025588" sldId="2147483706"/>
+          </pc:sldLayoutMkLst>
+        </pc:sldLayoutChg>
+        <pc:sldLayoutChg chg="add del">
+          <pc:chgData name="Hunter Ceranic" userId="55b8025d37c61089" providerId="LiveId" clId="{ACCD79ED-BFAE-4857-8FB5-603E641725DE}" dt="2024-01-23T20:03:02.868" v="2" actId="26606"/>
+          <pc:sldLayoutMkLst>
+            <pc:docMk/>
+            <pc:sldMasterMk cId="2202494251" sldId="2147483712"/>
+            <pc:sldLayoutMk cId="2309390667" sldId="2147483707"/>
+          </pc:sldLayoutMkLst>
+        </pc:sldLayoutChg>
+        <pc:sldLayoutChg chg="add del">
+          <pc:chgData name="Hunter Ceranic" userId="55b8025d37c61089" providerId="LiveId" clId="{ACCD79ED-BFAE-4857-8FB5-603E641725DE}" dt="2024-01-23T20:03:02.868" v="2" actId="26606"/>
+          <pc:sldLayoutMkLst>
+            <pc:docMk/>
+            <pc:sldMasterMk cId="2202494251" sldId="2147483712"/>
+            <pc:sldLayoutMk cId="1072143547" sldId="2147483708"/>
+          </pc:sldLayoutMkLst>
+        </pc:sldLayoutChg>
+        <pc:sldLayoutChg chg="add del">
+          <pc:chgData name="Hunter Ceranic" userId="55b8025d37c61089" providerId="LiveId" clId="{ACCD79ED-BFAE-4857-8FB5-603E641725DE}" dt="2024-01-23T20:03:02.868" v="2" actId="26606"/>
+          <pc:sldLayoutMkLst>
+            <pc:docMk/>
+            <pc:sldMasterMk cId="2202494251" sldId="2147483712"/>
+            <pc:sldLayoutMk cId="2466298444" sldId="2147483709"/>
+          </pc:sldLayoutMkLst>
+        </pc:sldLayoutChg>
+        <pc:sldLayoutChg chg="add del">
+          <pc:chgData name="Hunter Ceranic" userId="55b8025d37c61089" providerId="LiveId" clId="{ACCD79ED-BFAE-4857-8FB5-603E641725DE}" dt="2024-01-23T20:03:02.868" v="2" actId="26606"/>
+          <pc:sldLayoutMkLst>
+            <pc:docMk/>
+            <pc:sldMasterMk cId="2202494251" sldId="2147483712"/>
+            <pc:sldLayoutMk cId="804213471" sldId="2147483710"/>
+          </pc:sldLayoutMkLst>
+        </pc:sldLayoutChg>
+        <pc:sldLayoutChg chg="add del">
+          <pc:chgData name="Hunter Ceranic" userId="55b8025d37c61089" providerId="LiveId" clId="{ACCD79ED-BFAE-4857-8FB5-603E641725DE}" dt="2024-01-23T20:03:02.868" v="2" actId="26606"/>
+          <pc:sldLayoutMkLst>
+            <pc:docMk/>
+            <pc:sldMasterMk cId="2202494251" sldId="2147483712"/>
+            <pc:sldLayoutMk cId="2386803905" sldId="2147483711"/>
+          </pc:sldLayoutMkLst>
+        </pc:sldLayoutChg>
+      </pc:sldMasterChg>
+      <pc:sldMasterChg chg="add addSldLayout">
+        <pc:chgData name="Hunter Ceranic" userId="55b8025d37c61089" providerId="LiveId" clId="{ACCD79ED-BFAE-4857-8FB5-603E641725DE}" dt="2024-01-23T20:03:41.234" v="35" actId="26606"/>
+        <pc:sldMasterMkLst>
+          <pc:docMk/>
+          <pc:sldMasterMk cId="1299206643" sldId="2147483788"/>
+        </pc:sldMasterMkLst>
+        <pc:sldLayoutChg chg="add">
+          <pc:chgData name="Hunter Ceranic" userId="55b8025d37c61089" providerId="LiveId" clId="{ACCD79ED-BFAE-4857-8FB5-603E641725DE}" dt="2024-01-23T20:03:41.234" v="35" actId="26606"/>
+          <pc:sldLayoutMkLst>
+            <pc:docMk/>
+            <pc:sldMasterMk cId="1299206643" sldId="2147483788"/>
+            <pc:sldLayoutMk cId="3828061927" sldId="2147483777"/>
+          </pc:sldLayoutMkLst>
+        </pc:sldLayoutChg>
+        <pc:sldLayoutChg chg="add">
+          <pc:chgData name="Hunter Ceranic" userId="55b8025d37c61089" providerId="LiveId" clId="{ACCD79ED-BFAE-4857-8FB5-603E641725DE}" dt="2024-01-23T20:03:41.234" v="35" actId="26606"/>
+          <pc:sldLayoutMkLst>
+            <pc:docMk/>
+            <pc:sldMasterMk cId="1299206643" sldId="2147483788"/>
+            <pc:sldLayoutMk cId="2411539174" sldId="2147483778"/>
+          </pc:sldLayoutMkLst>
+        </pc:sldLayoutChg>
+        <pc:sldLayoutChg chg="add">
+          <pc:chgData name="Hunter Ceranic" userId="55b8025d37c61089" providerId="LiveId" clId="{ACCD79ED-BFAE-4857-8FB5-603E641725DE}" dt="2024-01-23T20:03:41.234" v="35" actId="26606"/>
+          <pc:sldLayoutMkLst>
+            <pc:docMk/>
+            <pc:sldMasterMk cId="1299206643" sldId="2147483788"/>
+            <pc:sldLayoutMk cId="2382623034" sldId="2147483779"/>
+          </pc:sldLayoutMkLst>
+        </pc:sldLayoutChg>
+        <pc:sldLayoutChg chg="add">
+          <pc:chgData name="Hunter Ceranic" userId="55b8025d37c61089" providerId="LiveId" clId="{ACCD79ED-BFAE-4857-8FB5-603E641725DE}" dt="2024-01-23T20:03:41.234" v="35" actId="26606"/>
+          <pc:sldLayoutMkLst>
+            <pc:docMk/>
+            <pc:sldMasterMk cId="1299206643" sldId="2147483788"/>
+            <pc:sldLayoutMk cId="1887262989" sldId="2147483780"/>
+          </pc:sldLayoutMkLst>
+        </pc:sldLayoutChg>
+        <pc:sldLayoutChg chg="add">
+          <pc:chgData name="Hunter Ceranic" userId="55b8025d37c61089" providerId="LiveId" clId="{ACCD79ED-BFAE-4857-8FB5-603E641725DE}" dt="2024-01-23T20:03:41.234" v="35" actId="26606"/>
+          <pc:sldLayoutMkLst>
+            <pc:docMk/>
+            <pc:sldMasterMk cId="1299206643" sldId="2147483788"/>
+            <pc:sldLayoutMk cId="2611365127" sldId="2147483781"/>
+          </pc:sldLayoutMkLst>
+        </pc:sldLayoutChg>
+        <pc:sldLayoutChg chg="add">
+          <pc:chgData name="Hunter Ceranic" userId="55b8025d37c61089" providerId="LiveId" clId="{ACCD79ED-BFAE-4857-8FB5-603E641725DE}" dt="2024-01-23T20:03:41.234" v="35" actId="26606"/>
+          <pc:sldLayoutMkLst>
+            <pc:docMk/>
+            <pc:sldMasterMk cId="1299206643" sldId="2147483788"/>
+            <pc:sldLayoutMk cId="825454338" sldId="2147483782"/>
+          </pc:sldLayoutMkLst>
+        </pc:sldLayoutChg>
+        <pc:sldLayoutChg chg="add">
+          <pc:chgData name="Hunter Ceranic" userId="55b8025d37c61089" providerId="LiveId" clId="{ACCD79ED-BFAE-4857-8FB5-603E641725DE}" dt="2024-01-23T20:03:41.234" v="35" actId="26606"/>
+          <pc:sldLayoutMkLst>
+            <pc:docMk/>
+            <pc:sldMasterMk cId="1299206643" sldId="2147483788"/>
+            <pc:sldLayoutMk cId="3585152483" sldId="2147483783"/>
+          </pc:sldLayoutMkLst>
+        </pc:sldLayoutChg>
+        <pc:sldLayoutChg chg="add">
+          <pc:chgData name="Hunter Ceranic" userId="55b8025d37c61089" providerId="LiveId" clId="{ACCD79ED-BFAE-4857-8FB5-603E641725DE}" dt="2024-01-23T20:03:41.234" v="35" actId="26606"/>
+          <pc:sldLayoutMkLst>
+            <pc:docMk/>
+            <pc:sldMasterMk cId="1299206643" sldId="2147483788"/>
+            <pc:sldLayoutMk cId="676146419" sldId="2147483784"/>
+          </pc:sldLayoutMkLst>
+        </pc:sldLayoutChg>
+        <pc:sldLayoutChg chg="add">
+          <pc:chgData name="Hunter Ceranic" userId="55b8025d37c61089" providerId="LiveId" clId="{ACCD79ED-BFAE-4857-8FB5-603E641725DE}" dt="2024-01-23T20:03:41.234" v="35" actId="26606"/>
+          <pc:sldLayoutMkLst>
+            <pc:docMk/>
+            <pc:sldMasterMk cId="1299206643" sldId="2147483788"/>
+            <pc:sldLayoutMk cId="327102813" sldId="2147483785"/>
+          </pc:sldLayoutMkLst>
+        </pc:sldLayoutChg>
+        <pc:sldLayoutChg chg="add">
+          <pc:chgData name="Hunter Ceranic" userId="55b8025d37c61089" providerId="LiveId" clId="{ACCD79ED-BFAE-4857-8FB5-603E641725DE}" dt="2024-01-23T20:03:41.234" v="35" actId="26606"/>
+          <pc:sldLayoutMkLst>
+            <pc:docMk/>
+            <pc:sldMasterMk cId="1299206643" sldId="2147483788"/>
+            <pc:sldLayoutMk cId="4261281538" sldId="2147483786"/>
+          </pc:sldLayoutMkLst>
+        </pc:sldLayoutChg>
+        <pc:sldLayoutChg chg="add">
+          <pc:chgData name="Hunter Ceranic" userId="55b8025d37c61089" providerId="LiveId" clId="{ACCD79ED-BFAE-4857-8FB5-603E641725DE}" dt="2024-01-23T20:03:41.234" v="35" actId="26606"/>
+          <pc:sldLayoutMkLst>
+            <pc:docMk/>
+            <pc:sldMasterMk cId="1299206643" sldId="2147483788"/>
+            <pc:sldLayoutMk cId="3516666301" sldId="2147483787"/>
+          </pc:sldLayoutMkLst>
+        </pc:sldLayoutChg>
+      </pc:sldMasterChg>
+    </pc:docChg>
+  </pc:docChgLst>
+  <pc:docChgLst>
     <pc:chgData name="Hunter Ceranic" userId="55b8025d37c61089" providerId="LiveId" clId="{F0BA40D0-9182-44C0-BEDE-14048F85CCAB}"/>
     <pc:docChg chg="undo custSel addSld delSld modSld">
       <pc:chgData name="Hunter Ceranic" userId="55b8025d37c61089" providerId="LiveId" clId="{F0BA40D0-9182-44C0-BEDE-14048F85CCAB}" dt="2024-02-13T20:38:46.854" v="3903" actId="20577"/>
@@ -1595,1408 +2997,6 @@
           </ac:picMkLst>
         </pc:picChg>
       </pc:sldChg>
-    </pc:docChg>
-  </pc:docChgLst>
-  <pc:docChgLst>
-    <pc:chgData name="Hunter Ceranic" userId="55b8025d37c61089" providerId="LiveId" clId="{ACCD79ED-BFAE-4857-8FB5-603E641725DE}"/>
-    <pc:docChg chg="undo redo custSel addSld delSld modSld sldOrd addMainMaster delMainMaster">
-      <pc:chgData name="Hunter Ceranic" userId="55b8025d37c61089" providerId="LiveId" clId="{ACCD79ED-BFAE-4857-8FB5-603E641725DE}" dt="2024-01-26T19:32:54.795" v="3897" actId="20577"/>
-      <pc:docMkLst>
-        <pc:docMk/>
-      </pc:docMkLst>
-      <pc:sldChg chg="addSp delSp modSp new mod setBg modClrScheme chgLayout">
-        <pc:chgData name="Hunter Ceranic" userId="55b8025d37c61089" providerId="LiveId" clId="{ACCD79ED-BFAE-4857-8FB5-603E641725DE}" dt="2024-01-23T20:11:06.058" v="150" actId="2085"/>
-        <pc:sldMkLst>
-          <pc:docMk/>
-          <pc:sldMk cId="3079278799" sldId="256"/>
-        </pc:sldMkLst>
-        <pc:spChg chg="mod">
-          <ac:chgData name="Hunter Ceranic" userId="55b8025d37c61089" providerId="LiveId" clId="{ACCD79ED-BFAE-4857-8FB5-603E641725DE}" dt="2024-01-23T20:11:06.058" v="150" actId="2085"/>
-          <ac:spMkLst>
-            <pc:docMk/>
-            <pc:sldMk cId="3079278799" sldId="256"/>
-            <ac:spMk id="2" creationId="{757F2756-77AC-6ECF-6B19-F194FDB5096B}"/>
-          </ac:spMkLst>
-        </pc:spChg>
-        <pc:spChg chg="mod">
-          <ac:chgData name="Hunter Ceranic" userId="55b8025d37c61089" providerId="LiveId" clId="{ACCD79ED-BFAE-4857-8FB5-603E641725DE}" dt="2024-01-23T20:05:22.836" v="115" actId="1076"/>
-          <ac:spMkLst>
-            <pc:docMk/>
-            <pc:sldMk cId="3079278799" sldId="256"/>
-            <ac:spMk id="3" creationId="{DF771E06-46C7-88C5-B4FC-0AB8360AD021}"/>
-          </ac:spMkLst>
-        </pc:spChg>
-        <pc:spChg chg="add mod">
-          <ac:chgData name="Hunter Ceranic" userId="55b8025d37c61089" providerId="LiveId" clId="{ACCD79ED-BFAE-4857-8FB5-603E641725DE}" dt="2024-01-23T20:10:21.670" v="143" actId="208"/>
-          <ac:spMkLst>
-            <pc:docMk/>
-            <pc:sldMk cId="3079278799" sldId="256"/>
-            <ac:spMk id="6" creationId="{A598BD13-5C63-68F7-ED2D-22E7C4ECEB99}"/>
-          </ac:spMkLst>
-        </pc:spChg>
-        <pc:spChg chg="add del">
-          <ac:chgData name="Hunter Ceranic" userId="55b8025d37c61089" providerId="LiveId" clId="{ACCD79ED-BFAE-4857-8FB5-603E641725DE}" dt="2024-01-23T20:03:41.234" v="35" actId="26606"/>
-          <ac:spMkLst>
-            <pc:docMk/>
-            <pc:sldMk cId="3079278799" sldId="256"/>
-            <ac:spMk id="9" creationId="{ECD84B89-83B1-AA44-B9BE-C68A3A346981}"/>
-          </ac:spMkLst>
-        </pc:spChg>
-        <pc:spChg chg="add del">
-          <ac:chgData name="Hunter Ceranic" userId="55b8025d37c61089" providerId="LiveId" clId="{ACCD79ED-BFAE-4857-8FB5-603E641725DE}" dt="2024-01-23T20:03:02.868" v="2" actId="26606"/>
-          <ac:spMkLst>
-            <pc:docMk/>
-            <pc:sldMk cId="3079278799" sldId="256"/>
-            <ac:spMk id="10" creationId="{8C37C960-91F5-4F61-B2CD-8A037920720B}"/>
-          </ac:spMkLst>
-        </pc:spChg>
-        <pc:spChg chg="add del">
-          <ac:chgData name="Hunter Ceranic" userId="55b8025d37c61089" providerId="LiveId" clId="{ACCD79ED-BFAE-4857-8FB5-603E641725DE}" dt="2024-01-23T20:03:41.234" v="35" actId="26606"/>
-          <ac:spMkLst>
-            <pc:docMk/>
-            <pc:sldMk cId="3079278799" sldId="256"/>
-            <ac:spMk id="11" creationId="{DF3B9D9F-2555-4B2E-AD17-056B66596D5A}"/>
-          </ac:spMkLst>
-        </pc:spChg>
-        <pc:spChg chg="add del">
-          <ac:chgData name="Hunter Ceranic" userId="55b8025d37c61089" providerId="LiveId" clId="{ACCD79ED-BFAE-4857-8FB5-603E641725DE}" dt="2024-01-23T20:03:41.234" v="35" actId="26606"/>
-          <ac:spMkLst>
-            <pc:docMk/>
-            <pc:sldMk cId="3079278799" sldId="256"/>
-            <ac:spMk id="13" creationId="{98F816C8-664D-4D46-87AC-DD7054006763}"/>
-          </ac:spMkLst>
-        </pc:spChg>
-        <pc:spChg chg="add">
-          <ac:chgData name="Hunter Ceranic" userId="55b8025d37c61089" providerId="LiveId" clId="{ACCD79ED-BFAE-4857-8FB5-603E641725DE}" dt="2024-01-23T20:03:41.234" v="35" actId="26606"/>
-          <ac:spMkLst>
-            <pc:docMk/>
-            <pc:sldMk cId="3079278799" sldId="256"/>
-            <ac:spMk id="18" creationId="{A1D7EC86-7CB9-431D-8AC3-8AAF0440B162}"/>
-          </ac:spMkLst>
-        </pc:spChg>
-        <pc:spChg chg="add">
-          <ac:chgData name="Hunter Ceranic" userId="55b8025d37c61089" providerId="LiveId" clId="{ACCD79ED-BFAE-4857-8FB5-603E641725DE}" dt="2024-01-23T20:03:41.234" v="35" actId="26606"/>
-          <ac:spMkLst>
-            <pc:docMk/>
-            <pc:sldMk cId="3079278799" sldId="256"/>
-            <ac:spMk id="20" creationId="{D4B9777F-B610-419B-9193-80306388F3E2}"/>
-          </ac:spMkLst>
-        </pc:spChg>
-        <pc:spChg chg="add">
-          <ac:chgData name="Hunter Ceranic" userId="55b8025d37c61089" providerId="LiveId" clId="{ACCD79ED-BFAE-4857-8FB5-603E641725DE}" dt="2024-01-23T20:03:41.234" v="35" actId="26606"/>
-          <ac:spMkLst>
-            <pc:docMk/>
-            <pc:sldMk cId="3079278799" sldId="256"/>
-            <ac:spMk id="22" creationId="{311F016A-A753-449B-9EA6-322199B7119E}"/>
-          </ac:spMkLst>
-        </pc:spChg>
-        <pc:spChg chg="add">
-          <ac:chgData name="Hunter Ceranic" userId="55b8025d37c61089" providerId="LiveId" clId="{ACCD79ED-BFAE-4857-8FB5-603E641725DE}" dt="2024-01-23T20:03:41.234" v="35" actId="26606"/>
-          <ac:spMkLst>
-            <pc:docMk/>
-            <pc:sldMk cId="3079278799" sldId="256"/>
-            <ac:spMk id="24" creationId="{95106A28-883A-4993-BF9E-C403B81A8D66}"/>
-          </ac:spMkLst>
-        </pc:spChg>
-        <pc:spChg chg="add">
-          <ac:chgData name="Hunter Ceranic" userId="55b8025d37c61089" providerId="LiveId" clId="{ACCD79ED-BFAE-4857-8FB5-603E641725DE}" dt="2024-01-23T20:03:41.234" v="35" actId="26606"/>
-          <ac:spMkLst>
-            <pc:docMk/>
-            <pc:sldMk cId="3079278799" sldId="256"/>
-            <ac:spMk id="26" creationId="{F5AE4E4F-9F4C-43ED-8299-9BD63B74E8F0}"/>
-          </ac:spMkLst>
-        </pc:spChg>
-        <pc:picChg chg="add del">
-          <ac:chgData name="Hunter Ceranic" userId="55b8025d37c61089" providerId="LiveId" clId="{ACCD79ED-BFAE-4857-8FB5-603E641725DE}" dt="2024-01-23T20:03:02.868" v="2" actId="26606"/>
-          <ac:picMkLst>
-            <pc:docMk/>
-            <pc:sldMk cId="3079278799" sldId="256"/>
-            <ac:picMk id="4" creationId="{BFC42171-CD21-0205-8DA1-6384FC5DE1B8}"/>
-          </ac:picMkLst>
-        </pc:picChg>
-        <pc:picChg chg="add del">
-          <ac:chgData name="Hunter Ceranic" userId="55b8025d37c61089" providerId="LiveId" clId="{ACCD79ED-BFAE-4857-8FB5-603E641725DE}" dt="2024-01-23T20:03:02.868" v="2" actId="26606"/>
-          <ac:picMkLst>
-            <pc:docMk/>
-            <pc:sldMk cId="3079278799" sldId="256"/>
-            <ac:picMk id="5" creationId="{4B7CE3BD-1D42-943D-2C8C-0F16CCF8C897}"/>
-          </ac:picMkLst>
-        </pc:picChg>
-        <pc:picChg chg="add mod ord">
-          <ac:chgData name="Hunter Ceranic" userId="55b8025d37c61089" providerId="LiveId" clId="{ACCD79ED-BFAE-4857-8FB5-603E641725DE}" dt="2024-01-23T20:10:54.634" v="147" actId="1076"/>
-          <ac:picMkLst>
-            <pc:docMk/>
-            <pc:sldMk cId="3079278799" sldId="256"/>
-            <ac:picMk id="12" creationId="{2C9D627D-6E69-94C6-4924-B84A51E3A1F5}"/>
-          </ac:picMkLst>
-        </pc:picChg>
-      </pc:sldChg>
-      <pc:sldChg chg="addSp modSp new mod setBg">
-        <pc:chgData name="Hunter Ceranic" userId="55b8025d37c61089" providerId="LiveId" clId="{ACCD79ED-BFAE-4857-8FB5-603E641725DE}" dt="2024-01-23T23:28:31.483" v="2161" actId="20577"/>
-        <pc:sldMkLst>
-          <pc:docMk/>
-          <pc:sldMk cId="427290740" sldId="257"/>
-        </pc:sldMkLst>
-        <pc:spChg chg="mod">
-          <ac:chgData name="Hunter Ceranic" userId="55b8025d37c61089" providerId="LiveId" clId="{ACCD79ED-BFAE-4857-8FB5-603E641725DE}" dt="2024-01-23T22:22:47.238" v="1695" actId="26606"/>
-          <ac:spMkLst>
-            <pc:docMk/>
-            <pc:sldMk cId="427290740" sldId="257"/>
-            <ac:spMk id="2" creationId="{7D2F6F69-BD97-22EF-CF32-EB1A205B215C}"/>
-          </ac:spMkLst>
-        </pc:spChg>
-        <pc:spChg chg="mod">
-          <ac:chgData name="Hunter Ceranic" userId="55b8025d37c61089" providerId="LiveId" clId="{ACCD79ED-BFAE-4857-8FB5-603E641725DE}" dt="2024-01-23T22:53:23.317" v="1943" actId="20577"/>
-          <ac:spMkLst>
-            <pc:docMk/>
-            <pc:sldMk cId="427290740" sldId="257"/>
-            <ac:spMk id="3" creationId="{1AEB8B50-8C85-0729-64B2-671AE19C2815}"/>
-          </ac:spMkLst>
-        </pc:spChg>
-        <pc:spChg chg="mod">
-          <ac:chgData name="Hunter Ceranic" userId="55b8025d37c61089" providerId="LiveId" clId="{ACCD79ED-BFAE-4857-8FB5-603E641725DE}" dt="2024-01-23T23:28:31.483" v="2161" actId="20577"/>
-          <ac:spMkLst>
-            <pc:docMk/>
-            <pc:sldMk cId="427290740" sldId="257"/>
-            <ac:spMk id="4" creationId="{3F70354C-224E-1AAB-3BB6-4F2536217202}"/>
-          </ac:spMkLst>
-        </pc:spChg>
-        <pc:spChg chg="add">
-          <ac:chgData name="Hunter Ceranic" userId="55b8025d37c61089" providerId="LiveId" clId="{ACCD79ED-BFAE-4857-8FB5-603E641725DE}" dt="2024-01-23T22:22:47.238" v="1695" actId="26606"/>
-          <ac:spMkLst>
-            <pc:docMk/>
-            <pc:sldMk cId="427290740" sldId="257"/>
-            <ac:spMk id="10" creationId="{1CD81A2A-6ED4-4EF4-A14C-912D31E14800}"/>
-          </ac:spMkLst>
-        </pc:spChg>
-        <pc:spChg chg="add">
-          <ac:chgData name="Hunter Ceranic" userId="55b8025d37c61089" providerId="LiveId" clId="{ACCD79ED-BFAE-4857-8FB5-603E641725DE}" dt="2024-01-23T22:22:47.238" v="1695" actId="26606"/>
-          <ac:spMkLst>
-            <pc:docMk/>
-            <pc:sldMk cId="427290740" sldId="257"/>
-            <ac:spMk id="12" creationId="{1661932C-CA15-4E17-B115-FAE7CBEE4789}"/>
-          </ac:spMkLst>
-        </pc:spChg>
-        <pc:spChg chg="add">
-          <ac:chgData name="Hunter Ceranic" userId="55b8025d37c61089" providerId="LiveId" clId="{ACCD79ED-BFAE-4857-8FB5-603E641725DE}" dt="2024-01-23T22:22:47.238" v="1695" actId="26606"/>
-          <ac:spMkLst>
-            <pc:docMk/>
-            <pc:sldMk cId="427290740" sldId="257"/>
-            <ac:spMk id="14" creationId="{8590ADD5-9383-4D3D-9047-3DA2593CCB5D}"/>
-          </ac:spMkLst>
-        </pc:spChg>
-        <pc:spChg chg="add">
-          <ac:chgData name="Hunter Ceranic" userId="55b8025d37c61089" providerId="LiveId" clId="{ACCD79ED-BFAE-4857-8FB5-603E641725DE}" dt="2024-01-23T22:22:47.238" v="1695" actId="26606"/>
-          <ac:spMkLst>
-            <pc:docMk/>
-            <pc:sldMk cId="427290740" sldId="257"/>
-            <ac:spMk id="16" creationId="{DABE3E45-88CF-45D8-8D40-C773324D93F6}"/>
-          </ac:spMkLst>
-        </pc:spChg>
-        <pc:spChg chg="add">
-          <ac:chgData name="Hunter Ceranic" userId="55b8025d37c61089" providerId="LiveId" clId="{ACCD79ED-BFAE-4857-8FB5-603E641725DE}" dt="2024-01-23T22:22:47.238" v="1695" actId="26606"/>
-          <ac:spMkLst>
-            <pc:docMk/>
-            <pc:sldMk cId="427290740" sldId="257"/>
-            <ac:spMk id="20" creationId="{B91ECDA9-56DC-4270-8F33-01C5637B8CEB}"/>
-          </ac:spMkLst>
-        </pc:spChg>
-        <pc:spChg chg="add">
-          <ac:chgData name="Hunter Ceranic" userId="55b8025d37c61089" providerId="LiveId" clId="{ACCD79ED-BFAE-4857-8FB5-603E641725DE}" dt="2024-01-23T22:22:47.238" v="1695" actId="26606"/>
-          <ac:spMkLst>
-            <pc:docMk/>
-            <pc:sldMk cId="427290740" sldId="257"/>
-            <ac:spMk id="22" creationId="{75F47824-961D-465D-84F9-EAE11BC6173B}"/>
-          </ac:spMkLst>
-        </pc:spChg>
-        <pc:spChg chg="add">
-          <ac:chgData name="Hunter Ceranic" userId="55b8025d37c61089" providerId="LiveId" clId="{ACCD79ED-BFAE-4857-8FB5-603E641725DE}" dt="2024-01-23T22:22:47.238" v="1695" actId="26606"/>
-          <ac:spMkLst>
-            <pc:docMk/>
-            <pc:sldMk cId="427290740" sldId="257"/>
-            <ac:spMk id="24" creationId="{FEC9DA3E-C1D7-472D-B7C0-F71AE41FBA23}"/>
-          </ac:spMkLst>
-        </pc:spChg>
-        <pc:picChg chg="add">
-          <ac:chgData name="Hunter Ceranic" userId="55b8025d37c61089" providerId="LiveId" clId="{ACCD79ED-BFAE-4857-8FB5-603E641725DE}" dt="2024-01-23T22:22:47.238" v="1695" actId="26606"/>
-          <ac:picMkLst>
-            <pc:docMk/>
-            <pc:sldMk cId="427290740" sldId="257"/>
-            <ac:picMk id="7" creationId="{947BE24C-2029-BD0A-C300-37A124369839}"/>
-          </ac:picMkLst>
-        </pc:picChg>
-        <pc:cxnChg chg="add">
-          <ac:chgData name="Hunter Ceranic" userId="55b8025d37c61089" providerId="LiveId" clId="{ACCD79ED-BFAE-4857-8FB5-603E641725DE}" dt="2024-01-23T22:22:47.238" v="1695" actId="26606"/>
-          <ac:cxnSpMkLst>
-            <pc:docMk/>
-            <pc:sldMk cId="427290740" sldId="257"/>
-            <ac:cxnSpMk id="18" creationId="{49CD1692-827B-4C8D-B4A1-134FD04CF45C}"/>
-          </ac:cxnSpMkLst>
-        </pc:cxnChg>
-      </pc:sldChg>
-      <pc:sldChg chg="addSp delSp modSp new mod setBg">
-        <pc:chgData name="Hunter Ceranic" userId="55b8025d37c61089" providerId="LiveId" clId="{ACCD79ED-BFAE-4857-8FB5-603E641725DE}" dt="2024-01-23T23:28:41.656" v="2165" actId="20577"/>
-        <pc:sldMkLst>
-          <pc:docMk/>
-          <pc:sldMk cId="356722889" sldId="258"/>
-        </pc:sldMkLst>
-        <pc:spChg chg="mod">
-          <ac:chgData name="Hunter Ceranic" userId="55b8025d37c61089" providerId="LiveId" clId="{ACCD79ED-BFAE-4857-8FB5-603E641725DE}" dt="2024-01-23T22:43:53.487" v="1902" actId="26606"/>
-          <ac:spMkLst>
-            <pc:docMk/>
-            <pc:sldMk cId="356722889" sldId="258"/>
-            <ac:spMk id="2" creationId="{99A0820E-216D-F7CC-0905-014594A9C1A4}"/>
-          </ac:spMkLst>
-        </pc:spChg>
-        <pc:spChg chg="del">
-          <ac:chgData name="Hunter Ceranic" userId="55b8025d37c61089" providerId="LiveId" clId="{ACCD79ED-BFAE-4857-8FB5-603E641725DE}" dt="2024-01-23T22:29:58.817" v="1698" actId="478"/>
-          <ac:spMkLst>
-            <pc:docMk/>
-            <pc:sldMk cId="356722889" sldId="258"/>
-            <ac:spMk id="3" creationId="{31EE65BB-7C1C-EBF3-F280-88F1218E736F}"/>
-          </ac:spMkLst>
-        </pc:spChg>
-        <pc:spChg chg="add mod ord">
-          <ac:chgData name="Hunter Ceranic" userId="55b8025d37c61089" providerId="LiveId" clId="{ACCD79ED-BFAE-4857-8FB5-603E641725DE}" dt="2024-01-23T22:57:37.871" v="1990" actId="20577"/>
-          <ac:spMkLst>
-            <pc:docMk/>
-            <pc:sldMk cId="356722889" sldId="258"/>
-            <ac:spMk id="6" creationId="{CC7BCCCB-9907-FF0C-EEAB-CDCE4653FE88}"/>
-          </ac:spMkLst>
-        </pc:spChg>
-        <pc:spChg chg="del">
-          <ac:chgData name="Hunter Ceranic" userId="55b8025d37c61089" providerId="LiveId" clId="{ACCD79ED-BFAE-4857-8FB5-603E641725DE}" dt="2024-01-23T23:02:20.668" v="2052" actId="478"/>
-          <ac:spMkLst>
-            <pc:docMk/>
-            <pc:sldMk cId="356722889" sldId="258"/>
-            <ac:spMk id="12" creationId="{AA925B2B-F9CC-0BD8-52DC-A938C32C6863}"/>
-          </ac:spMkLst>
-        </pc:spChg>
-        <pc:spChg chg="add mod">
-          <ac:chgData name="Hunter Ceranic" userId="55b8025d37c61089" providerId="LiveId" clId="{ACCD79ED-BFAE-4857-8FB5-603E641725DE}" dt="2024-01-23T23:28:41.656" v="2165" actId="20577"/>
-          <ac:spMkLst>
-            <pc:docMk/>
-            <pc:sldMk cId="356722889" sldId="258"/>
-            <ac:spMk id="13" creationId="{B0F0E84C-F4C8-FB93-DEDB-FBAC071B797F}"/>
-          </ac:spMkLst>
-        </pc:spChg>
-        <pc:spChg chg="add">
-          <ac:chgData name="Hunter Ceranic" userId="55b8025d37c61089" providerId="LiveId" clId="{ACCD79ED-BFAE-4857-8FB5-603E641725DE}" dt="2024-01-23T22:43:53.487" v="1902" actId="26606"/>
-          <ac:spMkLst>
-            <pc:docMk/>
-            <pc:sldMk cId="356722889" sldId="258"/>
-            <ac:spMk id="16" creationId="{72D05657-94EE-4B2D-BC1B-A1D065063658}"/>
-          </ac:spMkLst>
-        </pc:spChg>
-        <pc:spChg chg="add">
-          <ac:chgData name="Hunter Ceranic" userId="55b8025d37c61089" providerId="LiveId" clId="{ACCD79ED-BFAE-4857-8FB5-603E641725DE}" dt="2024-01-23T22:43:53.487" v="1902" actId="26606"/>
-          <ac:spMkLst>
-            <pc:docMk/>
-            <pc:sldMk cId="356722889" sldId="258"/>
-            <ac:spMk id="18" creationId="{7586665A-47B3-4AEE-BC94-15D89FF706B3}"/>
-          </ac:spMkLst>
-        </pc:spChg>
-        <pc:picChg chg="add mod">
-          <ac:chgData name="Hunter Ceranic" userId="55b8025d37c61089" providerId="LiveId" clId="{ACCD79ED-BFAE-4857-8FB5-603E641725DE}" dt="2024-01-23T22:43:53.487" v="1902" actId="26606"/>
-          <ac:picMkLst>
-            <pc:docMk/>
-            <pc:sldMk cId="356722889" sldId="258"/>
-            <ac:picMk id="5" creationId="{CFFC0296-F13E-167E-0F33-27320DF18354}"/>
-          </ac:picMkLst>
-        </pc:picChg>
-        <pc:picChg chg="add mod">
-          <ac:chgData name="Hunter Ceranic" userId="55b8025d37c61089" providerId="LiveId" clId="{ACCD79ED-BFAE-4857-8FB5-603E641725DE}" dt="2024-01-23T22:43:53.487" v="1902" actId="26606"/>
-          <ac:picMkLst>
-            <pc:docMk/>
-            <pc:sldMk cId="356722889" sldId="258"/>
-            <ac:picMk id="11" creationId="{A82ADC44-FE62-0E4F-B61B-636F51C8ACE8}"/>
-          </ac:picMkLst>
-        </pc:picChg>
-        <pc:picChg chg="add del">
-          <ac:chgData name="Hunter Ceranic" userId="55b8025d37c61089" providerId="LiveId" clId="{ACCD79ED-BFAE-4857-8FB5-603E641725DE}" dt="2024-01-23T23:16:40.377" v="2092" actId="22"/>
-          <ac:picMkLst>
-            <pc:docMk/>
-            <pc:sldMk cId="356722889" sldId="258"/>
-            <ac:picMk id="15" creationId="{3C704A7D-35B0-ECA8-5701-D86001ABB30B}"/>
-          </ac:picMkLst>
-        </pc:picChg>
-        <pc:cxnChg chg="add del mod">
-          <ac:chgData name="Hunter Ceranic" userId="55b8025d37c61089" providerId="LiveId" clId="{ACCD79ED-BFAE-4857-8FB5-603E641725DE}" dt="2024-01-23T22:40:28.749" v="1839" actId="478"/>
-          <ac:cxnSpMkLst>
-            <pc:docMk/>
-            <pc:sldMk cId="356722889" sldId="258"/>
-            <ac:cxnSpMk id="8" creationId="{909E5A23-8745-0CF1-739D-B13D8849A089}"/>
-          </ac:cxnSpMkLst>
-        </pc:cxnChg>
-      </pc:sldChg>
-      <pc:sldChg chg="addSp delSp modSp new del mod">
-        <pc:chgData name="Hunter Ceranic" userId="55b8025d37c61089" providerId="LiveId" clId="{ACCD79ED-BFAE-4857-8FB5-603E641725DE}" dt="2024-01-25T17:57:10.263" v="2183" actId="47"/>
-        <pc:sldMkLst>
-          <pc:docMk/>
-          <pc:sldMk cId="1952224994" sldId="259"/>
-        </pc:sldMkLst>
-        <pc:spChg chg="del">
-          <ac:chgData name="Hunter Ceranic" userId="55b8025d37c61089" providerId="LiveId" clId="{ACCD79ED-BFAE-4857-8FB5-603E641725DE}" dt="2024-01-23T23:02:42.323" v="2058" actId="478"/>
-          <ac:spMkLst>
-            <pc:docMk/>
-            <pc:sldMk cId="1952224994" sldId="259"/>
-            <ac:spMk id="4" creationId="{96256866-0A8D-DA42-89E0-22339441C794}"/>
-          </ac:spMkLst>
-        </pc:spChg>
-        <pc:spChg chg="add mod">
-          <ac:chgData name="Hunter Ceranic" userId="55b8025d37c61089" providerId="LiveId" clId="{ACCD79ED-BFAE-4857-8FB5-603E641725DE}" dt="2024-01-23T23:29:04.464" v="2173" actId="20577"/>
-          <ac:spMkLst>
-            <pc:docMk/>
-            <pc:sldMk cId="1952224994" sldId="259"/>
-            <ac:spMk id="5" creationId="{23624874-B696-09C2-F784-44BA41FC2861}"/>
-          </ac:spMkLst>
-        </pc:spChg>
-      </pc:sldChg>
-      <pc:sldChg chg="addSp delSp modSp new mod ord">
-        <pc:chgData name="Hunter Ceranic" userId="55b8025d37c61089" providerId="LiveId" clId="{ACCD79ED-BFAE-4857-8FB5-603E641725DE}" dt="2024-01-26T19:32:54.795" v="3897" actId="20577"/>
-        <pc:sldMkLst>
-          <pc:docMk/>
-          <pc:sldMk cId="3488984038" sldId="260"/>
-        </pc:sldMkLst>
-        <pc:spChg chg="mod">
-          <ac:chgData name="Hunter Ceranic" userId="55b8025d37c61089" providerId="LiveId" clId="{ACCD79ED-BFAE-4857-8FB5-603E641725DE}" dt="2024-01-23T20:13:13.509" v="202" actId="20577"/>
-          <ac:spMkLst>
-            <pc:docMk/>
-            <pc:sldMk cId="3488984038" sldId="260"/>
-            <ac:spMk id="2" creationId="{3C732381-BFC2-6F3F-058A-7EAD61E5590C}"/>
-          </ac:spMkLst>
-        </pc:spChg>
-        <pc:spChg chg="del mod">
-          <ac:chgData name="Hunter Ceranic" userId="55b8025d37c61089" providerId="LiveId" clId="{ACCD79ED-BFAE-4857-8FB5-603E641725DE}" dt="2024-01-25T18:38:21.864" v="3721" actId="26606"/>
-          <ac:spMkLst>
-            <pc:docMk/>
-            <pc:sldMk cId="3488984038" sldId="260"/>
-            <ac:spMk id="3" creationId="{4F91F226-354F-27D2-1914-C5773798C0F9}"/>
-          </ac:spMkLst>
-        </pc:spChg>
-        <pc:spChg chg="del">
-          <ac:chgData name="Hunter Ceranic" userId="55b8025d37c61089" providerId="LiveId" clId="{ACCD79ED-BFAE-4857-8FB5-603E641725DE}" dt="2024-01-23T23:02:34.360" v="2056" actId="478"/>
-          <ac:spMkLst>
-            <pc:docMk/>
-            <pc:sldMk cId="3488984038" sldId="260"/>
-            <ac:spMk id="4" creationId="{2D85AB7E-DCC5-3DE3-15C2-FA318DBE4726}"/>
-          </ac:spMkLst>
-        </pc:spChg>
-        <pc:spChg chg="add mod">
-          <ac:chgData name="Hunter Ceranic" userId="55b8025d37c61089" providerId="LiveId" clId="{ACCD79ED-BFAE-4857-8FB5-603E641725DE}" dt="2024-01-23T23:28:59.502" v="2171" actId="20577"/>
-          <ac:spMkLst>
-            <pc:docMk/>
-            <pc:sldMk cId="3488984038" sldId="260"/>
-            <ac:spMk id="5" creationId="{1EF2BD1D-C346-969D-0000-25EBA3216018}"/>
-          </ac:spMkLst>
-        </pc:spChg>
-        <pc:graphicFrameChg chg="add mod">
-          <ac:chgData name="Hunter Ceranic" userId="55b8025d37c61089" providerId="LiveId" clId="{ACCD79ED-BFAE-4857-8FB5-603E641725DE}" dt="2024-01-26T19:32:54.795" v="3897" actId="20577"/>
-          <ac:graphicFrameMkLst>
-            <pc:docMk/>
-            <pc:sldMk cId="3488984038" sldId="260"/>
-            <ac:graphicFrameMk id="7" creationId="{F2613A3F-76FA-8E25-8998-F841CA6DA03F}"/>
-          </ac:graphicFrameMkLst>
-        </pc:graphicFrameChg>
-      </pc:sldChg>
-      <pc:sldChg chg="addSp delSp modSp new mod setBg">
-        <pc:chgData name="Hunter Ceranic" userId="55b8025d37c61089" providerId="LiveId" clId="{ACCD79ED-BFAE-4857-8FB5-603E641725DE}" dt="2024-01-23T23:28:36.785" v="2163" actId="20577"/>
-        <pc:sldMkLst>
-          <pc:docMk/>
-          <pc:sldMk cId="464311981" sldId="261"/>
-        </pc:sldMkLst>
-        <pc:spChg chg="mod">
-          <ac:chgData name="Hunter Ceranic" userId="55b8025d37c61089" providerId="LiveId" clId="{ACCD79ED-BFAE-4857-8FB5-603E641725DE}" dt="2024-01-23T21:46:29.427" v="694" actId="26606"/>
-          <ac:spMkLst>
-            <pc:docMk/>
-            <pc:sldMk cId="464311981" sldId="261"/>
-            <ac:spMk id="2" creationId="{5759A1AE-C6A2-3A06-2293-B3DF84DACCF5}"/>
-          </ac:spMkLst>
-        </pc:spChg>
-        <pc:spChg chg="mod">
-          <ac:chgData name="Hunter Ceranic" userId="55b8025d37c61089" providerId="LiveId" clId="{ACCD79ED-BFAE-4857-8FB5-603E641725DE}" dt="2024-01-23T21:46:29.427" v="694" actId="26606"/>
-          <ac:spMkLst>
-            <pc:docMk/>
-            <pc:sldMk cId="464311981" sldId="261"/>
-            <ac:spMk id="3" creationId="{695A74DB-2858-C407-697B-48AD50FE8872}"/>
-          </ac:spMkLst>
-        </pc:spChg>
-        <pc:spChg chg="del mod">
-          <ac:chgData name="Hunter Ceranic" userId="55b8025d37c61089" providerId="LiveId" clId="{ACCD79ED-BFAE-4857-8FB5-603E641725DE}" dt="2024-01-23T23:01:52.491" v="2049" actId="478"/>
-          <ac:spMkLst>
-            <pc:docMk/>
-            <pc:sldMk cId="464311981" sldId="261"/>
-            <ac:spMk id="4" creationId="{D30DDECE-581C-CDF6-B274-8DC06F6492D4}"/>
-          </ac:spMkLst>
-        </pc:spChg>
-        <pc:spChg chg="add del mod">
-          <ac:chgData name="Hunter Ceranic" userId="55b8025d37c61089" providerId="LiveId" clId="{ACCD79ED-BFAE-4857-8FB5-603E641725DE}" dt="2024-01-23T23:28:36.785" v="2163" actId="20577"/>
-          <ac:spMkLst>
-            <pc:docMk/>
-            <pc:sldMk cId="464311981" sldId="261"/>
-            <ac:spMk id="5" creationId="{2CDDB1A3-6053-6F50-7B03-6D5A338CD42D}"/>
-          </ac:spMkLst>
-        </pc:spChg>
-        <pc:spChg chg="add">
-          <ac:chgData name="Hunter Ceranic" userId="55b8025d37c61089" providerId="LiveId" clId="{ACCD79ED-BFAE-4857-8FB5-603E641725DE}" dt="2024-01-23T21:46:29.427" v="694" actId="26606"/>
-          <ac:spMkLst>
-            <pc:docMk/>
-            <pc:sldMk cId="464311981" sldId="261"/>
-            <ac:spMk id="1028" creationId="{4AC6B390-BC59-4F1D-A0EE-D71A92F0A0B2}"/>
-          </ac:spMkLst>
-        </pc:spChg>
-        <pc:spChg chg="add">
-          <ac:chgData name="Hunter Ceranic" userId="55b8025d37c61089" providerId="LiveId" clId="{ACCD79ED-BFAE-4857-8FB5-603E641725DE}" dt="2024-01-23T21:46:29.427" v="694" actId="26606"/>
-          <ac:spMkLst>
-            <pc:docMk/>
-            <pc:sldMk cId="464311981" sldId="261"/>
-            <ac:spMk id="1029" creationId="{B6C60D79-16F1-4C4B-B7E3-7634E7069CDE}"/>
-          </ac:spMkLst>
-        </pc:spChg>
-        <pc:spChg chg="add">
-          <ac:chgData name="Hunter Ceranic" userId="55b8025d37c61089" providerId="LiveId" clId="{ACCD79ED-BFAE-4857-8FB5-603E641725DE}" dt="2024-01-23T21:46:29.427" v="694" actId="26606"/>
-          <ac:spMkLst>
-            <pc:docMk/>
-            <pc:sldMk cId="464311981" sldId="261"/>
-            <ac:spMk id="1030" creationId="{426B127E-6498-4C77-9C9D-4553A5113B80}"/>
-          </ac:spMkLst>
-        </pc:spChg>
-        <pc:spChg chg="add del">
-          <ac:chgData name="Hunter Ceranic" userId="55b8025d37c61089" providerId="LiveId" clId="{ACCD79ED-BFAE-4857-8FB5-603E641725DE}" dt="2024-01-23T21:45:55.687" v="687" actId="26606"/>
-          <ac:spMkLst>
-            <pc:docMk/>
-            <pc:sldMk cId="464311981" sldId="261"/>
-            <ac:spMk id="1031" creationId="{DB304A14-32D0-4873-B914-423ED7B8DAFD}"/>
-          </ac:spMkLst>
-        </pc:spChg>
-        <pc:spChg chg="add del">
-          <ac:chgData name="Hunter Ceranic" userId="55b8025d37c61089" providerId="LiveId" clId="{ACCD79ED-BFAE-4857-8FB5-603E641725DE}" dt="2024-01-23T21:45:55.687" v="687" actId="26606"/>
-          <ac:spMkLst>
-            <pc:docMk/>
-            <pc:sldMk cId="464311981" sldId="261"/>
-            <ac:spMk id="1033" creationId="{1D460C86-854F-4FB3-ABC2-E823D8FEB9DB}"/>
-          </ac:spMkLst>
-        </pc:spChg>
-        <pc:spChg chg="add del">
-          <ac:chgData name="Hunter Ceranic" userId="55b8025d37c61089" providerId="LiveId" clId="{ACCD79ED-BFAE-4857-8FB5-603E641725DE}" dt="2024-01-23T21:45:55.687" v="687" actId="26606"/>
-          <ac:spMkLst>
-            <pc:docMk/>
-            <pc:sldMk cId="464311981" sldId="261"/>
-            <ac:spMk id="1035" creationId="{BB48116A-278A-4CC5-89D3-9DE8E8FF1245}"/>
-          </ac:spMkLst>
-        </pc:spChg>
-        <pc:spChg chg="add del">
-          <ac:chgData name="Hunter Ceranic" userId="55b8025d37c61089" providerId="LiveId" clId="{ACCD79ED-BFAE-4857-8FB5-603E641725DE}" dt="2024-01-23T21:45:46.681" v="684" actId="26606"/>
-          <ac:spMkLst>
-            <pc:docMk/>
-            <pc:sldMk cId="464311981" sldId="261"/>
-            <ac:spMk id="1040" creationId="{9F8A656C-0806-4677-A38B-DA5DF0F3C406}"/>
-          </ac:spMkLst>
-        </pc:spChg>
-        <pc:spChg chg="add del">
-          <ac:chgData name="Hunter Ceranic" userId="55b8025d37c61089" providerId="LiveId" clId="{ACCD79ED-BFAE-4857-8FB5-603E641725DE}" dt="2024-01-23T21:45:46.681" v="684" actId="26606"/>
-          <ac:spMkLst>
-            <pc:docMk/>
-            <pc:sldMk cId="464311981" sldId="261"/>
-            <ac:spMk id="1042" creationId="{9BEF8C6D-8BB3-473A-9607-D7381CC5C0A5}"/>
-          </ac:spMkLst>
-        </pc:spChg>
-        <pc:spChg chg="add del">
-          <ac:chgData name="Hunter Ceranic" userId="55b8025d37c61089" providerId="LiveId" clId="{ACCD79ED-BFAE-4857-8FB5-603E641725DE}" dt="2024-01-23T21:45:46.681" v="684" actId="26606"/>
-          <ac:spMkLst>
-            <pc:docMk/>
-            <pc:sldMk cId="464311981" sldId="261"/>
-            <ac:spMk id="1044" creationId="{DCFDFFB9-D302-4A05-A770-D33232254722}"/>
-          </ac:spMkLst>
-        </pc:spChg>
-        <pc:spChg chg="add del">
-          <ac:chgData name="Hunter Ceranic" userId="55b8025d37c61089" providerId="LiveId" clId="{ACCD79ED-BFAE-4857-8FB5-603E641725DE}" dt="2024-01-23T21:45:54.705" v="686" actId="26606"/>
-          <ac:spMkLst>
-            <pc:docMk/>
-            <pc:sldMk cId="464311981" sldId="261"/>
-            <ac:spMk id="1046" creationId="{5B7778FC-632E-4DCA-A7CB-0D7731CCF970}"/>
-          </ac:spMkLst>
-        </pc:spChg>
-        <pc:spChg chg="add del">
-          <ac:chgData name="Hunter Ceranic" userId="55b8025d37c61089" providerId="LiveId" clId="{ACCD79ED-BFAE-4857-8FB5-603E641725DE}" dt="2024-01-23T21:45:54.705" v="686" actId="26606"/>
-          <ac:spMkLst>
-            <pc:docMk/>
-            <pc:sldMk cId="464311981" sldId="261"/>
-            <ac:spMk id="1047" creationId="{66A3F9DB-B144-47A4-9DB2-706C3908B28B}"/>
-          </ac:spMkLst>
-        </pc:spChg>
-        <pc:spChg chg="add del">
-          <ac:chgData name="Hunter Ceranic" userId="55b8025d37c61089" providerId="LiveId" clId="{ACCD79ED-BFAE-4857-8FB5-603E641725DE}" dt="2024-01-23T21:45:54.705" v="686" actId="26606"/>
-          <ac:spMkLst>
-            <pc:docMk/>
-            <pc:sldMk cId="464311981" sldId="261"/>
-            <ac:spMk id="1048" creationId="{FA23A907-97FB-4A8F-880A-DD77401C4296}"/>
-          </ac:spMkLst>
-        </pc:spChg>
-        <pc:spChg chg="add del">
-          <ac:chgData name="Hunter Ceranic" userId="55b8025d37c61089" providerId="LiveId" clId="{ACCD79ED-BFAE-4857-8FB5-603E641725DE}" dt="2024-01-23T21:45:54.705" v="686" actId="26606"/>
-          <ac:spMkLst>
-            <pc:docMk/>
-            <pc:sldMk cId="464311981" sldId="261"/>
-            <ac:spMk id="1049" creationId="{3D9A74CD-249A-437B-A289-413676038C54}"/>
-          </ac:spMkLst>
-        </pc:spChg>
-        <pc:spChg chg="add del">
-          <ac:chgData name="Hunter Ceranic" userId="55b8025d37c61089" providerId="LiveId" clId="{ACCD79ED-BFAE-4857-8FB5-603E641725DE}" dt="2024-01-23T21:45:54.705" v="686" actId="26606"/>
-          <ac:spMkLst>
-            <pc:docMk/>
-            <pc:sldMk cId="464311981" sldId="261"/>
-            <ac:spMk id="1050" creationId="{B10BB131-AC8E-4A8E-A5D1-36260F720C3B}"/>
-          </ac:spMkLst>
-        </pc:spChg>
-        <pc:picChg chg="add mod ord">
-          <ac:chgData name="Hunter Ceranic" userId="55b8025d37c61089" providerId="LiveId" clId="{ACCD79ED-BFAE-4857-8FB5-603E641725DE}" dt="2024-01-23T21:47:14.701" v="707" actId="1076"/>
-          <ac:picMkLst>
-            <pc:docMk/>
-            <pc:sldMk cId="464311981" sldId="261"/>
-            <ac:picMk id="1026" creationId="{70ADD003-1E8C-44BA-531E-AC9C8AB34361}"/>
-          </ac:picMkLst>
-        </pc:picChg>
-      </pc:sldChg>
-      <pc:sldChg chg="modSp new del mod">
-        <pc:chgData name="Hunter Ceranic" userId="55b8025d37c61089" providerId="LiveId" clId="{ACCD79ED-BFAE-4857-8FB5-603E641725DE}" dt="2024-01-23T20:13:23.600" v="214" actId="47"/>
-        <pc:sldMkLst>
-          <pc:docMk/>
-          <pc:sldMk cId="3707100649" sldId="261"/>
-        </pc:sldMkLst>
-        <pc:spChg chg="mod">
-          <ac:chgData name="Hunter Ceranic" userId="55b8025d37c61089" providerId="LiveId" clId="{ACCD79ED-BFAE-4857-8FB5-603E641725DE}" dt="2024-01-23T20:13:20.100" v="213" actId="20577"/>
-          <ac:spMkLst>
-            <pc:docMk/>
-            <pc:sldMk cId="3707100649" sldId="261"/>
-            <ac:spMk id="2" creationId="{9D3A01FA-204E-455B-9EFB-5F0C2BD527F6}"/>
-          </ac:spMkLst>
-        </pc:spChg>
-      </pc:sldChg>
-      <pc:sldChg chg="addSp delSp modSp new mod">
-        <pc:chgData name="Hunter Ceranic" userId="55b8025d37c61089" providerId="LiveId" clId="{ACCD79ED-BFAE-4857-8FB5-603E641725DE}" dt="2024-01-25T18:40:01.439" v="3766" actId="20577"/>
-        <pc:sldMkLst>
-          <pc:docMk/>
-          <pc:sldMk cId="1282139663" sldId="262"/>
-        </pc:sldMkLst>
-        <pc:spChg chg="mod">
-          <ac:chgData name="Hunter Ceranic" userId="55b8025d37c61089" providerId="LiveId" clId="{ACCD79ED-BFAE-4857-8FB5-603E641725DE}" dt="2024-01-23T22:58:15.844" v="2034" actId="20577"/>
-          <ac:spMkLst>
-            <pc:docMk/>
-            <pc:sldMk cId="1282139663" sldId="262"/>
-            <ac:spMk id="2" creationId="{C7DF1014-ECEC-7D05-6120-59AD338C5A43}"/>
-          </ac:spMkLst>
-        </pc:spChg>
-        <pc:spChg chg="del">
-          <ac:chgData name="Hunter Ceranic" userId="55b8025d37c61089" providerId="LiveId" clId="{ACCD79ED-BFAE-4857-8FB5-603E641725DE}" dt="2024-01-23T23:05:33.657" v="2066" actId="22"/>
-          <ac:spMkLst>
-            <pc:docMk/>
-            <pc:sldMk cId="1282139663" sldId="262"/>
-            <ac:spMk id="3" creationId="{59C5325B-F8B9-2637-BA82-958759232544}"/>
-          </ac:spMkLst>
-        </pc:spChg>
-        <pc:spChg chg="add del mod">
-          <ac:chgData name="Hunter Ceranic" userId="55b8025d37c61089" providerId="LiveId" clId="{ACCD79ED-BFAE-4857-8FB5-603E641725DE}" dt="2024-01-25T18:20:46.932" v="2967"/>
-          <ac:spMkLst>
-            <pc:docMk/>
-            <pc:sldMk cId="1282139663" sldId="262"/>
-            <ac:spMk id="3" creationId="{ECC3CD7B-F688-43CC-85A5-F53C9476B355}"/>
-          </ac:spMkLst>
-        </pc:spChg>
-        <pc:spChg chg="del">
-          <ac:chgData name="Hunter Ceranic" userId="55b8025d37c61089" providerId="LiveId" clId="{ACCD79ED-BFAE-4857-8FB5-603E641725DE}" dt="2024-01-23T23:02:29.485" v="2054" actId="478"/>
-          <ac:spMkLst>
-            <pc:docMk/>
-            <pc:sldMk cId="1282139663" sldId="262"/>
-            <ac:spMk id="4" creationId="{75F6C9A0-FC62-99D8-A1BC-30B9E3E9DEC5}"/>
-          </ac:spMkLst>
-        </pc:spChg>
-        <pc:spChg chg="add mod">
-          <ac:chgData name="Hunter Ceranic" userId="55b8025d37c61089" providerId="LiveId" clId="{ACCD79ED-BFAE-4857-8FB5-603E641725DE}" dt="2024-01-25T18:40:01.439" v="3766" actId="20577"/>
-          <ac:spMkLst>
-            <pc:docMk/>
-            <pc:sldMk cId="1282139663" sldId="262"/>
-            <ac:spMk id="4" creationId="{879D1B30-BABA-4E25-8DC7-414D66E57876}"/>
-          </ac:spMkLst>
-        </pc:spChg>
-        <pc:spChg chg="add mod">
-          <ac:chgData name="Hunter Ceranic" userId="55b8025d37c61089" providerId="LiveId" clId="{ACCD79ED-BFAE-4857-8FB5-603E641725DE}" dt="2024-01-23T23:28:45.721" v="2167" actId="20577"/>
-          <ac:spMkLst>
-            <pc:docMk/>
-            <pc:sldMk cId="1282139663" sldId="262"/>
-            <ac:spMk id="5" creationId="{1C012839-D1DE-7D8C-C13D-1405FD0457A8}"/>
-          </ac:spMkLst>
-        </pc:spChg>
-        <pc:spChg chg="add del mod">
-          <ac:chgData name="Hunter Ceranic" userId="55b8025d37c61089" providerId="LiveId" clId="{ACCD79ED-BFAE-4857-8FB5-603E641725DE}" dt="2024-01-25T18:23:37.451" v="3115" actId="478"/>
-          <ac:spMkLst>
-            <pc:docMk/>
-            <pc:sldMk cId="1282139663" sldId="262"/>
-            <ac:spMk id="8" creationId="{4B460578-77A7-3F34-E220-6441A40FB3FE}"/>
-          </ac:spMkLst>
-        </pc:spChg>
-        <pc:spChg chg="add mod">
-          <ac:chgData name="Hunter Ceranic" userId="55b8025d37c61089" providerId="LiveId" clId="{ACCD79ED-BFAE-4857-8FB5-603E641725DE}" dt="2024-01-25T18:28:58.057" v="3279" actId="20577"/>
-          <ac:spMkLst>
-            <pc:docMk/>
-            <pc:sldMk cId="1282139663" sldId="262"/>
-            <ac:spMk id="10" creationId="{F2FFC939-605E-CFC2-B711-0B24C4C1DF3D}"/>
-          </ac:spMkLst>
-        </pc:spChg>
-        <pc:grpChg chg="add mod">
-          <ac:chgData name="Hunter Ceranic" userId="55b8025d37c61089" providerId="LiveId" clId="{ACCD79ED-BFAE-4857-8FB5-603E641725DE}" dt="2024-01-25T18:23:30.185" v="3112" actId="1076"/>
-          <ac:grpSpMkLst>
-            <pc:docMk/>
-            <pc:sldMk cId="1282139663" sldId="262"/>
-            <ac:grpSpMk id="15" creationId="{8BF43C64-2CCA-9F17-AB62-3165ADE233AB}"/>
-          </ac:grpSpMkLst>
-        </pc:grpChg>
-        <pc:picChg chg="add mod">
-          <ac:chgData name="Hunter Ceranic" userId="55b8025d37c61089" providerId="LiveId" clId="{ACCD79ED-BFAE-4857-8FB5-603E641725DE}" dt="2024-01-25T18:23:10.562" v="3108" actId="1076"/>
-          <ac:picMkLst>
-            <pc:docMk/>
-            <pc:sldMk cId="1282139663" sldId="262"/>
-            <ac:picMk id="7" creationId="{CAE9B0C0-7090-D085-8979-B49AF6DAF264}"/>
-          </ac:picMkLst>
-        </pc:picChg>
-        <pc:picChg chg="add mod">
-          <ac:chgData name="Hunter Ceranic" userId="55b8025d37c61089" providerId="LiveId" clId="{ACCD79ED-BFAE-4857-8FB5-603E641725DE}" dt="2024-01-25T18:23:10.562" v="3108" actId="1076"/>
-          <ac:picMkLst>
-            <pc:docMk/>
-            <pc:sldMk cId="1282139663" sldId="262"/>
-            <ac:picMk id="9" creationId="{4C1A88EA-8389-DD90-1A57-B3C56972839A}"/>
-          </ac:picMkLst>
-        </pc:picChg>
-        <pc:picChg chg="add mod ord">
-          <ac:chgData name="Hunter Ceranic" userId="55b8025d37c61089" providerId="LiveId" clId="{ACCD79ED-BFAE-4857-8FB5-603E641725DE}" dt="2024-01-25T18:23:30.185" v="3112" actId="1076"/>
-          <ac:picMkLst>
-            <pc:docMk/>
-            <pc:sldMk cId="1282139663" sldId="262"/>
-            <ac:picMk id="11" creationId="{3069CF3F-2488-0D3C-36B1-96C29EF328C3}"/>
-          </ac:picMkLst>
-        </pc:picChg>
-        <pc:picChg chg="add mod">
-          <ac:chgData name="Hunter Ceranic" userId="55b8025d37c61089" providerId="LiveId" clId="{ACCD79ED-BFAE-4857-8FB5-603E641725DE}" dt="2024-01-23T23:07:10.901" v="2086" actId="164"/>
-          <ac:picMkLst>
-            <pc:docMk/>
-            <pc:sldMk cId="1282139663" sldId="262"/>
-            <ac:picMk id="12" creationId="{1D66D614-DB0E-70BC-5CE5-E90ACF60A7ED}"/>
-          </ac:picMkLst>
-        </pc:picChg>
-        <pc:picChg chg="add mod">
-          <ac:chgData name="Hunter Ceranic" userId="55b8025d37c61089" providerId="LiveId" clId="{ACCD79ED-BFAE-4857-8FB5-603E641725DE}" dt="2024-01-23T23:07:10.901" v="2086" actId="164"/>
-          <ac:picMkLst>
-            <pc:docMk/>
-            <pc:sldMk cId="1282139663" sldId="262"/>
-            <ac:picMk id="14" creationId="{FC818FE4-B411-1A79-4D4F-931900CDC4FD}"/>
-          </ac:picMkLst>
-        </pc:picChg>
-        <pc:picChg chg="add mod">
-          <ac:chgData name="Hunter Ceranic" userId="55b8025d37c61089" providerId="LiveId" clId="{ACCD79ED-BFAE-4857-8FB5-603E641725DE}" dt="2024-01-25T18:23:30.185" v="3112" actId="1076"/>
-          <ac:picMkLst>
-            <pc:docMk/>
-            <pc:sldMk cId="1282139663" sldId="262"/>
-            <ac:picMk id="17" creationId="{8924486C-65A4-1784-1B5D-76149A672E25}"/>
-          </ac:picMkLst>
-        </pc:picChg>
-        <pc:picChg chg="add mod">
-          <ac:chgData name="Hunter Ceranic" userId="55b8025d37c61089" providerId="LiveId" clId="{ACCD79ED-BFAE-4857-8FB5-603E641725DE}" dt="2024-01-25T18:23:30.185" v="3112" actId="1076"/>
-          <ac:picMkLst>
-            <pc:docMk/>
-            <pc:sldMk cId="1282139663" sldId="262"/>
-            <ac:picMk id="19" creationId="{05A4DA08-7B97-9D43-0DBC-42C46123E6FC}"/>
-          </ac:picMkLst>
-        </pc:picChg>
-      </pc:sldChg>
-      <pc:sldChg chg="addSp delSp modSp add mod">
-        <pc:chgData name="Hunter Ceranic" userId="55b8025d37c61089" providerId="LiveId" clId="{ACCD79ED-BFAE-4857-8FB5-603E641725DE}" dt="2024-01-25T18:35:54.266" v="3602" actId="20577"/>
-        <pc:sldMkLst>
-          <pc:docMk/>
-          <pc:sldMk cId="3991598736" sldId="263"/>
-        </pc:sldMkLst>
-        <pc:spChg chg="mod">
-          <ac:chgData name="Hunter Ceranic" userId="55b8025d37c61089" providerId="LiveId" clId="{ACCD79ED-BFAE-4857-8FB5-603E641725DE}" dt="2024-01-23T23:23:23.894" v="2157" actId="1076"/>
-          <ac:spMkLst>
-            <pc:docMk/>
-            <pc:sldMk cId="3991598736" sldId="263"/>
-            <ac:spMk id="2" creationId="{C7DF1014-ECEC-7D05-6120-59AD338C5A43}"/>
-          </ac:spMkLst>
-        </pc:spChg>
-        <pc:spChg chg="mod">
-          <ac:chgData name="Hunter Ceranic" userId="55b8025d37c61089" providerId="LiveId" clId="{ACCD79ED-BFAE-4857-8FB5-603E641725DE}" dt="2024-01-23T23:28:50.673" v="2169" actId="20577"/>
-          <ac:spMkLst>
-            <pc:docMk/>
-            <pc:sldMk cId="3991598736" sldId="263"/>
-            <ac:spMk id="5" creationId="{1C012839-D1DE-7D8C-C13D-1405FD0457A8}"/>
-          </ac:spMkLst>
-        </pc:spChg>
-        <pc:spChg chg="add mod">
-          <ac:chgData name="Hunter Ceranic" userId="55b8025d37c61089" providerId="LiveId" clId="{ACCD79ED-BFAE-4857-8FB5-603E641725DE}" dt="2024-01-25T18:30:27.245" v="3389" actId="1076"/>
-          <ac:spMkLst>
-            <pc:docMk/>
-            <pc:sldMk cId="3991598736" sldId="263"/>
-            <ac:spMk id="7" creationId="{22456EFC-985E-970A-C327-2EB845063E37}"/>
-          </ac:spMkLst>
-        </pc:spChg>
-        <pc:spChg chg="add del mod">
-          <ac:chgData name="Hunter Ceranic" userId="55b8025d37c61089" providerId="LiveId" clId="{ACCD79ED-BFAE-4857-8FB5-603E641725DE}" dt="2024-01-25T18:31:39.591" v="3443" actId="478"/>
-          <ac:spMkLst>
-            <pc:docMk/>
-            <pc:sldMk cId="3991598736" sldId="263"/>
-            <ac:spMk id="9" creationId="{3F2C67EA-5276-6446-ED9E-06A767E64FA6}"/>
-          </ac:spMkLst>
-        </pc:spChg>
-        <pc:spChg chg="add del mod">
-          <ac:chgData name="Hunter Ceranic" userId="55b8025d37c61089" providerId="LiveId" clId="{ACCD79ED-BFAE-4857-8FB5-603E641725DE}" dt="2024-01-25T18:31:38.302" v="3442" actId="478"/>
-          <ac:spMkLst>
-            <pc:docMk/>
-            <pc:sldMk cId="3991598736" sldId="263"/>
-            <ac:spMk id="11" creationId="{4FFC0959-86ED-0779-02C5-C3A8D5996D11}"/>
-          </ac:spMkLst>
-        </pc:spChg>
-        <pc:spChg chg="add del mod">
-          <ac:chgData name="Hunter Ceranic" userId="55b8025d37c61089" providerId="LiveId" clId="{ACCD79ED-BFAE-4857-8FB5-603E641725DE}" dt="2024-01-23T23:17:50.713" v="2105" actId="478"/>
-          <ac:spMkLst>
-            <pc:docMk/>
-            <pc:sldMk cId="3991598736" sldId="263"/>
-            <ac:spMk id="13" creationId="{63C58497-E746-C9F9-0306-6697E82AD78F}"/>
-          </ac:spMkLst>
-        </pc:spChg>
-        <pc:spChg chg="add mod">
-          <ac:chgData name="Hunter Ceranic" userId="55b8025d37c61089" providerId="LiveId" clId="{ACCD79ED-BFAE-4857-8FB5-603E641725DE}" dt="2024-01-25T18:31:32.793" v="3437" actId="1076"/>
-          <ac:spMkLst>
-            <pc:docMk/>
-            <pc:sldMk cId="3991598736" sldId="263"/>
-            <ac:spMk id="13" creationId="{E43FED9A-2A92-4571-1C1C-6656F34985C2}"/>
-          </ac:spMkLst>
-        </pc:spChg>
-        <pc:spChg chg="add mod">
-          <ac:chgData name="Hunter Ceranic" userId="55b8025d37c61089" providerId="LiveId" clId="{ACCD79ED-BFAE-4857-8FB5-603E641725DE}" dt="2024-01-25T18:34:40.932" v="3481" actId="20577"/>
-          <ac:spMkLst>
-            <pc:docMk/>
-            <pc:sldMk cId="3991598736" sldId="263"/>
-            <ac:spMk id="16" creationId="{EED00A11-2962-E5ED-5BC0-9866E16ACA9D}"/>
-          </ac:spMkLst>
-        </pc:spChg>
-        <pc:spChg chg="add mod">
-          <ac:chgData name="Hunter Ceranic" userId="55b8025d37c61089" providerId="LiveId" clId="{ACCD79ED-BFAE-4857-8FB5-603E641725DE}" dt="2024-01-25T18:35:54.266" v="3602" actId="20577"/>
-          <ac:spMkLst>
-            <pc:docMk/>
-            <pc:sldMk cId="3991598736" sldId="263"/>
-            <ac:spMk id="20" creationId="{83EB794A-CC3C-62A8-A283-6C146460011C}"/>
-          </ac:spMkLst>
-        </pc:spChg>
-        <pc:spChg chg="add mod">
-          <ac:chgData name="Hunter Ceranic" userId="55b8025d37c61089" providerId="LiveId" clId="{ACCD79ED-BFAE-4857-8FB5-603E641725DE}" dt="2024-01-23T23:23:13.581" v="2155" actId="164"/>
-          <ac:spMkLst>
-            <pc:docMk/>
-            <pc:sldMk cId="3991598736" sldId="263"/>
-            <ac:spMk id="24" creationId="{EB34267C-288C-639B-66A1-4905FC7EC930}"/>
-          </ac:spMkLst>
-        </pc:spChg>
-        <pc:grpChg chg="add mod">
-          <ac:chgData name="Hunter Ceranic" userId="55b8025d37c61089" providerId="LiveId" clId="{ACCD79ED-BFAE-4857-8FB5-603E641725DE}" dt="2024-01-25T18:29:45.977" v="3281" actId="1076"/>
-          <ac:grpSpMkLst>
-            <pc:docMk/>
-            <pc:sldMk cId="3991598736" sldId="263"/>
-            <ac:grpSpMk id="4" creationId="{C8DB01BA-7B2F-4507-076E-3088CE34B57D}"/>
-          </ac:grpSpMkLst>
-        </pc:grpChg>
-        <pc:grpChg chg="del mod">
-          <ac:chgData name="Hunter Ceranic" userId="55b8025d37c61089" providerId="LiveId" clId="{ACCD79ED-BFAE-4857-8FB5-603E641725DE}" dt="2024-01-23T23:17:48.564" v="2103" actId="478"/>
-          <ac:grpSpMkLst>
-            <pc:docMk/>
-            <pc:sldMk cId="3991598736" sldId="263"/>
-            <ac:grpSpMk id="15" creationId="{8BF43C64-2CCA-9F17-AB62-3165ADE233AB}"/>
-          </ac:grpSpMkLst>
-        </pc:grpChg>
-        <pc:grpChg chg="add mod">
-          <ac:chgData name="Hunter Ceranic" userId="55b8025d37c61089" providerId="LiveId" clId="{ACCD79ED-BFAE-4857-8FB5-603E641725DE}" dt="2024-01-25T18:31:32.793" v="3437" actId="1076"/>
-          <ac:grpSpMkLst>
-            <pc:docMk/>
-            <pc:sldMk cId="3991598736" sldId="263"/>
-            <ac:grpSpMk id="25" creationId="{60D647CB-16C3-AAA2-9107-5D1150C5A87B}"/>
-          </ac:grpSpMkLst>
-        </pc:grpChg>
-        <pc:picChg chg="add mod">
-          <ac:chgData name="Hunter Ceranic" userId="55b8025d37c61089" providerId="LiveId" clId="{ACCD79ED-BFAE-4857-8FB5-603E641725DE}" dt="2024-01-25T18:29:45.977" v="3281" actId="1076"/>
-          <ac:picMkLst>
-            <pc:docMk/>
-            <pc:sldMk cId="3991598736" sldId="263"/>
-            <ac:picMk id="3" creationId="{188D2A99-F2E5-CD1E-1A92-A24E47DCB195}"/>
-          </ac:picMkLst>
-        </pc:picChg>
-        <pc:picChg chg="mod">
-          <ac:chgData name="Hunter Ceranic" userId="55b8025d37c61089" providerId="LiveId" clId="{ACCD79ED-BFAE-4857-8FB5-603E641725DE}" dt="2024-01-23T23:17:38.209" v="2098" actId="571"/>
-          <ac:picMkLst>
-            <pc:docMk/>
-            <pc:sldMk cId="3991598736" sldId="263"/>
-            <ac:picMk id="6" creationId="{FDE3D38A-9C66-6F73-2041-023FA88F7996}"/>
-          </ac:picMkLst>
-        </pc:picChg>
-        <pc:picChg chg="del">
-          <ac:chgData name="Hunter Ceranic" userId="55b8025d37c61089" providerId="LiveId" clId="{ACCD79ED-BFAE-4857-8FB5-603E641725DE}" dt="2024-01-23T23:16:55.113" v="2094" actId="478"/>
-          <ac:picMkLst>
-            <pc:docMk/>
-            <pc:sldMk cId="3991598736" sldId="263"/>
-            <ac:picMk id="7" creationId="{CAE9B0C0-7090-D085-8979-B49AF6DAF264}"/>
-          </ac:picMkLst>
-        </pc:picChg>
-        <pc:picChg chg="mod">
-          <ac:chgData name="Hunter Ceranic" userId="55b8025d37c61089" providerId="LiveId" clId="{ACCD79ED-BFAE-4857-8FB5-603E641725DE}" dt="2024-01-23T23:17:38.209" v="2098" actId="571"/>
-          <ac:picMkLst>
-            <pc:docMk/>
-            <pc:sldMk cId="3991598736" sldId="263"/>
-            <ac:picMk id="8" creationId="{F9DC0517-381E-8C68-0772-9D311F56BD9D}"/>
-          </ac:picMkLst>
-        </pc:picChg>
-        <pc:picChg chg="del">
-          <ac:chgData name="Hunter Ceranic" userId="55b8025d37c61089" providerId="LiveId" clId="{ACCD79ED-BFAE-4857-8FB5-603E641725DE}" dt="2024-01-23T23:16:56.611" v="2095" actId="478"/>
-          <ac:picMkLst>
-            <pc:docMk/>
-            <pc:sldMk cId="3991598736" sldId="263"/>
-            <ac:picMk id="9" creationId="{4C1A88EA-8389-DD90-1A57-B3C56972839A}"/>
-          </ac:picMkLst>
-        </pc:picChg>
-        <pc:picChg chg="add del mod">
-          <ac:chgData name="Hunter Ceranic" userId="55b8025d37c61089" providerId="LiveId" clId="{ACCD79ED-BFAE-4857-8FB5-603E641725DE}" dt="2024-01-25T18:31:35.133" v="3438" actId="478"/>
-          <ac:picMkLst>
-            <pc:docMk/>
-            <pc:sldMk cId="3991598736" sldId="263"/>
-            <ac:picMk id="10" creationId="{FE6021C7-3858-9194-3F46-1860A92FDA46}"/>
-          </ac:picMkLst>
-        </pc:picChg>
-        <pc:picChg chg="del mod">
-          <ac:chgData name="Hunter Ceranic" userId="55b8025d37c61089" providerId="LiveId" clId="{ACCD79ED-BFAE-4857-8FB5-603E641725DE}" dt="2024-01-23T23:17:46.143" v="2101" actId="478"/>
-          <ac:picMkLst>
-            <pc:docMk/>
-            <pc:sldMk cId="3991598736" sldId="263"/>
-            <ac:picMk id="11" creationId="{3069CF3F-2488-0D3C-36B1-96C29EF328C3}"/>
-          </ac:picMkLst>
-        </pc:picChg>
-        <pc:picChg chg="add mod">
-          <ac:chgData name="Hunter Ceranic" userId="55b8025d37c61089" providerId="LiveId" clId="{ACCD79ED-BFAE-4857-8FB5-603E641725DE}" dt="2024-01-25T18:31:32.793" v="3437" actId="1076"/>
-          <ac:picMkLst>
-            <pc:docMk/>
-            <pc:sldMk cId="3991598736" sldId="263"/>
-            <ac:picMk id="12" creationId="{DF53D8E0-B665-2D4A-348D-B47AFE9708C9}"/>
-          </ac:picMkLst>
-        </pc:picChg>
-        <pc:picChg chg="add mod">
-          <ac:chgData name="Hunter Ceranic" userId="55b8025d37c61089" providerId="LiveId" clId="{ACCD79ED-BFAE-4857-8FB5-603E641725DE}" dt="2024-01-25T18:34:55.793" v="3488" actId="1076"/>
-          <ac:picMkLst>
-            <pc:docMk/>
-            <pc:sldMk cId="3991598736" sldId="263"/>
-            <ac:picMk id="15" creationId="{852CFD5C-D134-1217-A844-D8C319D5B4D9}"/>
-          </ac:picMkLst>
-        </pc:picChg>
-        <pc:picChg chg="mod">
-          <ac:chgData name="Hunter Ceranic" userId="55b8025d37c61089" providerId="LiveId" clId="{ACCD79ED-BFAE-4857-8FB5-603E641725DE}" dt="2024-01-25T18:29:45.977" v="3281" actId="1076"/>
-          <ac:picMkLst>
-            <pc:docMk/>
-            <pc:sldMk cId="3991598736" sldId="263"/>
-            <ac:picMk id="17" creationId="{8924486C-65A4-1784-1B5D-76149A672E25}"/>
-          </ac:picMkLst>
-        </pc:picChg>
-        <pc:picChg chg="add mod">
-          <ac:chgData name="Hunter Ceranic" userId="55b8025d37c61089" providerId="LiveId" clId="{ACCD79ED-BFAE-4857-8FB5-603E641725DE}" dt="2024-01-23T23:18:19.273" v="2112" actId="1076"/>
-          <ac:picMkLst>
-            <pc:docMk/>
-            <pc:sldMk cId="3991598736" sldId="263"/>
-            <ac:picMk id="18" creationId="{008207FC-5882-DC9A-0373-D4D4E6A2A2C9}"/>
-          </ac:picMkLst>
-        </pc:picChg>
-        <pc:picChg chg="add mod">
-          <ac:chgData name="Hunter Ceranic" userId="55b8025d37c61089" providerId="LiveId" clId="{ACCD79ED-BFAE-4857-8FB5-603E641725DE}" dt="2024-01-25T18:29:45.977" v="3281" actId="1076"/>
-          <ac:picMkLst>
-            <pc:docMk/>
-            <pc:sldMk cId="3991598736" sldId="263"/>
-            <ac:picMk id="19" creationId="{C472703C-E5CB-485B-1C4B-6C06C353025B}"/>
-          </ac:picMkLst>
-        </pc:picChg>
-        <pc:picChg chg="add del mod">
-          <ac:chgData name="Hunter Ceranic" userId="55b8025d37c61089" providerId="LiveId" clId="{ACCD79ED-BFAE-4857-8FB5-603E641725DE}" dt="2024-01-25T18:31:35.859" v="3440" actId="478"/>
-          <ac:picMkLst>
-            <pc:docMk/>
-            <pc:sldMk cId="3991598736" sldId="263"/>
-            <ac:picMk id="21" creationId="{22BCAE72-C73D-9A1B-AD54-EF4BE002B961}"/>
-          </ac:picMkLst>
-        </pc:picChg>
-        <pc:picChg chg="add mod">
-          <ac:chgData name="Hunter Ceranic" userId="55b8025d37c61089" providerId="LiveId" clId="{ACCD79ED-BFAE-4857-8FB5-603E641725DE}" dt="2024-01-23T23:23:13.581" v="2155" actId="164"/>
-          <ac:picMkLst>
-            <pc:docMk/>
-            <pc:sldMk cId="3991598736" sldId="263"/>
-            <ac:picMk id="23" creationId="{D5A7F495-D13B-6671-931E-84CDD5F86A04}"/>
-          </ac:picMkLst>
-        </pc:picChg>
-        <pc:cxnChg chg="add del">
-          <ac:chgData name="Hunter Ceranic" userId="55b8025d37c61089" providerId="LiveId" clId="{ACCD79ED-BFAE-4857-8FB5-603E641725DE}" dt="2024-01-23T23:23:40.994" v="2159" actId="11529"/>
-          <ac:cxnSpMkLst>
-            <pc:docMk/>
-            <pc:sldMk cId="3991598736" sldId="263"/>
-            <ac:cxnSpMk id="27" creationId="{9968B0D0-7ADE-3600-D321-29F36A077B89}"/>
-          </ac:cxnSpMkLst>
-        </pc:cxnChg>
-      </pc:sldChg>
-      <pc:sldChg chg="addSp delSp modSp new mod setBg modClrScheme addAnim setClrOvrMap chgLayout">
-        <pc:chgData name="Hunter Ceranic" userId="55b8025d37c61089" providerId="LiveId" clId="{ACCD79ED-BFAE-4857-8FB5-603E641725DE}" dt="2024-01-25T18:38:04.545" v="3720" actId="20577"/>
-        <pc:sldMkLst>
-          <pc:docMk/>
-          <pc:sldMk cId="998881358" sldId="264"/>
-        </pc:sldMkLst>
-        <pc:spChg chg="del mod ord">
-          <ac:chgData name="Hunter Ceranic" userId="55b8025d37c61089" providerId="LiveId" clId="{ACCD79ED-BFAE-4857-8FB5-603E641725DE}" dt="2024-01-25T18:37:29.838" v="3664" actId="700"/>
-          <ac:spMkLst>
-            <pc:docMk/>
-            <pc:sldMk cId="998881358" sldId="264"/>
-            <ac:spMk id="2" creationId="{0EC9A651-EBA2-BCC3-50E8-143A868D23F0}"/>
-          </ac:spMkLst>
-        </pc:spChg>
-        <pc:spChg chg="del mod ord">
-          <ac:chgData name="Hunter Ceranic" userId="55b8025d37c61089" providerId="LiveId" clId="{ACCD79ED-BFAE-4857-8FB5-603E641725DE}" dt="2024-01-25T18:37:29.838" v="3664" actId="700"/>
-          <ac:spMkLst>
-            <pc:docMk/>
-            <pc:sldMk cId="998881358" sldId="264"/>
-            <ac:spMk id="3" creationId="{B3A338AE-D5B8-D9CA-36E4-B21C2987CA31}"/>
-          </ac:spMkLst>
-        </pc:spChg>
-        <pc:spChg chg="mod ord">
-          <ac:chgData name="Hunter Ceranic" userId="55b8025d37c61089" providerId="LiveId" clId="{ACCD79ED-BFAE-4857-8FB5-603E641725DE}" dt="2024-01-25T18:37:57.008" v="3715" actId="26606"/>
-          <ac:spMkLst>
-            <pc:docMk/>
-            <pc:sldMk cId="998881358" sldId="264"/>
-            <ac:spMk id="4" creationId="{C453327A-C23C-C9D1-22BB-AE6780AE9D55}"/>
-          </ac:spMkLst>
-        </pc:spChg>
-        <pc:spChg chg="add mod ord">
-          <ac:chgData name="Hunter Ceranic" userId="55b8025d37c61089" providerId="LiveId" clId="{ACCD79ED-BFAE-4857-8FB5-603E641725DE}" dt="2024-01-25T18:37:57.008" v="3715" actId="26606"/>
-          <ac:spMkLst>
-            <pc:docMk/>
-            <pc:sldMk cId="998881358" sldId="264"/>
-            <ac:spMk id="5" creationId="{49CB1C78-12AF-9A3C-FA38-1ECA637CC7AB}"/>
-          </ac:spMkLst>
-        </pc:spChg>
-        <pc:spChg chg="add mod ord">
-          <ac:chgData name="Hunter Ceranic" userId="55b8025d37c61089" providerId="LiveId" clId="{ACCD79ED-BFAE-4857-8FB5-603E641725DE}" dt="2024-01-25T18:38:04.545" v="3720" actId="20577"/>
-          <ac:spMkLst>
-            <pc:docMk/>
-            <pc:sldMk cId="998881358" sldId="264"/>
-            <ac:spMk id="6" creationId="{666762D2-772A-C48E-C9CF-8B510F2FA513}"/>
-          </ac:spMkLst>
-        </pc:spChg>
-        <pc:spChg chg="add">
-          <ac:chgData name="Hunter Ceranic" userId="55b8025d37c61089" providerId="LiveId" clId="{ACCD79ED-BFAE-4857-8FB5-603E641725DE}" dt="2024-01-25T18:37:57.008" v="3715" actId="26606"/>
-          <ac:spMkLst>
-            <pc:docMk/>
-            <pc:sldMk cId="998881358" sldId="264"/>
-            <ac:spMk id="12" creationId="{0671A8AE-40A1-4631-A6B8-581AFF065482}"/>
-          </ac:spMkLst>
-        </pc:spChg>
-        <pc:spChg chg="add">
-          <ac:chgData name="Hunter Ceranic" userId="55b8025d37c61089" providerId="LiveId" clId="{ACCD79ED-BFAE-4857-8FB5-603E641725DE}" dt="2024-01-25T18:37:57.008" v="3715" actId="26606"/>
-          <ac:spMkLst>
-            <pc:docMk/>
-            <pc:sldMk cId="998881358" sldId="264"/>
-            <ac:spMk id="14" creationId="{A44CD100-6267-4E62-AA64-2182A3A6A1C0}"/>
-          </ac:spMkLst>
-        </pc:spChg>
-        <pc:picChg chg="add">
-          <ac:chgData name="Hunter Ceranic" userId="55b8025d37c61089" providerId="LiveId" clId="{ACCD79ED-BFAE-4857-8FB5-603E641725DE}" dt="2024-01-25T18:37:57.008" v="3715" actId="26606"/>
-          <ac:picMkLst>
-            <pc:docMk/>
-            <pc:sldMk cId="998881358" sldId="264"/>
-            <ac:picMk id="8" creationId="{6F197B8F-C90C-17EF-FBF7-04F6F2F6EF94}"/>
-          </ac:picMkLst>
-        </pc:picChg>
-      </pc:sldChg>
-      <pc:sldChg chg="new del">
-        <pc:chgData name="Hunter Ceranic" userId="55b8025d37c61089" providerId="LiveId" clId="{ACCD79ED-BFAE-4857-8FB5-603E641725DE}" dt="2024-01-26T18:32:03.346" v="3768" actId="680"/>
-        <pc:sldMkLst>
-          <pc:docMk/>
-          <pc:sldMk cId="1351124811" sldId="265"/>
-        </pc:sldMkLst>
-      </pc:sldChg>
-      <pc:sldMasterChg chg="add del addSldLayout delSldLayout">
-        <pc:chgData name="Hunter Ceranic" userId="55b8025d37c61089" providerId="LiveId" clId="{ACCD79ED-BFAE-4857-8FB5-603E641725DE}" dt="2024-01-23T20:03:02.922" v="3" actId="26606"/>
-        <pc:sldMasterMkLst>
-          <pc:docMk/>
-          <pc:sldMasterMk cId="3109401901" sldId="2147483648"/>
-        </pc:sldMasterMkLst>
-        <pc:sldLayoutChg chg="add del">
-          <pc:chgData name="Hunter Ceranic" userId="55b8025d37c61089" providerId="LiveId" clId="{ACCD79ED-BFAE-4857-8FB5-603E641725DE}" dt="2024-01-23T20:03:02.922" v="3" actId="26606"/>
-          <pc:sldLayoutMkLst>
-            <pc:docMk/>
-            <pc:sldMasterMk cId="3109401901" sldId="2147483648"/>
-            <pc:sldLayoutMk cId="513548861" sldId="2147483649"/>
-          </pc:sldLayoutMkLst>
-        </pc:sldLayoutChg>
-        <pc:sldLayoutChg chg="add del">
-          <pc:chgData name="Hunter Ceranic" userId="55b8025d37c61089" providerId="LiveId" clId="{ACCD79ED-BFAE-4857-8FB5-603E641725DE}" dt="2024-01-23T20:03:02.922" v="3" actId="26606"/>
-          <pc:sldLayoutMkLst>
-            <pc:docMk/>
-            <pc:sldMasterMk cId="3109401901" sldId="2147483648"/>
-            <pc:sldLayoutMk cId="4183330876" sldId="2147483650"/>
-          </pc:sldLayoutMkLst>
-        </pc:sldLayoutChg>
-        <pc:sldLayoutChg chg="add del">
-          <pc:chgData name="Hunter Ceranic" userId="55b8025d37c61089" providerId="LiveId" clId="{ACCD79ED-BFAE-4857-8FB5-603E641725DE}" dt="2024-01-23T20:03:02.922" v="3" actId="26606"/>
-          <pc:sldLayoutMkLst>
-            <pc:docMk/>
-            <pc:sldMasterMk cId="3109401901" sldId="2147483648"/>
-            <pc:sldLayoutMk cId="2763240192" sldId="2147483651"/>
-          </pc:sldLayoutMkLst>
-        </pc:sldLayoutChg>
-        <pc:sldLayoutChg chg="add del">
-          <pc:chgData name="Hunter Ceranic" userId="55b8025d37c61089" providerId="LiveId" clId="{ACCD79ED-BFAE-4857-8FB5-603E641725DE}" dt="2024-01-23T20:03:02.922" v="3" actId="26606"/>
-          <pc:sldLayoutMkLst>
-            <pc:docMk/>
-            <pc:sldMasterMk cId="3109401901" sldId="2147483648"/>
-            <pc:sldLayoutMk cId="3508845573" sldId="2147483652"/>
-          </pc:sldLayoutMkLst>
-        </pc:sldLayoutChg>
-        <pc:sldLayoutChg chg="add del">
-          <pc:chgData name="Hunter Ceranic" userId="55b8025d37c61089" providerId="LiveId" clId="{ACCD79ED-BFAE-4857-8FB5-603E641725DE}" dt="2024-01-23T20:03:02.922" v="3" actId="26606"/>
-          <pc:sldLayoutMkLst>
-            <pc:docMk/>
-            <pc:sldMasterMk cId="3109401901" sldId="2147483648"/>
-            <pc:sldLayoutMk cId="2110172368" sldId="2147483653"/>
-          </pc:sldLayoutMkLst>
-        </pc:sldLayoutChg>
-        <pc:sldLayoutChg chg="add del">
-          <pc:chgData name="Hunter Ceranic" userId="55b8025d37c61089" providerId="LiveId" clId="{ACCD79ED-BFAE-4857-8FB5-603E641725DE}" dt="2024-01-23T20:03:02.922" v="3" actId="26606"/>
-          <pc:sldLayoutMkLst>
-            <pc:docMk/>
-            <pc:sldMasterMk cId="3109401901" sldId="2147483648"/>
-            <pc:sldLayoutMk cId="2210393177" sldId="2147483654"/>
-          </pc:sldLayoutMkLst>
-        </pc:sldLayoutChg>
-        <pc:sldLayoutChg chg="add del">
-          <pc:chgData name="Hunter Ceranic" userId="55b8025d37c61089" providerId="LiveId" clId="{ACCD79ED-BFAE-4857-8FB5-603E641725DE}" dt="2024-01-23T20:03:02.922" v="3" actId="26606"/>
-          <pc:sldLayoutMkLst>
-            <pc:docMk/>
-            <pc:sldMasterMk cId="3109401901" sldId="2147483648"/>
-            <pc:sldLayoutMk cId="2886718544" sldId="2147483655"/>
-          </pc:sldLayoutMkLst>
-        </pc:sldLayoutChg>
-        <pc:sldLayoutChg chg="add del">
-          <pc:chgData name="Hunter Ceranic" userId="55b8025d37c61089" providerId="LiveId" clId="{ACCD79ED-BFAE-4857-8FB5-603E641725DE}" dt="2024-01-23T20:03:02.922" v="3" actId="26606"/>
-          <pc:sldLayoutMkLst>
-            <pc:docMk/>
-            <pc:sldMasterMk cId="3109401901" sldId="2147483648"/>
-            <pc:sldLayoutMk cId="3850669462" sldId="2147483656"/>
-          </pc:sldLayoutMkLst>
-        </pc:sldLayoutChg>
-        <pc:sldLayoutChg chg="add del">
-          <pc:chgData name="Hunter Ceranic" userId="55b8025d37c61089" providerId="LiveId" clId="{ACCD79ED-BFAE-4857-8FB5-603E641725DE}" dt="2024-01-23T20:03:02.922" v="3" actId="26606"/>
-          <pc:sldLayoutMkLst>
-            <pc:docMk/>
-            <pc:sldMasterMk cId="3109401901" sldId="2147483648"/>
-            <pc:sldLayoutMk cId="2647324278" sldId="2147483657"/>
-          </pc:sldLayoutMkLst>
-        </pc:sldLayoutChg>
-        <pc:sldLayoutChg chg="add del">
-          <pc:chgData name="Hunter Ceranic" userId="55b8025d37c61089" providerId="LiveId" clId="{ACCD79ED-BFAE-4857-8FB5-603E641725DE}" dt="2024-01-23T20:03:02.922" v="3" actId="26606"/>
-          <pc:sldLayoutMkLst>
-            <pc:docMk/>
-            <pc:sldMasterMk cId="3109401901" sldId="2147483648"/>
-            <pc:sldLayoutMk cId="1491557029" sldId="2147483658"/>
-          </pc:sldLayoutMkLst>
-        </pc:sldLayoutChg>
-        <pc:sldLayoutChg chg="add del">
-          <pc:chgData name="Hunter Ceranic" userId="55b8025d37c61089" providerId="LiveId" clId="{ACCD79ED-BFAE-4857-8FB5-603E641725DE}" dt="2024-01-23T20:03:02.922" v="3" actId="26606"/>
-          <pc:sldLayoutMkLst>
-            <pc:docMk/>
-            <pc:sldMasterMk cId="3109401901" sldId="2147483648"/>
-            <pc:sldLayoutMk cId="1150607811" sldId="2147483659"/>
-          </pc:sldLayoutMkLst>
-        </pc:sldLayoutChg>
-      </pc:sldMasterChg>
-      <pc:sldMasterChg chg="add del addSldLayout delSldLayout">
-        <pc:chgData name="Hunter Ceranic" userId="55b8025d37c61089" providerId="LiveId" clId="{ACCD79ED-BFAE-4857-8FB5-603E641725DE}" dt="2024-01-23T20:03:41.234" v="35" actId="26606"/>
-        <pc:sldMasterMkLst>
-          <pc:docMk/>
-          <pc:sldMasterMk cId="3625141046" sldId="2147483699"/>
-        </pc:sldMasterMkLst>
-        <pc:sldLayoutChg chg="add del">
-          <pc:chgData name="Hunter Ceranic" userId="55b8025d37c61089" providerId="LiveId" clId="{ACCD79ED-BFAE-4857-8FB5-603E641725DE}" dt="2024-01-23T20:03:41.234" v="35" actId="26606"/>
-          <pc:sldLayoutMkLst>
-            <pc:docMk/>
-            <pc:sldMasterMk cId="3625141046" sldId="2147483699"/>
-            <pc:sldLayoutMk cId="1127557602" sldId="2147483688"/>
-          </pc:sldLayoutMkLst>
-        </pc:sldLayoutChg>
-        <pc:sldLayoutChg chg="add del">
-          <pc:chgData name="Hunter Ceranic" userId="55b8025d37c61089" providerId="LiveId" clId="{ACCD79ED-BFAE-4857-8FB5-603E641725DE}" dt="2024-01-23T20:03:41.234" v="35" actId="26606"/>
-          <pc:sldLayoutMkLst>
-            <pc:docMk/>
-            <pc:sldMasterMk cId="3625141046" sldId="2147483699"/>
-            <pc:sldLayoutMk cId="2200874226" sldId="2147483689"/>
-          </pc:sldLayoutMkLst>
-        </pc:sldLayoutChg>
-        <pc:sldLayoutChg chg="add del">
-          <pc:chgData name="Hunter Ceranic" userId="55b8025d37c61089" providerId="LiveId" clId="{ACCD79ED-BFAE-4857-8FB5-603E641725DE}" dt="2024-01-23T20:03:41.234" v="35" actId="26606"/>
-          <pc:sldLayoutMkLst>
-            <pc:docMk/>
-            <pc:sldMasterMk cId="3625141046" sldId="2147483699"/>
-            <pc:sldLayoutMk cId="3914437980" sldId="2147483690"/>
-          </pc:sldLayoutMkLst>
-        </pc:sldLayoutChg>
-        <pc:sldLayoutChg chg="add del">
-          <pc:chgData name="Hunter Ceranic" userId="55b8025d37c61089" providerId="LiveId" clId="{ACCD79ED-BFAE-4857-8FB5-603E641725DE}" dt="2024-01-23T20:03:41.234" v="35" actId="26606"/>
-          <pc:sldLayoutMkLst>
-            <pc:docMk/>
-            <pc:sldMasterMk cId="3625141046" sldId="2147483699"/>
-            <pc:sldLayoutMk cId="946984127" sldId="2147483691"/>
-          </pc:sldLayoutMkLst>
-        </pc:sldLayoutChg>
-        <pc:sldLayoutChg chg="add del">
-          <pc:chgData name="Hunter Ceranic" userId="55b8025d37c61089" providerId="LiveId" clId="{ACCD79ED-BFAE-4857-8FB5-603E641725DE}" dt="2024-01-23T20:03:41.234" v="35" actId="26606"/>
-          <pc:sldLayoutMkLst>
-            <pc:docMk/>
-            <pc:sldMasterMk cId="3625141046" sldId="2147483699"/>
-            <pc:sldLayoutMk cId="4284967081" sldId="2147483692"/>
-          </pc:sldLayoutMkLst>
-        </pc:sldLayoutChg>
-        <pc:sldLayoutChg chg="add del">
-          <pc:chgData name="Hunter Ceranic" userId="55b8025d37c61089" providerId="LiveId" clId="{ACCD79ED-BFAE-4857-8FB5-603E641725DE}" dt="2024-01-23T20:03:41.234" v="35" actId="26606"/>
-          <pc:sldLayoutMkLst>
-            <pc:docMk/>
-            <pc:sldMasterMk cId="3625141046" sldId="2147483699"/>
-            <pc:sldLayoutMk cId="1216617267" sldId="2147483693"/>
-          </pc:sldLayoutMkLst>
-        </pc:sldLayoutChg>
-        <pc:sldLayoutChg chg="add del">
-          <pc:chgData name="Hunter Ceranic" userId="55b8025d37c61089" providerId="LiveId" clId="{ACCD79ED-BFAE-4857-8FB5-603E641725DE}" dt="2024-01-23T20:03:41.234" v="35" actId="26606"/>
-          <pc:sldLayoutMkLst>
-            <pc:docMk/>
-            <pc:sldMasterMk cId="3625141046" sldId="2147483699"/>
-            <pc:sldLayoutMk cId="2830778015" sldId="2147483694"/>
-          </pc:sldLayoutMkLst>
-        </pc:sldLayoutChg>
-        <pc:sldLayoutChg chg="add del">
-          <pc:chgData name="Hunter Ceranic" userId="55b8025d37c61089" providerId="LiveId" clId="{ACCD79ED-BFAE-4857-8FB5-603E641725DE}" dt="2024-01-23T20:03:41.234" v="35" actId="26606"/>
-          <pc:sldLayoutMkLst>
-            <pc:docMk/>
-            <pc:sldMasterMk cId="3625141046" sldId="2147483699"/>
-            <pc:sldLayoutMk cId="1653061690" sldId="2147483695"/>
-          </pc:sldLayoutMkLst>
-        </pc:sldLayoutChg>
-        <pc:sldLayoutChg chg="add del">
-          <pc:chgData name="Hunter Ceranic" userId="55b8025d37c61089" providerId="LiveId" clId="{ACCD79ED-BFAE-4857-8FB5-603E641725DE}" dt="2024-01-23T20:03:41.234" v="35" actId="26606"/>
-          <pc:sldLayoutMkLst>
-            <pc:docMk/>
-            <pc:sldMasterMk cId="3625141046" sldId="2147483699"/>
-            <pc:sldLayoutMk cId="1884769510" sldId="2147483696"/>
-          </pc:sldLayoutMkLst>
-        </pc:sldLayoutChg>
-        <pc:sldLayoutChg chg="add del">
-          <pc:chgData name="Hunter Ceranic" userId="55b8025d37c61089" providerId="LiveId" clId="{ACCD79ED-BFAE-4857-8FB5-603E641725DE}" dt="2024-01-23T20:03:41.234" v="35" actId="26606"/>
-          <pc:sldLayoutMkLst>
-            <pc:docMk/>
-            <pc:sldMasterMk cId="3625141046" sldId="2147483699"/>
-            <pc:sldLayoutMk cId="520030635" sldId="2147483697"/>
-          </pc:sldLayoutMkLst>
-        </pc:sldLayoutChg>
-        <pc:sldLayoutChg chg="add del">
-          <pc:chgData name="Hunter Ceranic" userId="55b8025d37c61089" providerId="LiveId" clId="{ACCD79ED-BFAE-4857-8FB5-603E641725DE}" dt="2024-01-23T20:03:41.234" v="35" actId="26606"/>
-          <pc:sldLayoutMkLst>
-            <pc:docMk/>
-            <pc:sldMasterMk cId="3625141046" sldId="2147483699"/>
-            <pc:sldLayoutMk cId="3334971624" sldId="2147483698"/>
-          </pc:sldLayoutMkLst>
-        </pc:sldLayoutChg>
-      </pc:sldMasterChg>
-      <pc:sldMasterChg chg="add del addSldLayout delSldLayout">
-        <pc:chgData name="Hunter Ceranic" userId="55b8025d37c61089" providerId="LiveId" clId="{ACCD79ED-BFAE-4857-8FB5-603E641725DE}" dt="2024-01-23T20:03:02.868" v="2" actId="26606"/>
-        <pc:sldMasterMkLst>
-          <pc:docMk/>
-          <pc:sldMasterMk cId="2202494251" sldId="2147483712"/>
-        </pc:sldMasterMkLst>
-        <pc:sldLayoutChg chg="add del">
-          <pc:chgData name="Hunter Ceranic" userId="55b8025d37c61089" providerId="LiveId" clId="{ACCD79ED-BFAE-4857-8FB5-603E641725DE}" dt="2024-01-23T20:03:02.868" v="2" actId="26606"/>
-          <pc:sldLayoutMkLst>
-            <pc:docMk/>
-            <pc:sldMasterMk cId="2202494251" sldId="2147483712"/>
-            <pc:sldLayoutMk cId="591244846" sldId="2147483701"/>
-          </pc:sldLayoutMkLst>
-        </pc:sldLayoutChg>
-        <pc:sldLayoutChg chg="add del">
-          <pc:chgData name="Hunter Ceranic" userId="55b8025d37c61089" providerId="LiveId" clId="{ACCD79ED-BFAE-4857-8FB5-603E641725DE}" dt="2024-01-23T20:03:02.868" v="2" actId="26606"/>
-          <pc:sldLayoutMkLst>
-            <pc:docMk/>
-            <pc:sldMasterMk cId="2202494251" sldId="2147483712"/>
-            <pc:sldLayoutMk cId="2331399181" sldId="2147483702"/>
-          </pc:sldLayoutMkLst>
-        </pc:sldLayoutChg>
-        <pc:sldLayoutChg chg="add del">
-          <pc:chgData name="Hunter Ceranic" userId="55b8025d37c61089" providerId="LiveId" clId="{ACCD79ED-BFAE-4857-8FB5-603E641725DE}" dt="2024-01-23T20:03:02.868" v="2" actId="26606"/>
-          <pc:sldLayoutMkLst>
-            <pc:docMk/>
-            <pc:sldMasterMk cId="2202494251" sldId="2147483712"/>
-            <pc:sldLayoutMk cId="3388230769" sldId="2147483703"/>
-          </pc:sldLayoutMkLst>
-        </pc:sldLayoutChg>
-        <pc:sldLayoutChg chg="add del">
-          <pc:chgData name="Hunter Ceranic" userId="55b8025d37c61089" providerId="LiveId" clId="{ACCD79ED-BFAE-4857-8FB5-603E641725DE}" dt="2024-01-23T20:03:02.868" v="2" actId="26606"/>
-          <pc:sldLayoutMkLst>
-            <pc:docMk/>
-            <pc:sldMasterMk cId="2202494251" sldId="2147483712"/>
-            <pc:sldLayoutMk cId="3869490735" sldId="2147483704"/>
-          </pc:sldLayoutMkLst>
-        </pc:sldLayoutChg>
-        <pc:sldLayoutChg chg="add del">
-          <pc:chgData name="Hunter Ceranic" userId="55b8025d37c61089" providerId="LiveId" clId="{ACCD79ED-BFAE-4857-8FB5-603E641725DE}" dt="2024-01-23T20:03:02.868" v="2" actId="26606"/>
-          <pc:sldLayoutMkLst>
-            <pc:docMk/>
-            <pc:sldMasterMk cId="2202494251" sldId="2147483712"/>
-            <pc:sldLayoutMk cId="886192896" sldId="2147483705"/>
-          </pc:sldLayoutMkLst>
-        </pc:sldLayoutChg>
-        <pc:sldLayoutChg chg="add del">
-          <pc:chgData name="Hunter Ceranic" userId="55b8025d37c61089" providerId="LiveId" clId="{ACCD79ED-BFAE-4857-8FB5-603E641725DE}" dt="2024-01-23T20:03:02.868" v="2" actId="26606"/>
-          <pc:sldLayoutMkLst>
-            <pc:docMk/>
-            <pc:sldMasterMk cId="2202494251" sldId="2147483712"/>
-            <pc:sldLayoutMk cId="4111025588" sldId="2147483706"/>
-          </pc:sldLayoutMkLst>
-        </pc:sldLayoutChg>
-        <pc:sldLayoutChg chg="add del">
-          <pc:chgData name="Hunter Ceranic" userId="55b8025d37c61089" providerId="LiveId" clId="{ACCD79ED-BFAE-4857-8FB5-603E641725DE}" dt="2024-01-23T20:03:02.868" v="2" actId="26606"/>
-          <pc:sldLayoutMkLst>
-            <pc:docMk/>
-            <pc:sldMasterMk cId="2202494251" sldId="2147483712"/>
-            <pc:sldLayoutMk cId="2309390667" sldId="2147483707"/>
-          </pc:sldLayoutMkLst>
-        </pc:sldLayoutChg>
-        <pc:sldLayoutChg chg="add del">
-          <pc:chgData name="Hunter Ceranic" userId="55b8025d37c61089" providerId="LiveId" clId="{ACCD79ED-BFAE-4857-8FB5-603E641725DE}" dt="2024-01-23T20:03:02.868" v="2" actId="26606"/>
-          <pc:sldLayoutMkLst>
-            <pc:docMk/>
-            <pc:sldMasterMk cId="2202494251" sldId="2147483712"/>
-            <pc:sldLayoutMk cId="1072143547" sldId="2147483708"/>
-          </pc:sldLayoutMkLst>
-        </pc:sldLayoutChg>
-        <pc:sldLayoutChg chg="add del">
-          <pc:chgData name="Hunter Ceranic" userId="55b8025d37c61089" providerId="LiveId" clId="{ACCD79ED-BFAE-4857-8FB5-603E641725DE}" dt="2024-01-23T20:03:02.868" v="2" actId="26606"/>
-          <pc:sldLayoutMkLst>
-            <pc:docMk/>
-            <pc:sldMasterMk cId="2202494251" sldId="2147483712"/>
-            <pc:sldLayoutMk cId="2466298444" sldId="2147483709"/>
-          </pc:sldLayoutMkLst>
-        </pc:sldLayoutChg>
-        <pc:sldLayoutChg chg="add del">
-          <pc:chgData name="Hunter Ceranic" userId="55b8025d37c61089" providerId="LiveId" clId="{ACCD79ED-BFAE-4857-8FB5-603E641725DE}" dt="2024-01-23T20:03:02.868" v="2" actId="26606"/>
-          <pc:sldLayoutMkLst>
-            <pc:docMk/>
-            <pc:sldMasterMk cId="2202494251" sldId="2147483712"/>
-            <pc:sldLayoutMk cId="804213471" sldId="2147483710"/>
-          </pc:sldLayoutMkLst>
-        </pc:sldLayoutChg>
-        <pc:sldLayoutChg chg="add del">
-          <pc:chgData name="Hunter Ceranic" userId="55b8025d37c61089" providerId="LiveId" clId="{ACCD79ED-BFAE-4857-8FB5-603E641725DE}" dt="2024-01-23T20:03:02.868" v="2" actId="26606"/>
-          <pc:sldLayoutMkLst>
-            <pc:docMk/>
-            <pc:sldMasterMk cId="2202494251" sldId="2147483712"/>
-            <pc:sldLayoutMk cId="2386803905" sldId="2147483711"/>
-          </pc:sldLayoutMkLst>
-        </pc:sldLayoutChg>
-      </pc:sldMasterChg>
-      <pc:sldMasterChg chg="add addSldLayout">
-        <pc:chgData name="Hunter Ceranic" userId="55b8025d37c61089" providerId="LiveId" clId="{ACCD79ED-BFAE-4857-8FB5-603E641725DE}" dt="2024-01-23T20:03:41.234" v="35" actId="26606"/>
-        <pc:sldMasterMkLst>
-          <pc:docMk/>
-          <pc:sldMasterMk cId="1299206643" sldId="2147483788"/>
-        </pc:sldMasterMkLst>
-        <pc:sldLayoutChg chg="add">
-          <pc:chgData name="Hunter Ceranic" userId="55b8025d37c61089" providerId="LiveId" clId="{ACCD79ED-BFAE-4857-8FB5-603E641725DE}" dt="2024-01-23T20:03:41.234" v="35" actId="26606"/>
-          <pc:sldLayoutMkLst>
-            <pc:docMk/>
-            <pc:sldMasterMk cId="1299206643" sldId="2147483788"/>
-            <pc:sldLayoutMk cId="3828061927" sldId="2147483777"/>
-          </pc:sldLayoutMkLst>
-        </pc:sldLayoutChg>
-        <pc:sldLayoutChg chg="add">
-          <pc:chgData name="Hunter Ceranic" userId="55b8025d37c61089" providerId="LiveId" clId="{ACCD79ED-BFAE-4857-8FB5-603E641725DE}" dt="2024-01-23T20:03:41.234" v="35" actId="26606"/>
-          <pc:sldLayoutMkLst>
-            <pc:docMk/>
-            <pc:sldMasterMk cId="1299206643" sldId="2147483788"/>
-            <pc:sldLayoutMk cId="2411539174" sldId="2147483778"/>
-          </pc:sldLayoutMkLst>
-        </pc:sldLayoutChg>
-        <pc:sldLayoutChg chg="add">
-          <pc:chgData name="Hunter Ceranic" userId="55b8025d37c61089" providerId="LiveId" clId="{ACCD79ED-BFAE-4857-8FB5-603E641725DE}" dt="2024-01-23T20:03:41.234" v="35" actId="26606"/>
-          <pc:sldLayoutMkLst>
-            <pc:docMk/>
-            <pc:sldMasterMk cId="1299206643" sldId="2147483788"/>
-            <pc:sldLayoutMk cId="2382623034" sldId="2147483779"/>
-          </pc:sldLayoutMkLst>
-        </pc:sldLayoutChg>
-        <pc:sldLayoutChg chg="add">
-          <pc:chgData name="Hunter Ceranic" userId="55b8025d37c61089" providerId="LiveId" clId="{ACCD79ED-BFAE-4857-8FB5-603E641725DE}" dt="2024-01-23T20:03:41.234" v="35" actId="26606"/>
-          <pc:sldLayoutMkLst>
-            <pc:docMk/>
-            <pc:sldMasterMk cId="1299206643" sldId="2147483788"/>
-            <pc:sldLayoutMk cId="1887262989" sldId="2147483780"/>
-          </pc:sldLayoutMkLst>
-        </pc:sldLayoutChg>
-        <pc:sldLayoutChg chg="add">
-          <pc:chgData name="Hunter Ceranic" userId="55b8025d37c61089" providerId="LiveId" clId="{ACCD79ED-BFAE-4857-8FB5-603E641725DE}" dt="2024-01-23T20:03:41.234" v="35" actId="26606"/>
-          <pc:sldLayoutMkLst>
-            <pc:docMk/>
-            <pc:sldMasterMk cId="1299206643" sldId="2147483788"/>
-            <pc:sldLayoutMk cId="2611365127" sldId="2147483781"/>
-          </pc:sldLayoutMkLst>
-        </pc:sldLayoutChg>
-        <pc:sldLayoutChg chg="add">
-          <pc:chgData name="Hunter Ceranic" userId="55b8025d37c61089" providerId="LiveId" clId="{ACCD79ED-BFAE-4857-8FB5-603E641725DE}" dt="2024-01-23T20:03:41.234" v="35" actId="26606"/>
-          <pc:sldLayoutMkLst>
-            <pc:docMk/>
-            <pc:sldMasterMk cId="1299206643" sldId="2147483788"/>
-            <pc:sldLayoutMk cId="825454338" sldId="2147483782"/>
-          </pc:sldLayoutMkLst>
-        </pc:sldLayoutChg>
-        <pc:sldLayoutChg chg="add">
-          <pc:chgData name="Hunter Ceranic" userId="55b8025d37c61089" providerId="LiveId" clId="{ACCD79ED-BFAE-4857-8FB5-603E641725DE}" dt="2024-01-23T20:03:41.234" v="35" actId="26606"/>
-          <pc:sldLayoutMkLst>
-            <pc:docMk/>
-            <pc:sldMasterMk cId="1299206643" sldId="2147483788"/>
-            <pc:sldLayoutMk cId="3585152483" sldId="2147483783"/>
-          </pc:sldLayoutMkLst>
-        </pc:sldLayoutChg>
-        <pc:sldLayoutChg chg="add">
-          <pc:chgData name="Hunter Ceranic" userId="55b8025d37c61089" providerId="LiveId" clId="{ACCD79ED-BFAE-4857-8FB5-603E641725DE}" dt="2024-01-23T20:03:41.234" v="35" actId="26606"/>
-          <pc:sldLayoutMkLst>
-            <pc:docMk/>
-            <pc:sldMasterMk cId="1299206643" sldId="2147483788"/>
-            <pc:sldLayoutMk cId="676146419" sldId="2147483784"/>
-          </pc:sldLayoutMkLst>
-        </pc:sldLayoutChg>
-        <pc:sldLayoutChg chg="add">
-          <pc:chgData name="Hunter Ceranic" userId="55b8025d37c61089" providerId="LiveId" clId="{ACCD79ED-BFAE-4857-8FB5-603E641725DE}" dt="2024-01-23T20:03:41.234" v="35" actId="26606"/>
-          <pc:sldLayoutMkLst>
-            <pc:docMk/>
-            <pc:sldMasterMk cId="1299206643" sldId="2147483788"/>
-            <pc:sldLayoutMk cId="327102813" sldId="2147483785"/>
-          </pc:sldLayoutMkLst>
-        </pc:sldLayoutChg>
-        <pc:sldLayoutChg chg="add">
-          <pc:chgData name="Hunter Ceranic" userId="55b8025d37c61089" providerId="LiveId" clId="{ACCD79ED-BFAE-4857-8FB5-603E641725DE}" dt="2024-01-23T20:03:41.234" v="35" actId="26606"/>
-          <pc:sldLayoutMkLst>
-            <pc:docMk/>
-            <pc:sldMasterMk cId="1299206643" sldId="2147483788"/>
-            <pc:sldLayoutMk cId="4261281538" sldId="2147483786"/>
-          </pc:sldLayoutMkLst>
-        </pc:sldLayoutChg>
-        <pc:sldLayoutChg chg="add">
-          <pc:chgData name="Hunter Ceranic" userId="55b8025d37c61089" providerId="LiveId" clId="{ACCD79ED-BFAE-4857-8FB5-603E641725DE}" dt="2024-01-23T20:03:41.234" v="35" actId="26606"/>
-          <pc:sldLayoutMkLst>
-            <pc:docMk/>
-            <pc:sldMasterMk cId="1299206643" sldId="2147483788"/>
-            <pc:sldLayoutMk cId="3516666301" sldId="2147483787"/>
-          </pc:sldLayoutMkLst>
-        </pc:sldLayoutChg>
-      </pc:sldMasterChg>
     </pc:docChg>
   </pc:docChgLst>
 </pc:chgInfo>
@@ -3084,7 +3084,7 @@
           <a:p>
             <a:fld id="{9E418AF7-6E72-4403-B085-4589D1110134}" type="datetimeFigureOut">
               <a:rPr lang="en-CA" smtClean="0"/>
-              <a:t>2024-04-04</a:t>
+              <a:t>2024-04-05</a:t>
             </a:fld>
             <a:endParaRPr lang="en-CA"/>
           </a:p>
@@ -3499,7 +3499,7 @@
           <a:p>
             <a:fld id="{D64C250B-3F0E-4970-9318-C9D7D394820E}" type="datetime1">
               <a:rPr lang="en-US" smtClean="0"/>
-              <a:t>4/4/2024</a:t>
+              <a:t>4/5/2024</a:t>
             </a:fld>
             <a:endParaRPr lang="en-US" dirty="0"/>
           </a:p>
@@ -3914,7 +3914,7 @@
           <a:p>
             <a:fld id="{7ED2D475-D7C3-4D53-A451-04FF36E3C7CA}" type="datetime1">
               <a:rPr lang="en-US" smtClean="0"/>
-              <a:t>4/4/2024</a:t>
+              <a:t>4/5/2024</a:t>
             </a:fld>
             <a:endParaRPr lang="en-US"/>
           </a:p>
@@ -4406,7 +4406,7 @@
           <a:p>
             <a:fld id="{B13D53CE-B973-4FCF-BB6D-73B61285C9EE}" type="datetime1">
               <a:rPr lang="en-US" smtClean="0"/>
-              <a:t>4/4/2024</a:t>
+              <a:t>4/5/2024</a:t>
             </a:fld>
             <a:endParaRPr lang="en-US"/>
           </a:p>
@@ -4893,7 +4893,7 @@
           <a:p>
             <a:fld id="{6F168777-EDFC-4AB3-A960-739B6325059F}" type="datetime1">
               <a:rPr lang="en-US" smtClean="0"/>
-              <a:t>4/4/2024</a:t>
+              <a:t>4/5/2024</a:t>
             </a:fld>
             <a:endParaRPr lang="en-US" dirty="0"/>
           </a:p>
@@ -5662,7 +5662,7 @@
           <a:p>
             <a:fld id="{4D320339-89DE-45C9-8EA6-5855C5BC4EC8}" type="datetime1">
               <a:rPr lang="en-US" smtClean="0"/>
-              <a:t>4/4/2024</a:t>
+              <a:t>4/5/2024</a:t>
             </a:fld>
             <a:endParaRPr lang="en-US"/>
           </a:p>
@@ -6144,7 +6144,7 @@
           <a:p>
             <a:fld id="{D97A0DFF-DDA9-437C-A4F4-5DF1C7108CDC}" type="datetime1">
               <a:rPr lang="en-US" smtClean="0"/>
-              <a:t>4/4/2024</a:t>
+              <a:t>4/5/2024</a:t>
             </a:fld>
             <a:endParaRPr lang="en-US"/>
           </a:p>
@@ -6840,7 +6840,7 @@
           <a:p>
             <a:fld id="{673E6A36-CFDC-4F59-94D9-5938EA3FFC22}" type="datetime1">
               <a:rPr lang="en-US" smtClean="0"/>
-              <a:t>4/4/2024</a:t>
+              <a:t>4/5/2024</a:t>
             </a:fld>
             <a:endParaRPr lang="en-US"/>
           </a:p>
@@ -7265,7 +7265,7 @@
           <a:p>
             <a:fld id="{585D03DC-4143-495E-82F1-B947FE3989AD}" type="datetime1">
               <a:rPr lang="en-US" smtClean="0"/>
-              <a:t>4/4/2024</a:t>
+              <a:t>4/5/2024</a:t>
             </a:fld>
             <a:endParaRPr lang="en-US"/>
           </a:p>
@@ -7662,7 +7662,7 @@
           <a:p>
             <a:fld id="{933DFF73-74E1-4718-A7DF-CE04E8339893}" type="datetime1">
               <a:rPr lang="en-US" smtClean="0"/>
-              <a:t>4/4/2024</a:t>
+              <a:t>4/5/2024</a:t>
             </a:fld>
             <a:endParaRPr lang="en-US"/>
           </a:p>
@@ -8257,7 +8257,7 @@
           <a:p>
             <a:fld id="{4EB71C7E-24B9-48A5-BD1A-C92D07E70F00}" type="datetime1">
               <a:rPr lang="en-US" smtClean="0"/>
-              <a:t>4/4/2024</a:t>
+              <a:t>4/5/2024</a:t>
             </a:fld>
             <a:endParaRPr lang="en-US"/>
           </a:p>
@@ -8832,7 +8832,7 @@
           <a:p>
             <a:fld id="{2E0181FF-DCB4-4A8B-8A91-9A9A7438884D}" type="datetime1">
               <a:rPr lang="en-US" smtClean="0"/>
-              <a:t>4/4/2024</a:t>
+              <a:t>4/5/2024</a:t>
             </a:fld>
             <a:endParaRPr lang="en-US"/>
           </a:p>
@@ -9358,7 +9358,7 @@
           <a:p>
             <a:fld id="{69064C32-6B48-4F37-8ABD-2C75CE9DDDEF}" type="datetime1">
               <a:rPr lang="en-US" smtClean="0"/>
-              <a:t>4/4/2024</a:t>
+              <a:t>4/5/2024</a:t>
             </a:fld>
             <a:endParaRPr lang="en-US" dirty="0"/>
           </a:p>
@@ -10166,7 +10166,7 @@
         </p:blipFill>
         <p:spPr>
           <a:xfrm>
-            <a:off x="5733768" y="-1"/>
+            <a:off x="5733768" y="-2"/>
             <a:ext cx="6458232" cy="6858001"/>
           </a:xfrm>
           <a:custGeom>
@@ -11214,11 +11214,9 @@
               </a:spcAft>
             </a:pPr>
             <a:fld id="{4854181D-6920-4594-9A5D-6CE56DC9F8B2}" type="slidenum">
-              <a:rPr lang="en-US">
+              <a:rPr lang="en-US" smtClean="0">
                 <a:solidFill>
-                  <a:prstClr val="black">
-                    <a:tint val="75000"/>
-                  </a:prstClr>
+                  <a:schemeClr val="tx1"/>
                 </a:solidFill>
               </a:rPr>
               <a:pPr>
@@ -11228,13 +11226,14 @@
               </a:pPr>
               <a:t>2</a:t>
             </a:fld>
-            <a:endParaRPr lang="en-US">
-              <a:solidFill>
-                <a:prstClr val="black">
-                  <a:tint val="75000"/>
-                </a:prstClr>
-              </a:solidFill>
-            </a:endParaRPr>
+            <a:r>
+              <a:rPr lang="en-US" dirty="0">
+                <a:solidFill>
+                  <a:schemeClr val="tx1"/>
+                </a:solidFill>
+              </a:rPr>
+              <a:t>/9</a:t>
+            </a:r>
           </a:p>
         </p:txBody>
       </p:sp>
@@ -11382,10 +11381,21 @@
           <a:lstStyle/>
           <a:p>
             <a:fld id="{4854181D-6920-4594-9A5D-6CE56DC9F8B2}" type="slidenum">
-              <a:rPr lang="en-US" smtClean="0"/>
+              <a:rPr lang="en-US" smtClean="0">
+                <a:solidFill>
+                  <a:schemeClr val="tx1"/>
+                </a:solidFill>
+              </a:rPr>
               <a:t>3</a:t>
             </a:fld>
-            <a:endParaRPr lang="en-US"/>
+            <a:r>
+              <a:rPr lang="en-US" dirty="0">
+                <a:solidFill>
+                  <a:schemeClr val="tx1"/>
+                </a:solidFill>
+              </a:rPr>
+              <a:t>/9</a:t>
+            </a:r>
           </a:p>
         </p:txBody>
       </p:sp>
@@ -11904,7 +11914,7 @@
               </a:spcAft>
             </a:pPr>
             <a:fld id="{4854181D-6920-4594-9A5D-6CE56DC9F8B2}" type="slidenum">
-              <a:rPr lang="en-US">
+              <a:rPr lang="en-US" smtClean="0">
                 <a:solidFill>
                   <a:srgbClr val="FFFFFF"/>
                 </a:solidFill>
@@ -11916,11 +11926,14 @@
               </a:pPr>
               <a:t>4</a:t>
             </a:fld>
-            <a:endParaRPr lang="en-US">
-              <a:solidFill>
-                <a:srgbClr val="FFFFFF"/>
-              </a:solidFill>
-            </a:endParaRPr>
+            <a:r>
+              <a:rPr lang="en-US" dirty="0">
+                <a:solidFill>
+                  <a:srgbClr val="FFFFFF"/>
+                </a:solidFill>
+              </a:rPr>
+              <a:t>/9</a:t>
+            </a:r>
           </a:p>
         </p:txBody>
       </p:sp>
@@ -13102,6 +13115,160 @@
           </a:p>
         </p:txBody>
       </p:sp>
+      <p:sp>
+        <p:nvSpPr>
+          <p:cNvPr id="3" name="Slide Number Placeholder 3">
+            <a:extLst>
+              <a:ext uri="{FF2B5EF4-FFF2-40B4-BE49-F238E27FC236}">
+                <a16:creationId xmlns:a16="http://schemas.microsoft.com/office/drawing/2014/main" id="{FD1768D2-7FCB-9214-1DCF-90C428B1A474}"/>
+              </a:ext>
+            </a:extLst>
+          </p:cNvPr>
+          <p:cNvSpPr txBox="1">
+            <a:spLocks/>
+          </p:cNvSpPr>
+          <p:nvPr/>
+        </p:nvSpPr>
+        <p:spPr>
+          <a:xfrm>
+            <a:off x="9316915" y="6492874"/>
+            <a:ext cx="2743200" cy="365125"/>
+          </a:xfrm>
+          <a:prstGeom prst="rect">
+            <a:avLst/>
+          </a:prstGeom>
+        </p:spPr>
+        <p:txBody>
+          <a:bodyPr vert="horz" lIns="91440" tIns="45720" rIns="91440" bIns="45720" rtlCol="0" anchor="ctr">
+            <a:normAutofit/>
+          </a:bodyPr>
+          <a:lstStyle>
+            <a:defPPr>
+              <a:defRPr lang="en-US"/>
+            </a:defPPr>
+            <a:lvl1pPr marL="0" algn="r" defTabSz="914400" rtl="0" eaLnBrk="1" latinLnBrk="0" hangingPunct="1">
+              <a:defRPr sz="1200" kern="1200" cap="none" spc="0" baseline="0">
+                <a:solidFill>
+                  <a:schemeClr val="tx1">
+                    <a:tint val="75000"/>
+                  </a:schemeClr>
+                </a:solidFill>
+                <a:latin typeface="+mn-lt"/>
+                <a:ea typeface="+mn-ea"/>
+                <a:cs typeface="+mn-cs"/>
+              </a:defRPr>
+            </a:lvl1pPr>
+            <a:lvl2pPr marL="457200" algn="l" defTabSz="914400" rtl="0" eaLnBrk="1" latinLnBrk="0" hangingPunct="1">
+              <a:defRPr sz="1800" kern="1200">
+                <a:solidFill>
+                  <a:schemeClr val="tx1"/>
+                </a:solidFill>
+                <a:latin typeface="+mn-lt"/>
+                <a:ea typeface="+mn-ea"/>
+                <a:cs typeface="+mn-cs"/>
+              </a:defRPr>
+            </a:lvl2pPr>
+            <a:lvl3pPr marL="914400" algn="l" defTabSz="914400" rtl="0" eaLnBrk="1" latinLnBrk="0" hangingPunct="1">
+              <a:defRPr sz="1800" kern="1200">
+                <a:solidFill>
+                  <a:schemeClr val="tx1"/>
+                </a:solidFill>
+                <a:latin typeface="+mn-lt"/>
+                <a:ea typeface="+mn-ea"/>
+                <a:cs typeface="+mn-cs"/>
+              </a:defRPr>
+            </a:lvl3pPr>
+            <a:lvl4pPr marL="1371600" algn="l" defTabSz="914400" rtl="0" eaLnBrk="1" latinLnBrk="0" hangingPunct="1">
+              <a:defRPr sz="1800" kern="1200">
+                <a:solidFill>
+                  <a:schemeClr val="tx1"/>
+                </a:solidFill>
+                <a:latin typeface="+mn-lt"/>
+                <a:ea typeface="+mn-ea"/>
+                <a:cs typeface="+mn-cs"/>
+              </a:defRPr>
+            </a:lvl4pPr>
+            <a:lvl5pPr marL="1828800" algn="l" defTabSz="914400" rtl="0" eaLnBrk="1" latinLnBrk="0" hangingPunct="1">
+              <a:defRPr sz="1800" kern="1200">
+                <a:solidFill>
+                  <a:schemeClr val="tx1"/>
+                </a:solidFill>
+                <a:latin typeface="+mn-lt"/>
+                <a:ea typeface="+mn-ea"/>
+                <a:cs typeface="+mn-cs"/>
+              </a:defRPr>
+            </a:lvl5pPr>
+            <a:lvl6pPr marL="2286000" algn="l" defTabSz="914400" rtl="0" eaLnBrk="1" latinLnBrk="0" hangingPunct="1">
+              <a:defRPr sz="1800" kern="1200">
+                <a:solidFill>
+                  <a:schemeClr val="tx1"/>
+                </a:solidFill>
+                <a:latin typeface="+mn-lt"/>
+                <a:ea typeface="+mn-ea"/>
+                <a:cs typeface="+mn-cs"/>
+              </a:defRPr>
+            </a:lvl6pPr>
+            <a:lvl7pPr marL="2743200" algn="l" defTabSz="914400" rtl="0" eaLnBrk="1" latinLnBrk="0" hangingPunct="1">
+              <a:defRPr sz="1800" kern="1200">
+                <a:solidFill>
+                  <a:schemeClr val="tx1"/>
+                </a:solidFill>
+                <a:latin typeface="+mn-lt"/>
+                <a:ea typeface="+mn-ea"/>
+                <a:cs typeface="+mn-cs"/>
+              </a:defRPr>
+            </a:lvl7pPr>
+            <a:lvl8pPr marL="3200400" algn="l" defTabSz="914400" rtl="0" eaLnBrk="1" latinLnBrk="0" hangingPunct="1">
+              <a:defRPr sz="1800" kern="1200">
+                <a:solidFill>
+                  <a:schemeClr val="tx1"/>
+                </a:solidFill>
+                <a:latin typeface="+mn-lt"/>
+                <a:ea typeface="+mn-ea"/>
+                <a:cs typeface="+mn-cs"/>
+              </a:defRPr>
+            </a:lvl8pPr>
+            <a:lvl9pPr marL="3657600" algn="l" defTabSz="914400" rtl="0" eaLnBrk="1" latinLnBrk="0" hangingPunct="1">
+              <a:defRPr sz="1800" kern="1200">
+                <a:solidFill>
+                  <a:schemeClr val="tx1"/>
+                </a:solidFill>
+                <a:latin typeface="+mn-lt"/>
+                <a:ea typeface="+mn-ea"/>
+                <a:cs typeface="+mn-cs"/>
+              </a:defRPr>
+            </a:lvl9pPr>
+          </a:lstStyle>
+          <a:p>
+            <a:pPr>
+              <a:spcAft>
+                <a:spcPts val="600"/>
+              </a:spcAft>
+            </a:pPr>
+            <a:fld id="{4854181D-6920-4594-9A5D-6CE56DC9F8B2}" type="slidenum">
+              <a:rPr lang="en-US" smtClean="0">
+                <a:solidFill>
+                  <a:schemeClr val="tx1"/>
+                </a:solidFill>
+              </a:rPr>
+              <a:pPr>
+                <a:spcAft>
+                  <a:spcPts val="600"/>
+                </a:spcAft>
+              </a:pPr>
+              <a:t>5</a:t>
+            </a:fld>
+            <a:r>
+              <a:rPr lang="en-US" dirty="0">
+                <a:solidFill>
+                  <a:schemeClr val="tx1"/>
+                </a:solidFill>
+              </a:rPr>
+              <a:t>/9</a:t>
+            </a:r>
+          </a:p>
+        </p:txBody>
+      </p:sp>
     </p:spTree>
     <p:extLst>
       <p:ext uri="{BB962C8B-B14F-4D97-AF65-F5344CB8AC3E}">
@@ -13363,6 +13530,160 @@
           </a:prstGeom>
         </p:spPr>
       </p:pic>
+      <p:sp>
+        <p:nvSpPr>
+          <p:cNvPr id="5" name="Slide Number Placeholder 3">
+            <a:extLst>
+              <a:ext uri="{FF2B5EF4-FFF2-40B4-BE49-F238E27FC236}">
+                <a16:creationId xmlns:a16="http://schemas.microsoft.com/office/drawing/2014/main" id="{35219DE3-78B2-D791-3F23-7DF11BA5A0A0}"/>
+              </a:ext>
+            </a:extLst>
+          </p:cNvPr>
+          <p:cNvSpPr txBox="1">
+            <a:spLocks/>
+          </p:cNvSpPr>
+          <p:nvPr/>
+        </p:nvSpPr>
+        <p:spPr>
+          <a:xfrm>
+            <a:off x="9316915" y="6492874"/>
+            <a:ext cx="2743200" cy="365125"/>
+          </a:xfrm>
+          <a:prstGeom prst="rect">
+            <a:avLst/>
+          </a:prstGeom>
+        </p:spPr>
+        <p:txBody>
+          <a:bodyPr vert="horz" lIns="91440" tIns="45720" rIns="91440" bIns="45720" rtlCol="0" anchor="ctr">
+            <a:normAutofit/>
+          </a:bodyPr>
+          <a:lstStyle>
+            <a:defPPr>
+              <a:defRPr lang="en-US"/>
+            </a:defPPr>
+            <a:lvl1pPr marL="0" algn="r" defTabSz="914400" rtl="0" eaLnBrk="1" latinLnBrk="0" hangingPunct="1">
+              <a:defRPr sz="1200" kern="1200" cap="none" spc="0" baseline="0">
+                <a:solidFill>
+                  <a:schemeClr val="tx1">
+                    <a:tint val="75000"/>
+                  </a:schemeClr>
+                </a:solidFill>
+                <a:latin typeface="+mn-lt"/>
+                <a:ea typeface="+mn-ea"/>
+                <a:cs typeface="+mn-cs"/>
+              </a:defRPr>
+            </a:lvl1pPr>
+            <a:lvl2pPr marL="457200" algn="l" defTabSz="914400" rtl="0" eaLnBrk="1" latinLnBrk="0" hangingPunct="1">
+              <a:defRPr sz="1800" kern="1200">
+                <a:solidFill>
+                  <a:schemeClr val="tx1"/>
+                </a:solidFill>
+                <a:latin typeface="+mn-lt"/>
+                <a:ea typeface="+mn-ea"/>
+                <a:cs typeface="+mn-cs"/>
+              </a:defRPr>
+            </a:lvl2pPr>
+            <a:lvl3pPr marL="914400" algn="l" defTabSz="914400" rtl="0" eaLnBrk="1" latinLnBrk="0" hangingPunct="1">
+              <a:defRPr sz="1800" kern="1200">
+                <a:solidFill>
+                  <a:schemeClr val="tx1"/>
+                </a:solidFill>
+                <a:latin typeface="+mn-lt"/>
+                <a:ea typeface="+mn-ea"/>
+                <a:cs typeface="+mn-cs"/>
+              </a:defRPr>
+            </a:lvl3pPr>
+            <a:lvl4pPr marL="1371600" algn="l" defTabSz="914400" rtl="0" eaLnBrk="1" latinLnBrk="0" hangingPunct="1">
+              <a:defRPr sz="1800" kern="1200">
+                <a:solidFill>
+                  <a:schemeClr val="tx1"/>
+                </a:solidFill>
+                <a:latin typeface="+mn-lt"/>
+                <a:ea typeface="+mn-ea"/>
+                <a:cs typeface="+mn-cs"/>
+              </a:defRPr>
+            </a:lvl4pPr>
+            <a:lvl5pPr marL="1828800" algn="l" defTabSz="914400" rtl="0" eaLnBrk="1" latinLnBrk="0" hangingPunct="1">
+              <a:defRPr sz="1800" kern="1200">
+                <a:solidFill>
+                  <a:schemeClr val="tx1"/>
+                </a:solidFill>
+                <a:latin typeface="+mn-lt"/>
+                <a:ea typeface="+mn-ea"/>
+                <a:cs typeface="+mn-cs"/>
+              </a:defRPr>
+            </a:lvl5pPr>
+            <a:lvl6pPr marL="2286000" algn="l" defTabSz="914400" rtl="0" eaLnBrk="1" latinLnBrk="0" hangingPunct="1">
+              <a:defRPr sz="1800" kern="1200">
+                <a:solidFill>
+                  <a:schemeClr val="tx1"/>
+                </a:solidFill>
+                <a:latin typeface="+mn-lt"/>
+                <a:ea typeface="+mn-ea"/>
+                <a:cs typeface="+mn-cs"/>
+              </a:defRPr>
+            </a:lvl6pPr>
+            <a:lvl7pPr marL="2743200" algn="l" defTabSz="914400" rtl="0" eaLnBrk="1" latinLnBrk="0" hangingPunct="1">
+              <a:defRPr sz="1800" kern="1200">
+                <a:solidFill>
+                  <a:schemeClr val="tx1"/>
+                </a:solidFill>
+                <a:latin typeface="+mn-lt"/>
+                <a:ea typeface="+mn-ea"/>
+                <a:cs typeface="+mn-cs"/>
+              </a:defRPr>
+            </a:lvl7pPr>
+            <a:lvl8pPr marL="3200400" algn="l" defTabSz="914400" rtl="0" eaLnBrk="1" latinLnBrk="0" hangingPunct="1">
+              <a:defRPr sz="1800" kern="1200">
+                <a:solidFill>
+                  <a:schemeClr val="tx1"/>
+                </a:solidFill>
+                <a:latin typeface="+mn-lt"/>
+                <a:ea typeface="+mn-ea"/>
+                <a:cs typeface="+mn-cs"/>
+              </a:defRPr>
+            </a:lvl8pPr>
+            <a:lvl9pPr marL="3657600" algn="l" defTabSz="914400" rtl="0" eaLnBrk="1" latinLnBrk="0" hangingPunct="1">
+              <a:defRPr sz="1800" kern="1200">
+                <a:solidFill>
+                  <a:schemeClr val="tx1"/>
+                </a:solidFill>
+                <a:latin typeface="+mn-lt"/>
+                <a:ea typeface="+mn-ea"/>
+                <a:cs typeface="+mn-cs"/>
+              </a:defRPr>
+            </a:lvl9pPr>
+          </a:lstStyle>
+          <a:p>
+            <a:pPr>
+              <a:spcAft>
+                <a:spcPts val="600"/>
+              </a:spcAft>
+            </a:pPr>
+            <a:fld id="{4854181D-6920-4594-9A5D-6CE56DC9F8B2}" type="slidenum">
+              <a:rPr lang="en-US" smtClean="0">
+                <a:solidFill>
+                  <a:schemeClr val="tx1"/>
+                </a:solidFill>
+              </a:rPr>
+              <a:pPr>
+                <a:spcAft>
+                  <a:spcPts val="600"/>
+                </a:spcAft>
+              </a:pPr>
+              <a:t>6</a:t>
+            </a:fld>
+            <a:r>
+              <a:rPr lang="en-US" dirty="0">
+                <a:solidFill>
+                  <a:schemeClr val="tx1"/>
+                </a:solidFill>
+              </a:rPr>
+              <a:t>/9</a:t>
+            </a:r>
+          </a:p>
+        </p:txBody>
+      </p:sp>
     </p:spTree>
     <p:extLst>
       <p:ext uri="{BB962C8B-B14F-4D97-AF65-F5344CB8AC3E}">
@@ -13514,6 +13835,160 @@
           </a:prstGeom>
         </p:spPr>
       </p:pic>
+      <p:sp>
+        <p:nvSpPr>
+          <p:cNvPr id="3" name="Slide Number Placeholder 3">
+            <a:extLst>
+              <a:ext uri="{FF2B5EF4-FFF2-40B4-BE49-F238E27FC236}">
+                <a16:creationId xmlns:a16="http://schemas.microsoft.com/office/drawing/2014/main" id="{6AB8409A-A7A3-8C85-4FB1-9C8DF82A1D4E}"/>
+              </a:ext>
+            </a:extLst>
+          </p:cNvPr>
+          <p:cNvSpPr txBox="1">
+            <a:spLocks/>
+          </p:cNvSpPr>
+          <p:nvPr/>
+        </p:nvSpPr>
+        <p:spPr>
+          <a:xfrm>
+            <a:off x="9316915" y="6492874"/>
+            <a:ext cx="2743200" cy="365125"/>
+          </a:xfrm>
+          <a:prstGeom prst="rect">
+            <a:avLst/>
+          </a:prstGeom>
+        </p:spPr>
+        <p:txBody>
+          <a:bodyPr vert="horz" lIns="91440" tIns="45720" rIns="91440" bIns="45720" rtlCol="0" anchor="ctr">
+            <a:normAutofit/>
+          </a:bodyPr>
+          <a:lstStyle>
+            <a:defPPr>
+              <a:defRPr lang="en-US"/>
+            </a:defPPr>
+            <a:lvl1pPr marL="0" algn="r" defTabSz="914400" rtl="0" eaLnBrk="1" latinLnBrk="0" hangingPunct="1">
+              <a:defRPr sz="1200" kern="1200" cap="none" spc="0" baseline="0">
+                <a:solidFill>
+                  <a:schemeClr val="tx1">
+                    <a:tint val="75000"/>
+                  </a:schemeClr>
+                </a:solidFill>
+                <a:latin typeface="+mn-lt"/>
+                <a:ea typeface="+mn-ea"/>
+                <a:cs typeface="+mn-cs"/>
+              </a:defRPr>
+            </a:lvl1pPr>
+            <a:lvl2pPr marL="457200" algn="l" defTabSz="914400" rtl="0" eaLnBrk="1" latinLnBrk="0" hangingPunct="1">
+              <a:defRPr sz="1800" kern="1200">
+                <a:solidFill>
+                  <a:schemeClr val="tx1"/>
+                </a:solidFill>
+                <a:latin typeface="+mn-lt"/>
+                <a:ea typeface="+mn-ea"/>
+                <a:cs typeface="+mn-cs"/>
+              </a:defRPr>
+            </a:lvl2pPr>
+            <a:lvl3pPr marL="914400" algn="l" defTabSz="914400" rtl="0" eaLnBrk="1" latinLnBrk="0" hangingPunct="1">
+              <a:defRPr sz="1800" kern="1200">
+                <a:solidFill>
+                  <a:schemeClr val="tx1"/>
+                </a:solidFill>
+                <a:latin typeface="+mn-lt"/>
+                <a:ea typeface="+mn-ea"/>
+                <a:cs typeface="+mn-cs"/>
+              </a:defRPr>
+            </a:lvl3pPr>
+            <a:lvl4pPr marL="1371600" algn="l" defTabSz="914400" rtl="0" eaLnBrk="1" latinLnBrk="0" hangingPunct="1">
+              <a:defRPr sz="1800" kern="1200">
+                <a:solidFill>
+                  <a:schemeClr val="tx1"/>
+                </a:solidFill>
+                <a:latin typeface="+mn-lt"/>
+                <a:ea typeface="+mn-ea"/>
+                <a:cs typeface="+mn-cs"/>
+              </a:defRPr>
+            </a:lvl4pPr>
+            <a:lvl5pPr marL="1828800" algn="l" defTabSz="914400" rtl="0" eaLnBrk="1" latinLnBrk="0" hangingPunct="1">
+              <a:defRPr sz="1800" kern="1200">
+                <a:solidFill>
+                  <a:schemeClr val="tx1"/>
+                </a:solidFill>
+                <a:latin typeface="+mn-lt"/>
+                <a:ea typeface="+mn-ea"/>
+                <a:cs typeface="+mn-cs"/>
+              </a:defRPr>
+            </a:lvl5pPr>
+            <a:lvl6pPr marL="2286000" algn="l" defTabSz="914400" rtl="0" eaLnBrk="1" latinLnBrk="0" hangingPunct="1">
+              <a:defRPr sz="1800" kern="1200">
+                <a:solidFill>
+                  <a:schemeClr val="tx1"/>
+                </a:solidFill>
+                <a:latin typeface="+mn-lt"/>
+                <a:ea typeface="+mn-ea"/>
+                <a:cs typeface="+mn-cs"/>
+              </a:defRPr>
+            </a:lvl6pPr>
+            <a:lvl7pPr marL="2743200" algn="l" defTabSz="914400" rtl="0" eaLnBrk="1" latinLnBrk="0" hangingPunct="1">
+              <a:defRPr sz="1800" kern="1200">
+                <a:solidFill>
+                  <a:schemeClr val="tx1"/>
+                </a:solidFill>
+                <a:latin typeface="+mn-lt"/>
+                <a:ea typeface="+mn-ea"/>
+                <a:cs typeface="+mn-cs"/>
+              </a:defRPr>
+            </a:lvl7pPr>
+            <a:lvl8pPr marL="3200400" algn="l" defTabSz="914400" rtl="0" eaLnBrk="1" latinLnBrk="0" hangingPunct="1">
+              <a:defRPr sz="1800" kern="1200">
+                <a:solidFill>
+                  <a:schemeClr val="tx1"/>
+                </a:solidFill>
+                <a:latin typeface="+mn-lt"/>
+                <a:ea typeface="+mn-ea"/>
+                <a:cs typeface="+mn-cs"/>
+              </a:defRPr>
+            </a:lvl8pPr>
+            <a:lvl9pPr marL="3657600" algn="l" defTabSz="914400" rtl="0" eaLnBrk="1" latinLnBrk="0" hangingPunct="1">
+              <a:defRPr sz="1800" kern="1200">
+                <a:solidFill>
+                  <a:schemeClr val="tx1"/>
+                </a:solidFill>
+                <a:latin typeface="+mn-lt"/>
+                <a:ea typeface="+mn-ea"/>
+                <a:cs typeface="+mn-cs"/>
+              </a:defRPr>
+            </a:lvl9pPr>
+          </a:lstStyle>
+          <a:p>
+            <a:pPr>
+              <a:spcAft>
+                <a:spcPts val="600"/>
+              </a:spcAft>
+            </a:pPr>
+            <a:fld id="{4854181D-6920-4594-9A5D-6CE56DC9F8B2}" type="slidenum">
+              <a:rPr lang="en-US" smtClean="0">
+                <a:solidFill>
+                  <a:schemeClr val="tx1"/>
+                </a:solidFill>
+              </a:rPr>
+              <a:pPr>
+                <a:spcAft>
+                  <a:spcPts val="600"/>
+                </a:spcAft>
+              </a:pPr>
+              <a:t>7</a:t>
+            </a:fld>
+            <a:r>
+              <a:rPr lang="en-US" dirty="0">
+                <a:solidFill>
+                  <a:schemeClr val="tx1"/>
+                </a:solidFill>
+              </a:rPr>
+              <a:t>/9</a:t>
+            </a:r>
+          </a:p>
+        </p:txBody>
+      </p:sp>
     </p:spTree>
     <p:extLst>
       <p:ext uri="{BB962C8B-B14F-4D97-AF65-F5344CB8AC3E}">
@@ -13599,10 +14074,21 @@
           <a:lstStyle/>
           <a:p>
             <a:fld id="{4854181D-6920-4594-9A5D-6CE56DC9F8B2}" type="slidenum">
-              <a:rPr lang="en-US" smtClean="0"/>
+              <a:rPr lang="en-US" smtClean="0">
+                <a:solidFill>
+                  <a:schemeClr val="tx1"/>
+                </a:solidFill>
+              </a:rPr>
               <a:t>8</a:t>
             </a:fld>
-            <a:endParaRPr lang="en-US"/>
+            <a:r>
+              <a:rPr lang="en-US" dirty="0">
+                <a:solidFill>
+                  <a:schemeClr val="tx1"/>
+                </a:solidFill>
+              </a:rPr>
+              <a:t>/9</a:t>
+            </a:r>
           </a:p>
         </p:txBody>
       </p:sp>

</xml_diff>